<commit_message>
Passed version of terasolunaorg-guideline-110927425
</commit_message>
<xml_diff>
--- a/source/ArchitectureInDetail/images_FileUpload/materialFileUpload.pptx
+++ b/source/ArchitectureInDetail/images_FileUpload/materialFileUpload.pptx
@@ -11,7 +11,7 @@
     <p:sldId id="304" r:id="rId2"/>
     <p:sldId id="303" r:id="rId3"/>
   </p:sldIdLst>
-  <p:sldSz cx="9144000" cy="6858000" type="screen4x3"/>
+  <p:sldSz cx="6858000" cy="9144000" type="screen4x3"/>
   <p:notesSz cx="6858000" cy="9144000"/>
   <p:defaultTextStyle>
     <a:defPPr>
@@ -119,6 +119,20 @@
         </p14:section>
       </p14:sectionLst>
     </p:ext>
+    <p:ext uri="{EFAFB233-063F-42B5-8137-9DF3F51BA10A}">
+      <p15:sldGuideLst xmlns:p15="http://schemas.microsoft.com/office/powerpoint/2012/main">
+        <p15:guide id="1" orient="horz" pos="2880" userDrawn="1">
+          <p15:clr>
+            <a:srgbClr val="A4A3A4"/>
+          </p15:clr>
+        </p15:guide>
+        <p15:guide id="2" pos="2160" userDrawn="1">
+          <p15:clr>
+            <a:srgbClr val="A4A3A4"/>
+          </p15:clr>
+        </p15:guide>
+      </p15:sldGuideLst>
+    </p:ext>
   </p:extLst>
 </p:presentation>
 </file>
@@ -206,7 +220,7 @@
             <a:fld id="{3BB47352-BF5A-4CD2-B029-996118CD8E01}" type="datetimeFigureOut">
               <a:rPr kumimoji="1" lang="ja-JP" altLang="en-US" smtClean="0"/>
               <a:pPr/>
-              <a:t>2013/11/29</a:t>
+              <a:t>2016/2/5</a:t>
             </a:fld>
             <a:endParaRPr kumimoji="1" lang="ja-JP" altLang="en-US"/>
           </a:p>
@@ -224,8 +238,8 @@
         </p:nvSpPr>
         <p:spPr>
           <a:xfrm>
-            <a:off x="1143000" y="685800"/>
-            <a:ext cx="4572000" cy="3429000"/>
+            <a:off x="2143125" y="685800"/>
+            <a:ext cx="2571750" cy="3429000"/>
           </a:xfrm>
           <a:prstGeom prst="rect">
             <a:avLst/>
@@ -507,6 +521,96 @@
 </p:notesMaster>
 </file>
 
+<file path=ppt/notesSlides/notesSlide1.xml><?xml version="1.0" encoding="utf-8"?>
+<p:notes xmlns:a="http://schemas.openxmlformats.org/drawingml/2006/main" xmlns:r="http://schemas.openxmlformats.org/officeDocument/2006/relationships" xmlns:p="http://schemas.openxmlformats.org/presentationml/2006/main">
+  <p:cSld>
+    <p:spTree>
+      <p:nvGrpSpPr>
+        <p:cNvPr id="1" name=""/>
+        <p:cNvGrpSpPr/>
+        <p:nvPr/>
+      </p:nvGrpSpPr>
+      <p:grpSpPr>
+        <a:xfrm>
+          <a:off x="0" y="0"/>
+          <a:ext cx="0" cy="0"/>
+          <a:chOff x="0" y="0"/>
+          <a:chExt cx="0" cy="0"/>
+        </a:xfrm>
+      </p:grpSpPr>
+      <p:sp>
+        <p:nvSpPr>
+          <p:cNvPr id="2" name="スライド イメージ プレースホルダー 1"/>
+          <p:cNvSpPr>
+            <a:spLocks noGrp="1" noRot="1" noChangeAspect="1"/>
+          </p:cNvSpPr>
+          <p:nvPr>
+            <p:ph type="sldImg"/>
+          </p:nvPr>
+        </p:nvSpPr>
+        <p:spPr>
+          <a:xfrm>
+            <a:off x="2143125" y="685800"/>
+            <a:ext cx="2571750" cy="3429000"/>
+          </a:xfrm>
+        </p:spPr>
+      </p:sp>
+      <p:sp>
+        <p:nvSpPr>
+          <p:cNvPr id="3" name="ノート プレースホルダー 2"/>
+          <p:cNvSpPr>
+            <a:spLocks noGrp="1"/>
+          </p:cNvSpPr>
+          <p:nvPr>
+            <p:ph type="body" idx="1"/>
+          </p:nvPr>
+        </p:nvSpPr>
+        <p:spPr/>
+        <p:txBody>
+          <a:bodyPr/>
+          <a:lstStyle/>
+          <a:p>
+            <a:endParaRPr kumimoji="1" lang="ja-JP" altLang="en-US" dirty="0"/>
+          </a:p>
+        </p:txBody>
+      </p:sp>
+      <p:sp>
+        <p:nvSpPr>
+          <p:cNvPr id="4" name="スライド番号プレースホルダー 3"/>
+          <p:cNvSpPr>
+            <a:spLocks noGrp="1"/>
+          </p:cNvSpPr>
+          <p:nvPr>
+            <p:ph type="sldNum" sz="quarter" idx="10"/>
+          </p:nvPr>
+        </p:nvSpPr>
+        <p:spPr/>
+        <p:txBody>
+          <a:bodyPr/>
+          <a:lstStyle/>
+          <a:p>
+            <a:fld id="{003CFFA3-9D07-4088-826B-DF328166082C}" type="slidenum">
+              <a:rPr kumimoji="1" lang="ja-JP" altLang="en-US" smtClean="0"/>
+              <a:pPr/>
+              <a:t>1</a:t>
+            </a:fld>
+            <a:endParaRPr kumimoji="1" lang="ja-JP" altLang="en-US"/>
+          </a:p>
+        </p:txBody>
+      </p:sp>
+    </p:spTree>
+    <p:extLst>
+      <p:ext uri="{BB962C8B-B14F-4D97-AF65-F5344CB8AC3E}">
+        <p14:creationId xmlns:p14="http://schemas.microsoft.com/office/powerpoint/2010/main" val="2210372606"/>
+      </p:ext>
+    </p:extLst>
+  </p:cSld>
+  <p:clrMapOvr>
+    <a:masterClrMapping/>
+  </p:clrMapOvr>
+</p:notes>
+</file>
+
 <file path=ppt/slideLayouts/slideLayout1.xml><?xml version="1.0" encoding="utf-8"?>
 <p:sldLayout xmlns:a="http://schemas.openxmlformats.org/drawingml/2006/main" xmlns:r="http://schemas.openxmlformats.org/officeDocument/2006/relationships" xmlns:p="http://schemas.openxmlformats.org/presentationml/2006/main" type="title" preserve="1">
   <p:cSld name="タイトル スライド">
@@ -536,8 +640,8 @@
         </p:nvSpPr>
         <p:spPr>
           <a:xfrm>
-            <a:off x="685800" y="2130425"/>
-            <a:ext cx="7772400" cy="1470025"/>
+            <a:off x="514350" y="2840569"/>
+            <a:ext cx="5829300" cy="1960033"/>
           </a:xfrm>
         </p:spPr>
         <p:txBody>
@@ -564,8 +668,8 @@
         </p:nvSpPr>
         <p:spPr>
           <a:xfrm>
-            <a:off x="1371600" y="3886200"/>
-            <a:ext cx="6400800" cy="1752600"/>
+            <a:off x="1028700" y="5181600"/>
+            <a:ext cx="4800600" cy="2336800"/>
           </a:xfrm>
         </p:spPr>
         <p:txBody>
@@ -581,7 +685,7 @@
                 </a:solidFill>
               </a:defRPr>
             </a:lvl1pPr>
-            <a:lvl2pPr marL="457200" indent="0" algn="ctr">
+            <a:lvl2pPr marL="342892" indent="0" algn="ctr">
               <a:buNone/>
               <a:defRPr>
                 <a:solidFill>
@@ -591,7 +695,7 @@
                 </a:solidFill>
               </a:defRPr>
             </a:lvl2pPr>
-            <a:lvl3pPr marL="914400" indent="0" algn="ctr">
+            <a:lvl3pPr marL="685784" indent="0" algn="ctr">
               <a:buNone/>
               <a:defRPr>
                 <a:solidFill>
@@ -601,7 +705,7 @@
                 </a:solidFill>
               </a:defRPr>
             </a:lvl3pPr>
-            <a:lvl4pPr marL="1371600" indent="0" algn="ctr">
+            <a:lvl4pPr marL="1028675" indent="0" algn="ctr">
               <a:buNone/>
               <a:defRPr>
                 <a:solidFill>
@@ -611,7 +715,7 @@
                 </a:solidFill>
               </a:defRPr>
             </a:lvl4pPr>
-            <a:lvl5pPr marL="1828800" indent="0" algn="ctr">
+            <a:lvl5pPr marL="1371566" indent="0" algn="ctr">
               <a:buNone/>
               <a:defRPr>
                 <a:solidFill>
@@ -621,7 +725,7 @@
                 </a:solidFill>
               </a:defRPr>
             </a:lvl5pPr>
-            <a:lvl6pPr marL="2286000" indent="0" algn="ctr">
+            <a:lvl6pPr marL="1714457" indent="0" algn="ctr">
               <a:buNone/>
               <a:defRPr>
                 <a:solidFill>
@@ -631,7 +735,7 @@
                 </a:solidFill>
               </a:defRPr>
             </a:lvl6pPr>
-            <a:lvl7pPr marL="2743200" indent="0" algn="ctr">
+            <a:lvl7pPr marL="2057349" indent="0" algn="ctr">
               <a:buNone/>
               <a:defRPr>
                 <a:solidFill>
@@ -641,7 +745,7 @@
                 </a:solidFill>
               </a:defRPr>
             </a:lvl7pPr>
-            <a:lvl8pPr marL="3200400" indent="0" algn="ctr">
+            <a:lvl8pPr marL="2400240" indent="0" algn="ctr">
               <a:buNone/>
               <a:defRPr>
                 <a:solidFill>
@@ -651,7 +755,7 @@
                 </a:solidFill>
               </a:defRPr>
             </a:lvl8pPr>
-            <a:lvl9pPr marL="3657600" indent="0" algn="ctr">
+            <a:lvl9pPr marL="2743132" indent="0" algn="ctr">
               <a:buNone/>
               <a:defRPr>
                 <a:solidFill>
@@ -689,7 +793,7 @@
             <a:fld id="{7B9B12EC-6AA0-374B-A2D3-850081A07A26}" type="datetimeFigureOut">
               <a:rPr kumimoji="1" lang="ja-JP" altLang="en-US" smtClean="0"/>
               <a:pPr/>
-              <a:t>2013/11/29</a:t>
+              <a:t>2016/2/5</a:t>
             </a:fld>
             <a:endParaRPr kumimoji="1" lang="ja-JP" altLang="en-US"/>
           </a:p>
@@ -893,7 +997,7 @@
             <a:fld id="{7B9B12EC-6AA0-374B-A2D3-850081A07A26}" type="datetimeFigureOut">
               <a:rPr kumimoji="1" lang="ja-JP" altLang="en-US" smtClean="0"/>
               <a:pPr/>
-              <a:t>2013/11/29</a:t>
+              <a:t>2016/2/5</a:t>
             </a:fld>
             <a:endParaRPr kumimoji="1" lang="ja-JP" altLang="en-US"/>
           </a:p>
@@ -984,8 +1088,8 @@
         </p:nvSpPr>
         <p:spPr>
           <a:xfrm>
-            <a:off x="6629400" y="274638"/>
-            <a:ext cx="2057400" cy="5851525"/>
+            <a:off x="4972050" y="366186"/>
+            <a:ext cx="1543050" cy="7802033"/>
           </a:xfrm>
         </p:spPr>
         <p:txBody>
@@ -1012,8 +1116,8 @@
         </p:nvSpPr>
         <p:spPr>
           <a:xfrm>
-            <a:off x="457200" y="274638"/>
-            <a:ext cx="6019800" cy="5851525"/>
+            <a:off x="342900" y="366186"/>
+            <a:ext cx="4514850" cy="7802033"/>
           </a:xfrm>
         </p:spPr>
         <p:txBody>
@@ -1107,7 +1211,7 @@
             <a:fld id="{7B9B12EC-6AA0-374B-A2D3-850081A07A26}" type="datetimeFigureOut">
               <a:rPr kumimoji="1" lang="ja-JP" altLang="en-US" smtClean="0"/>
               <a:pPr/>
-              <a:t>2013/11/29</a:t>
+              <a:t>2016/2/5</a:t>
             </a:fld>
             <a:endParaRPr kumimoji="1" lang="ja-JP" altLang="en-US"/>
           </a:p>
@@ -1311,7 +1415,7 @@
             <a:fld id="{7B9B12EC-6AA0-374B-A2D3-850081A07A26}" type="datetimeFigureOut">
               <a:rPr kumimoji="1" lang="ja-JP" altLang="en-US" smtClean="0"/>
               <a:pPr/>
-              <a:t>2013/11/29</a:t>
+              <a:t>2016/2/5</a:t>
             </a:fld>
             <a:endParaRPr kumimoji="1" lang="ja-JP" altLang="en-US"/>
           </a:p>
@@ -1402,15 +1506,15 @@
         </p:nvSpPr>
         <p:spPr>
           <a:xfrm>
-            <a:off x="722313" y="4406900"/>
-            <a:ext cx="7772400" cy="1362075"/>
+            <a:off x="541735" y="5875867"/>
+            <a:ext cx="5829300" cy="1816100"/>
           </a:xfrm>
         </p:spPr>
         <p:txBody>
           <a:bodyPr anchor="t"/>
           <a:lstStyle>
             <a:lvl1pPr algn="l">
-              <a:defRPr sz="4000" b="1" cap="all"/>
+              <a:defRPr sz="3000" b="1" cap="all"/>
             </a:lvl1pPr>
           </a:lstStyle>
           <a:p>
@@ -1434,8 +1538,8 @@
         </p:nvSpPr>
         <p:spPr>
           <a:xfrm>
-            <a:off x="722313" y="2906713"/>
-            <a:ext cx="7772400" cy="1500187"/>
+            <a:off x="541735" y="3875620"/>
+            <a:ext cx="5829300" cy="2000249"/>
           </a:xfrm>
         </p:spPr>
         <p:txBody>
@@ -1443,7 +1547,7 @@
           <a:lstStyle>
             <a:lvl1pPr marL="0" indent="0">
               <a:buNone/>
-              <a:defRPr sz="2000">
+              <a:defRPr sz="1500">
                 <a:solidFill>
                   <a:schemeClr val="tx1">
                     <a:tint val="75000"/>
@@ -1451,9 +1555,9 @@
                 </a:solidFill>
               </a:defRPr>
             </a:lvl1pPr>
-            <a:lvl2pPr marL="457200" indent="0">
+            <a:lvl2pPr marL="342892" indent="0">
               <a:buNone/>
-              <a:defRPr sz="1800">
+              <a:defRPr sz="1350">
                 <a:solidFill>
                   <a:schemeClr val="tx1">
                     <a:tint val="75000"/>
@@ -1461,9 +1565,9 @@
                 </a:solidFill>
               </a:defRPr>
             </a:lvl2pPr>
-            <a:lvl3pPr marL="914400" indent="0">
+            <a:lvl3pPr marL="685784" indent="0">
               <a:buNone/>
-              <a:defRPr sz="1600">
+              <a:defRPr sz="1200">
                 <a:solidFill>
                   <a:schemeClr val="tx1">
                     <a:tint val="75000"/>
@@ -1471,9 +1575,9 @@
                 </a:solidFill>
               </a:defRPr>
             </a:lvl3pPr>
-            <a:lvl4pPr marL="1371600" indent="0">
+            <a:lvl4pPr marL="1028675" indent="0">
               <a:buNone/>
-              <a:defRPr sz="1400">
+              <a:defRPr sz="1050">
                 <a:solidFill>
                   <a:schemeClr val="tx1">
                     <a:tint val="75000"/>
@@ -1481,9 +1585,9 @@
                 </a:solidFill>
               </a:defRPr>
             </a:lvl4pPr>
-            <a:lvl5pPr marL="1828800" indent="0">
+            <a:lvl5pPr marL="1371566" indent="0">
               <a:buNone/>
-              <a:defRPr sz="1400">
+              <a:defRPr sz="1050">
                 <a:solidFill>
                   <a:schemeClr val="tx1">
                     <a:tint val="75000"/>
@@ -1491,9 +1595,9 @@
                 </a:solidFill>
               </a:defRPr>
             </a:lvl5pPr>
-            <a:lvl6pPr marL="2286000" indent="0">
+            <a:lvl6pPr marL="1714457" indent="0">
               <a:buNone/>
-              <a:defRPr sz="1400">
+              <a:defRPr sz="1050">
                 <a:solidFill>
                   <a:schemeClr val="tx1">
                     <a:tint val="75000"/>
@@ -1501,9 +1605,9 @@
                 </a:solidFill>
               </a:defRPr>
             </a:lvl6pPr>
-            <a:lvl7pPr marL="2743200" indent="0">
+            <a:lvl7pPr marL="2057349" indent="0">
               <a:buNone/>
-              <a:defRPr sz="1400">
+              <a:defRPr sz="1050">
                 <a:solidFill>
                   <a:schemeClr val="tx1">
                     <a:tint val="75000"/>
@@ -1511,9 +1615,9 @@
                 </a:solidFill>
               </a:defRPr>
             </a:lvl7pPr>
-            <a:lvl8pPr marL="3200400" indent="0">
+            <a:lvl8pPr marL="2400240" indent="0">
               <a:buNone/>
-              <a:defRPr sz="1400">
+              <a:defRPr sz="1050">
                 <a:solidFill>
                   <a:schemeClr val="tx1">
                     <a:tint val="75000"/>
@@ -1521,9 +1625,9 @@
                 </a:solidFill>
               </a:defRPr>
             </a:lvl8pPr>
-            <a:lvl9pPr marL="3657600" indent="0">
+            <a:lvl9pPr marL="2743132" indent="0">
               <a:buNone/>
-              <a:defRPr sz="1400">
+              <a:defRPr sz="1050">
                 <a:solidFill>
                   <a:schemeClr val="tx1">
                     <a:tint val="75000"/>
@@ -1559,7 +1663,7 @@
             <a:fld id="{7B9B12EC-6AA0-374B-A2D3-850081A07A26}" type="datetimeFigureOut">
               <a:rPr kumimoji="1" lang="ja-JP" altLang="en-US" smtClean="0"/>
               <a:pPr/>
-              <a:t>2013/11/29</a:t>
+              <a:t>2016/2/5</a:t>
             </a:fld>
             <a:endParaRPr kumimoji="1" lang="ja-JP" altLang="en-US"/>
           </a:p>
@@ -1673,39 +1777,39 @@
         </p:nvSpPr>
         <p:spPr>
           <a:xfrm>
-            <a:off x="457200" y="1600200"/>
-            <a:ext cx="4038600" cy="4525963"/>
+            <a:off x="342900" y="2133602"/>
+            <a:ext cx="3028950" cy="6034617"/>
           </a:xfrm>
         </p:spPr>
         <p:txBody>
           <a:bodyPr/>
           <a:lstStyle>
             <a:lvl1pPr>
-              <a:defRPr sz="2800"/>
+              <a:defRPr sz="2100"/>
             </a:lvl1pPr>
             <a:lvl2pPr>
-              <a:defRPr sz="2400"/>
+              <a:defRPr sz="1800"/>
             </a:lvl2pPr>
             <a:lvl3pPr>
-              <a:defRPr sz="2000"/>
+              <a:defRPr sz="1500"/>
             </a:lvl3pPr>
             <a:lvl4pPr>
-              <a:defRPr sz="1800"/>
+              <a:defRPr sz="1350"/>
             </a:lvl4pPr>
             <a:lvl5pPr>
-              <a:defRPr sz="1800"/>
+              <a:defRPr sz="1350"/>
             </a:lvl5pPr>
             <a:lvl6pPr>
-              <a:defRPr sz="1800"/>
+              <a:defRPr sz="1350"/>
             </a:lvl6pPr>
             <a:lvl7pPr>
-              <a:defRPr sz="1800"/>
+              <a:defRPr sz="1350"/>
             </a:lvl7pPr>
             <a:lvl8pPr>
-              <a:defRPr sz="1800"/>
+              <a:defRPr sz="1350"/>
             </a:lvl8pPr>
             <a:lvl9pPr>
-              <a:defRPr sz="1800"/>
+              <a:defRPr sz="1350"/>
             </a:lvl9pPr>
           </a:lstStyle>
           <a:p>
@@ -1790,39 +1894,39 @@
         </p:nvSpPr>
         <p:spPr>
           <a:xfrm>
-            <a:off x="4648200" y="1600200"/>
-            <a:ext cx="4038600" cy="4525963"/>
+            <a:off x="3486150" y="2133602"/>
+            <a:ext cx="3028950" cy="6034617"/>
           </a:xfrm>
         </p:spPr>
         <p:txBody>
           <a:bodyPr/>
           <a:lstStyle>
             <a:lvl1pPr>
-              <a:defRPr sz="2800"/>
+              <a:defRPr sz="2100"/>
             </a:lvl1pPr>
             <a:lvl2pPr>
-              <a:defRPr sz="2400"/>
+              <a:defRPr sz="1800"/>
             </a:lvl2pPr>
             <a:lvl3pPr>
-              <a:defRPr sz="2000"/>
+              <a:defRPr sz="1500"/>
             </a:lvl3pPr>
             <a:lvl4pPr>
-              <a:defRPr sz="1800"/>
+              <a:defRPr sz="1350"/>
             </a:lvl4pPr>
             <a:lvl5pPr>
-              <a:defRPr sz="1800"/>
+              <a:defRPr sz="1350"/>
             </a:lvl5pPr>
             <a:lvl6pPr>
-              <a:defRPr sz="1800"/>
+              <a:defRPr sz="1350"/>
             </a:lvl6pPr>
             <a:lvl7pPr>
-              <a:defRPr sz="1800"/>
+              <a:defRPr sz="1350"/>
             </a:lvl7pPr>
             <a:lvl8pPr>
-              <a:defRPr sz="1800"/>
+              <a:defRPr sz="1350"/>
             </a:lvl8pPr>
             <a:lvl9pPr>
-              <a:defRPr sz="1800"/>
+              <a:defRPr sz="1350"/>
             </a:lvl9pPr>
           </a:lstStyle>
           <a:p>
@@ -1913,7 +2017,7 @@
             <a:fld id="{7B9B12EC-6AA0-374B-A2D3-850081A07A26}" type="datetimeFigureOut">
               <a:rPr kumimoji="1" lang="ja-JP" altLang="en-US" smtClean="0"/>
               <a:pPr/>
-              <a:t>2013/11/29</a:t>
+              <a:t>2016/2/5</a:t>
             </a:fld>
             <a:endParaRPr kumimoji="1" lang="ja-JP" altLang="en-US"/>
           </a:p>
@@ -2031,8 +2135,8 @@
         </p:nvSpPr>
         <p:spPr>
           <a:xfrm>
-            <a:off x="457200" y="1535113"/>
-            <a:ext cx="4040188" cy="639762"/>
+            <a:off x="342901" y="2046817"/>
+            <a:ext cx="3030141" cy="853016"/>
           </a:xfrm>
         </p:spPr>
         <p:txBody>
@@ -2040,39 +2144,39 @@
           <a:lstStyle>
             <a:lvl1pPr marL="0" indent="0">
               <a:buNone/>
-              <a:defRPr sz="2400" b="1"/>
+              <a:defRPr sz="1800" b="1"/>
             </a:lvl1pPr>
-            <a:lvl2pPr marL="457200" indent="0">
+            <a:lvl2pPr marL="342892" indent="0">
               <a:buNone/>
-              <a:defRPr sz="2000" b="1"/>
+              <a:defRPr sz="1500" b="1"/>
             </a:lvl2pPr>
-            <a:lvl3pPr marL="914400" indent="0">
+            <a:lvl3pPr marL="685784" indent="0">
               <a:buNone/>
-              <a:defRPr sz="1800" b="1"/>
+              <a:defRPr sz="1350" b="1"/>
             </a:lvl3pPr>
-            <a:lvl4pPr marL="1371600" indent="0">
+            <a:lvl4pPr marL="1028675" indent="0">
               <a:buNone/>
-              <a:defRPr sz="1600" b="1"/>
+              <a:defRPr sz="1200" b="1"/>
             </a:lvl4pPr>
-            <a:lvl5pPr marL="1828800" indent="0">
+            <a:lvl5pPr marL="1371566" indent="0">
               <a:buNone/>
-              <a:defRPr sz="1600" b="1"/>
+              <a:defRPr sz="1200" b="1"/>
             </a:lvl5pPr>
-            <a:lvl6pPr marL="2286000" indent="0">
+            <a:lvl6pPr marL="1714457" indent="0">
               <a:buNone/>
-              <a:defRPr sz="1600" b="1"/>
+              <a:defRPr sz="1200" b="1"/>
             </a:lvl6pPr>
-            <a:lvl7pPr marL="2743200" indent="0">
+            <a:lvl7pPr marL="2057349" indent="0">
               <a:buNone/>
-              <a:defRPr sz="1600" b="1"/>
+              <a:defRPr sz="1200" b="1"/>
             </a:lvl7pPr>
-            <a:lvl8pPr marL="3200400" indent="0">
+            <a:lvl8pPr marL="2400240" indent="0">
               <a:buNone/>
-              <a:defRPr sz="1600" b="1"/>
+              <a:defRPr sz="1200" b="1"/>
             </a:lvl8pPr>
-            <a:lvl9pPr marL="3657600" indent="0">
+            <a:lvl9pPr marL="2743132" indent="0">
               <a:buNone/>
-              <a:defRPr sz="1600" b="1"/>
+              <a:defRPr sz="1200" b="1"/>
             </a:lvl9pPr>
           </a:lstStyle>
           <a:p>
@@ -2096,39 +2200,39 @@
         </p:nvSpPr>
         <p:spPr>
           <a:xfrm>
-            <a:off x="457200" y="2174875"/>
-            <a:ext cx="4040188" cy="3951288"/>
+            <a:off x="342901" y="2899833"/>
+            <a:ext cx="3030141" cy="5268384"/>
           </a:xfrm>
         </p:spPr>
         <p:txBody>
           <a:bodyPr/>
           <a:lstStyle>
             <a:lvl1pPr>
-              <a:defRPr sz="2400"/>
+              <a:defRPr sz="1800"/>
             </a:lvl1pPr>
             <a:lvl2pPr>
-              <a:defRPr sz="2000"/>
+              <a:defRPr sz="1500"/>
             </a:lvl2pPr>
             <a:lvl3pPr>
-              <a:defRPr sz="1800"/>
+              <a:defRPr sz="1350"/>
             </a:lvl3pPr>
             <a:lvl4pPr>
-              <a:defRPr sz="1600"/>
+              <a:defRPr sz="1200"/>
             </a:lvl4pPr>
             <a:lvl5pPr>
-              <a:defRPr sz="1600"/>
+              <a:defRPr sz="1200"/>
             </a:lvl5pPr>
             <a:lvl6pPr>
-              <a:defRPr sz="1600"/>
+              <a:defRPr sz="1200"/>
             </a:lvl6pPr>
             <a:lvl7pPr>
-              <a:defRPr sz="1600"/>
+              <a:defRPr sz="1200"/>
             </a:lvl7pPr>
             <a:lvl8pPr>
-              <a:defRPr sz="1600"/>
+              <a:defRPr sz="1200"/>
             </a:lvl8pPr>
             <a:lvl9pPr>
-              <a:defRPr sz="1600"/>
+              <a:defRPr sz="1200"/>
             </a:lvl9pPr>
           </a:lstStyle>
           <a:p>
@@ -2213,8 +2317,8 @@
         </p:nvSpPr>
         <p:spPr>
           <a:xfrm>
-            <a:off x="4645025" y="1535113"/>
-            <a:ext cx="4041775" cy="639762"/>
+            <a:off x="3483770" y="2046817"/>
+            <a:ext cx="3031331" cy="853016"/>
           </a:xfrm>
         </p:spPr>
         <p:txBody>
@@ -2222,39 +2326,39 @@
           <a:lstStyle>
             <a:lvl1pPr marL="0" indent="0">
               <a:buNone/>
-              <a:defRPr sz="2400" b="1"/>
+              <a:defRPr sz="1800" b="1"/>
             </a:lvl1pPr>
-            <a:lvl2pPr marL="457200" indent="0">
+            <a:lvl2pPr marL="342892" indent="0">
               <a:buNone/>
-              <a:defRPr sz="2000" b="1"/>
+              <a:defRPr sz="1500" b="1"/>
             </a:lvl2pPr>
-            <a:lvl3pPr marL="914400" indent="0">
+            <a:lvl3pPr marL="685784" indent="0">
               <a:buNone/>
-              <a:defRPr sz="1800" b="1"/>
+              <a:defRPr sz="1350" b="1"/>
             </a:lvl3pPr>
-            <a:lvl4pPr marL="1371600" indent="0">
+            <a:lvl4pPr marL="1028675" indent="0">
               <a:buNone/>
-              <a:defRPr sz="1600" b="1"/>
+              <a:defRPr sz="1200" b="1"/>
             </a:lvl4pPr>
-            <a:lvl5pPr marL="1828800" indent="0">
+            <a:lvl5pPr marL="1371566" indent="0">
               <a:buNone/>
-              <a:defRPr sz="1600" b="1"/>
+              <a:defRPr sz="1200" b="1"/>
             </a:lvl5pPr>
-            <a:lvl6pPr marL="2286000" indent="0">
+            <a:lvl6pPr marL="1714457" indent="0">
               <a:buNone/>
-              <a:defRPr sz="1600" b="1"/>
+              <a:defRPr sz="1200" b="1"/>
             </a:lvl6pPr>
-            <a:lvl7pPr marL="2743200" indent="0">
+            <a:lvl7pPr marL="2057349" indent="0">
               <a:buNone/>
-              <a:defRPr sz="1600" b="1"/>
+              <a:defRPr sz="1200" b="1"/>
             </a:lvl7pPr>
-            <a:lvl8pPr marL="3200400" indent="0">
+            <a:lvl8pPr marL="2400240" indent="0">
               <a:buNone/>
-              <a:defRPr sz="1600" b="1"/>
+              <a:defRPr sz="1200" b="1"/>
             </a:lvl8pPr>
-            <a:lvl9pPr marL="3657600" indent="0">
+            <a:lvl9pPr marL="2743132" indent="0">
               <a:buNone/>
-              <a:defRPr sz="1600" b="1"/>
+              <a:defRPr sz="1200" b="1"/>
             </a:lvl9pPr>
           </a:lstStyle>
           <a:p>
@@ -2278,39 +2382,39 @@
         </p:nvSpPr>
         <p:spPr>
           <a:xfrm>
-            <a:off x="4645025" y="2174875"/>
-            <a:ext cx="4041775" cy="3951288"/>
+            <a:off x="3483770" y="2899833"/>
+            <a:ext cx="3031331" cy="5268384"/>
           </a:xfrm>
         </p:spPr>
         <p:txBody>
           <a:bodyPr/>
           <a:lstStyle>
             <a:lvl1pPr>
-              <a:defRPr sz="2400"/>
+              <a:defRPr sz="1800"/>
             </a:lvl1pPr>
             <a:lvl2pPr>
-              <a:defRPr sz="2000"/>
+              <a:defRPr sz="1500"/>
             </a:lvl2pPr>
             <a:lvl3pPr>
-              <a:defRPr sz="1800"/>
+              <a:defRPr sz="1350"/>
             </a:lvl3pPr>
             <a:lvl4pPr>
-              <a:defRPr sz="1600"/>
+              <a:defRPr sz="1200"/>
             </a:lvl4pPr>
             <a:lvl5pPr>
-              <a:defRPr sz="1600"/>
+              <a:defRPr sz="1200"/>
             </a:lvl5pPr>
             <a:lvl6pPr>
-              <a:defRPr sz="1600"/>
+              <a:defRPr sz="1200"/>
             </a:lvl6pPr>
             <a:lvl7pPr>
-              <a:defRPr sz="1600"/>
+              <a:defRPr sz="1200"/>
             </a:lvl7pPr>
             <a:lvl8pPr>
-              <a:defRPr sz="1600"/>
+              <a:defRPr sz="1200"/>
             </a:lvl8pPr>
             <a:lvl9pPr>
-              <a:defRPr sz="1600"/>
+              <a:defRPr sz="1200"/>
             </a:lvl9pPr>
           </a:lstStyle>
           <a:p>
@@ -2401,7 +2505,7 @@
             <a:fld id="{7B9B12EC-6AA0-374B-A2D3-850081A07A26}" type="datetimeFigureOut">
               <a:rPr kumimoji="1" lang="ja-JP" altLang="en-US" smtClean="0"/>
               <a:pPr/>
-              <a:t>2013/11/29</a:t>
+              <a:t>2016/2/5</a:t>
             </a:fld>
             <a:endParaRPr kumimoji="1" lang="ja-JP" altLang="en-US"/>
           </a:p>
@@ -2521,7 +2625,7 @@
             <a:fld id="{7B9B12EC-6AA0-374B-A2D3-850081A07A26}" type="datetimeFigureOut">
               <a:rPr kumimoji="1" lang="ja-JP" altLang="en-US" smtClean="0"/>
               <a:pPr/>
-              <a:t>2013/11/29</a:t>
+              <a:t>2016/2/5</a:t>
             </a:fld>
             <a:endParaRPr kumimoji="1" lang="ja-JP" altLang="en-US"/>
           </a:p>
@@ -2618,7 +2722,7 @@
             <a:fld id="{7B9B12EC-6AA0-374B-A2D3-850081A07A26}" type="datetimeFigureOut">
               <a:rPr kumimoji="1" lang="ja-JP" altLang="en-US" smtClean="0"/>
               <a:pPr/>
-              <a:t>2013/11/29</a:t>
+              <a:t>2016/2/5</a:t>
             </a:fld>
             <a:endParaRPr kumimoji="1" lang="ja-JP" altLang="en-US"/>
           </a:p>
@@ -2709,15 +2813,15 @@
         </p:nvSpPr>
         <p:spPr>
           <a:xfrm>
-            <a:off x="457200" y="273050"/>
-            <a:ext cx="3008313" cy="1162050"/>
+            <a:off x="342901" y="364067"/>
+            <a:ext cx="2256235" cy="1549400"/>
           </a:xfrm>
         </p:spPr>
         <p:txBody>
           <a:bodyPr anchor="b"/>
           <a:lstStyle>
             <a:lvl1pPr algn="l">
-              <a:defRPr sz="2000" b="1"/>
+              <a:defRPr sz="1500" b="1"/>
             </a:lvl1pPr>
           </a:lstStyle>
           <a:p>
@@ -2741,39 +2845,39 @@
         </p:nvSpPr>
         <p:spPr>
           <a:xfrm>
-            <a:off x="3575050" y="273050"/>
-            <a:ext cx="5111750" cy="5853113"/>
+            <a:off x="2681288" y="364069"/>
+            <a:ext cx="3833813" cy="7804151"/>
           </a:xfrm>
         </p:spPr>
         <p:txBody>
           <a:bodyPr/>
           <a:lstStyle>
             <a:lvl1pPr>
-              <a:defRPr sz="3200"/>
+              <a:defRPr sz="2400"/>
             </a:lvl1pPr>
             <a:lvl2pPr>
-              <a:defRPr sz="2800"/>
+              <a:defRPr sz="2100"/>
             </a:lvl2pPr>
             <a:lvl3pPr>
-              <a:defRPr sz="2400"/>
+              <a:defRPr sz="1800"/>
             </a:lvl3pPr>
             <a:lvl4pPr>
-              <a:defRPr sz="2000"/>
+              <a:defRPr sz="1500"/>
             </a:lvl4pPr>
             <a:lvl5pPr>
-              <a:defRPr sz="2000"/>
+              <a:defRPr sz="1500"/>
             </a:lvl5pPr>
             <a:lvl6pPr>
-              <a:defRPr sz="2000"/>
+              <a:defRPr sz="1500"/>
             </a:lvl6pPr>
             <a:lvl7pPr>
-              <a:defRPr sz="2000"/>
+              <a:defRPr sz="1500"/>
             </a:lvl7pPr>
             <a:lvl8pPr>
-              <a:defRPr sz="2000"/>
+              <a:defRPr sz="1500"/>
             </a:lvl8pPr>
             <a:lvl9pPr>
-              <a:defRPr sz="2000"/>
+              <a:defRPr sz="1500"/>
             </a:lvl9pPr>
           </a:lstStyle>
           <a:p>
@@ -2858,8 +2962,8 @@
         </p:nvSpPr>
         <p:spPr>
           <a:xfrm>
-            <a:off x="457200" y="1435100"/>
-            <a:ext cx="3008313" cy="4691063"/>
+            <a:off x="342901" y="1913469"/>
+            <a:ext cx="2256235" cy="6254751"/>
           </a:xfrm>
         </p:spPr>
         <p:txBody>
@@ -2867,39 +2971,39 @@
           <a:lstStyle>
             <a:lvl1pPr marL="0" indent="0">
               <a:buNone/>
-              <a:defRPr sz="1400"/>
+              <a:defRPr sz="1050"/>
             </a:lvl1pPr>
-            <a:lvl2pPr marL="457200" indent="0">
-              <a:buNone/>
-              <a:defRPr sz="1200"/>
-            </a:lvl2pPr>
-            <a:lvl3pPr marL="914400" indent="0">
-              <a:buNone/>
-              <a:defRPr sz="1000"/>
-            </a:lvl3pPr>
-            <a:lvl4pPr marL="1371600" indent="0">
+            <a:lvl2pPr marL="342892" indent="0">
               <a:buNone/>
               <a:defRPr sz="900"/>
+            </a:lvl2pPr>
+            <a:lvl3pPr marL="685784" indent="0">
+              <a:buNone/>
+              <a:defRPr sz="750"/>
+            </a:lvl3pPr>
+            <a:lvl4pPr marL="1028675" indent="0">
+              <a:buNone/>
+              <a:defRPr sz="675"/>
             </a:lvl4pPr>
-            <a:lvl5pPr marL="1828800" indent="0">
+            <a:lvl5pPr marL="1371566" indent="0">
               <a:buNone/>
-              <a:defRPr sz="900"/>
+              <a:defRPr sz="675"/>
             </a:lvl5pPr>
-            <a:lvl6pPr marL="2286000" indent="0">
+            <a:lvl6pPr marL="1714457" indent="0">
               <a:buNone/>
-              <a:defRPr sz="900"/>
+              <a:defRPr sz="675"/>
             </a:lvl6pPr>
-            <a:lvl7pPr marL="2743200" indent="0">
+            <a:lvl7pPr marL="2057349" indent="0">
               <a:buNone/>
-              <a:defRPr sz="900"/>
+              <a:defRPr sz="675"/>
             </a:lvl7pPr>
-            <a:lvl8pPr marL="3200400" indent="0">
+            <a:lvl8pPr marL="2400240" indent="0">
               <a:buNone/>
-              <a:defRPr sz="900"/>
+              <a:defRPr sz="675"/>
             </a:lvl8pPr>
-            <a:lvl9pPr marL="3657600" indent="0">
+            <a:lvl9pPr marL="2743132" indent="0">
               <a:buNone/>
-              <a:defRPr sz="900"/>
+              <a:defRPr sz="675"/>
             </a:lvl9pPr>
           </a:lstStyle>
           <a:p>
@@ -2929,7 +3033,7 @@
             <a:fld id="{7B9B12EC-6AA0-374B-A2D3-850081A07A26}" type="datetimeFigureOut">
               <a:rPr kumimoji="1" lang="ja-JP" altLang="en-US" smtClean="0"/>
               <a:pPr/>
-              <a:t>2013/11/29</a:t>
+              <a:t>2016/2/5</a:t>
             </a:fld>
             <a:endParaRPr kumimoji="1" lang="ja-JP" altLang="en-US"/>
           </a:p>
@@ -3020,15 +3124,15 @@
         </p:nvSpPr>
         <p:spPr>
           <a:xfrm>
-            <a:off x="1792288" y="4800600"/>
-            <a:ext cx="5486400" cy="566738"/>
+            <a:off x="1344216" y="6400801"/>
+            <a:ext cx="4114800" cy="755651"/>
           </a:xfrm>
         </p:spPr>
         <p:txBody>
           <a:bodyPr anchor="b"/>
           <a:lstStyle>
             <a:lvl1pPr algn="l">
-              <a:defRPr sz="2000" b="1"/>
+              <a:defRPr sz="1500" b="1"/>
             </a:lvl1pPr>
           </a:lstStyle>
           <a:p>
@@ -3052,8 +3156,8 @@
         </p:nvSpPr>
         <p:spPr>
           <a:xfrm>
-            <a:off x="1792288" y="612775"/>
-            <a:ext cx="5486400" cy="4114800"/>
+            <a:off x="1344216" y="817033"/>
+            <a:ext cx="4114800" cy="5486400"/>
           </a:xfrm>
         </p:spPr>
         <p:txBody>
@@ -3061,39 +3165,39 @@
           <a:lstStyle>
             <a:lvl1pPr marL="0" indent="0">
               <a:buNone/>
-              <a:defRPr sz="3200"/>
+              <a:defRPr sz="2400"/>
             </a:lvl1pPr>
-            <a:lvl2pPr marL="457200" indent="0">
+            <a:lvl2pPr marL="342892" indent="0">
               <a:buNone/>
-              <a:defRPr sz="2800"/>
+              <a:defRPr sz="2100"/>
             </a:lvl2pPr>
-            <a:lvl3pPr marL="914400" indent="0">
+            <a:lvl3pPr marL="685784" indent="0">
               <a:buNone/>
-              <a:defRPr sz="2400"/>
+              <a:defRPr sz="1800"/>
             </a:lvl3pPr>
-            <a:lvl4pPr marL="1371600" indent="0">
+            <a:lvl4pPr marL="1028675" indent="0">
               <a:buNone/>
-              <a:defRPr sz="2000"/>
+              <a:defRPr sz="1500"/>
             </a:lvl4pPr>
-            <a:lvl5pPr marL="1828800" indent="0">
+            <a:lvl5pPr marL="1371566" indent="0">
               <a:buNone/>
-              <a:defRPr sz="2000"/>
+              <a:defRPr sz="1500"/>
             </a:lvl5pPr>
-            <a:lvl6pPr marL="2286000" indent="0">
+            <a:lvl6pPr marL="1714457" indent="0">
               <a:buNone/>
-              <a:defRPr sz="2000"/>
+              <a:defRPr sz="1500"/>
             </a:lvl6pPr>
-            <a:lvl7pPr marL="2743200" indent="0">
+            <a:lvl7pPr marL="2057349" indent="0">
               <a:buNone/>
-              <a:defRPr sz="2000"/>
+              <a:defRPr sz="1500"/>
             </a:lvl7pPr>
-            <a:lvl8pPr marL="3200400" indent="0">
+            <a:lvl8pPr marL="2400240" indent="0">
               <a:buNone/>
-              <a:defRPr sz="2000"/>
+              <a:defRPr sz="1500"/>
             </a:lvl8pPr>
-            <a:lvl9pPr marL="3657600" indent="0">
+            <a:lvl9pPr marL="2743132" indent="0">
               <a:buNone/>
-              <a:defRPr sz="2000"/>
+              <a:defRPr sz="1500"/>
             </a:lvl9pPr>
           </a:lstStyle>
           <a:p>
@@ -3113,8 +3217,8 @@
         </p:nvSpPr>
         <p:spPr>
           <a:xfrm>
-            <a:off x="1792288" y="5367338"/>
-            <a:ext cx="5486400" cy="804862"/>
+            <a:off x="1344216" y="7156452"/>
+            <a:ext cx="4114800" cy="1073149"/>
           </a:xfrm>
         </p:spPr>
         <p:txBody>
@@ -3122,39 +3226,39 @@
           <a:lstStyle>
             <a:lvl1pPr marL="0" indent="0">
               <a:buNone/>
-              <a:defRPr sz="1400"/>
+              <a:defRPr sz="1050"/>
             </a:lvl1pPr>
-            <a:lvl2pPr marL="457200" indent="0">
-              <a:buNone/>
-              <a:defRPr sz="1200"/>
-            </a:lvl2pPr>
-            <a:lvl3pPr marL="914400" indent="0">
-              <a:buNone/>
-              <a:defRPr sz="1000"/>
-            </a:lvl3pPr>
-            <a:lvl4pPr marL="1371600" indent="0">
+            <a:lvl2pPr marL="342892" indent="0">
               <a:buNone/>
               <a:defRPr sz="900"/>
+            </a:lvl2pPr>
+            <a:lvl3pPr marL="685784" indent="0">
+              <a:buNone/>
+              <a:defRPr sz="750"/>
+            </a:lvl3pPr>
+            <a:lvl4pPr marL="1028675" indent="0">
+              <a:buNone/>
+              <a:defRPr sz="675"/>
             </a:lvl4pPr>
-            <a:lvl5pPr marL="1828800" indent="0">
+            <a:lvl5pPr marL="1371566" indent="0">
               <a:buNone/>
-              <a:defRPr sz="900"/>
+              <a:defRPr sz="675"/>
             </a:lvl5pPr>
-            <a:lvl6pPr marL="2286000" indent="0">
+            <a:lvl6pPr marL="1714457" indent="0">
               <a:buNone/>
-              <a:defRPr sz="900"/>
+              <a:defRPr sz="675"/>
             </a:lvl6pPr>
-            <a:lvl7pPr marL="2743200" indent="0">
+            <a:lvl7pPr marL="2057349" indent="0">
               <a:buNone/>
-              <a:defRPr sz="900"/>
+              <a:defRPr sz="675"/>
             </a:lvl7pPr>
-            <a:lvl8pPr marL="3200400" indent="0">
+            <a:lvl8pPr marL="2400240" indent="0">
               <a:buNone/>
-              <a:defRPr sz="900"/>
+              <a:defRPr sz="675"/>
             </a:lvl8pPr>
-            <a:lvl9pPr marL="3657600" indent="0">
+            <a:lvl9pPr marL="2743132" indent="0">
               <a:buNone/>
-              <a:defRPr sz="900"/>
+              <a:defRPr sz="675"/>
             </a:lvl9pPr>
           </a:lstStyle>
           <a:p>
@@ -3184,7 +3288,7 @@
             <a:fld id="{7B9B12EC-6AA0-374B-A2D3-850081A07A26}" type="datetimeFigureOut">
               <a:rPr kumimoji="1" lang="ja-JP" altLang="en-US" smtClean="0"/>
               <a:pPr/>
-              <a:t>2013/11/29</a:t>
+              <a:t>2016/2/5</a:t>
             </a:fld>
             <a:endParaRPr kumimoji="1" lang="ja-JP" altLang="en-US"/>
           </a:p>
@@ -3280,8 +3384,8 @@
         </p:nvSpPr>
         <p:spPr>
           <a:xfrm>
-            <a:off x="457200" y="274638"/>
-            <a:ext cx="8229600" cy="1143000"/>
+            <a:off x="342900" y="366184"/>
+            <a:ext cx="6172200" cy="1524000"/>
           </a:xfrm>
           <a:prstGeom prst="rect">
             <a:avLst/>
@@ -3313,8 +3417,8 @@
         </p:nvSpPr>
         <p:spPr>
           <a:xfrm>
-            <a:off x="457200" y="1600200"/>
-            <a:ext cx="8229600" cy="4525963"/>
+            <a:off x="342900" y="2133602"/>
+            <a:ext cx="6172200" cy="6034617"/>
           </a:xfrm>
           <a:prstGeom prst="rect">
             <a:avLst/>
@@ -3407,8 +3511,8 @@
         </p:nvSpPr>
         <p:spPr>
           <a:xfrm>
-            <a:off x="457200" y="6356350"/>
-            <a:ext cx="2133600" cy="365125"/>
+            <a:off x="342900" y="8475136"/>
+            <a:ext cx="1600200" cy="486833"/>
           </a:xfrm>
           <a:prstGeom prst="rect">
             <a:avLst/>
@@ -3418,7 +3522,7 @@
           <a:bodyPr vert="horz" lIns="91440" tIns="45720" rIns="91440" bIns="45720" rtlCol="0" anchor="ctr"/>
           <a:lstStyle>
             <a:lvl1pPr algn="l">
-              <a:defRPr sz="1200">
+              <a:defRPr sz="900">
                 <a:solidFill>
                   <a:schemeClr val="tx1">
                     <a:tint val="75000"/>
@@ -3431,7 +3535,7 @@
             <a:fld id="{7B9B12EC-6AA0-374B-A2D3-850081A07A26}" type="datetimeFigureOut">
               <a:rPr kumimoji="1" lang="ja-JP" altLang="en-US" smtClean="0"/>
               <a:pPr/>
-              <a:t>2013/11/29</a:t>
+              <a:t>2016/2/5</a:t>
             </a:fld>
             <a:endParaRPr kumimoji="1" lang="ja-JP" altLang="en-US"/>
           </a:p>
@@ -3449,8 +3553,8 @@
         </p:nvSpPr>
         <p:spPr>
           <a:xfrm>
-            <a:off x="3124200" y="6356350"/>
-            <a:ext cx="2895600" cy="365125"/>
+            <a:off x="2343150" y="8475136"/>
+            <a:ext cx="2171700" cy="486833"/>
           </a:xfrm>
           <a:prstGeom prst="rect">
             <a:avLst/>
@@ -3460,7 +3564,7 @@
           <a:bodyPr vert="horz" lIns="91440" tIns="45720" rIns="91440" bIns="45720" rtlCol="0" anchor="ctr"/>
           <a:lstStyle>
             <a:lvl1pPr algn="ctr">
-              <a:defRPr sz="1200">
+              <a:defRPr sz="900">
                 <a:solidFill>
                   <a:schemeClr val="tx1">
                     <a:tint val="75000"/>
@@ -3486,8 +3590,8 @@
         </p:nvSpPr>
         <p:spPr>
           <a:xfrm>
-            <a:off x="6553200" y="6356350"/>
-            <a:ext cx="2133600" cy="365125"/>
+            <a:off x="4914900" y="8475136"/>
+            <a:ext cx="1600200" cy="486833"/>
           </a:xfrm>
           <a:prstGeom prst="rect">
             <a:avLst/>
@@ -3497,7 +3601,7 @@
           <a:bodyPr vert="horz" lIns="91440" tIns="45720" rIns="91440" bIns="45720" rtlCol="0" anchor="ctr"/>
           <a:lstStyle>
             <a:lvl1pPr algn="r">
-              <a:defRPr sz="1200">
+              <a:defRPr sz="900">
                 <a:solidFill>
                   <a:schemeClr val="tx1">
                     <a:tint val="75000"/>
@@ -3539,12 +3643,12 @@
   </p:sldLayoutIdLst>
   <p:txStyles>
     <p:titleStyle>
-      <a:lvl1pPr algn="ctr" defTabSz="457200" rtl="0" eaLnBrk="1" latinLnBrk="0" hangingPunct="1">
+      <a:lvl1pPr algn="ctr" defTabSz="342892" rtl="0" eaLnBrk="1" latinLnBrk="0" hangingPunct="1">
         <a:spcBef>
           <a:spcPct val="0"/>
         </a:spcBef>
         <a:buNone/>
-        <a:defRPr kumimoji="1" sz="4400" kern="1200">
+        <a:defRPr kumimoji="1" sz="3300" kern="1200">
           <a:solidFill>
             <a:schemeClr val="tx1"/>
           </a:solidFill>
@@ -3555,37 +3659,7 @@
       </a:lvl1pPr>
     </p:titleStyle>
     <p:bodyStyle>
-      <a:lvl1pPr marL="342900" indent="-342900" algn="l" defTabSz="457200" rtl="0" eaLnBrk="1" latinLnBrk="0" hangingPunct="1">
-        <a:spcBef>
-          <a:spcPct val="20000"/>
-        </a:spcBef>
-        <a:buFont typeface="Arial"/>
-        <a:buChar char="•"/>
-        <a:defRPr kumimoji="1" sz="3200" kern="1200">
-          <a:solidFill>
-            <a:schemeClr val="tx1"/>
-          </a:solidFill>
-          <a:latin typeface="+mn-lt"/>
-          <a:ea typeface="+mn-ea"/>
-          <a:cs typeface="+mn-cs"/>
-        </a:defRPr>
-      </a:lvl1pPr>
-      <a:lvl2pPr marL="742950" indent="-285750" algn="l" defTabSz="457200" rtl="0" eaLnBrk="1" latinLnBrk="0" hangingPunct="1">
-        <a:spcBef>
-          <a:spcPct val="20000"/>
-        </a:spcBef>
-        <a:buFont typeface="Arial"/>
-        <a:buChar char="–"/>
-        <a:defRPr kumimoji="1" sz="2800" kern="1200">
-          <a:solidFill>
-            <a:schemeClr val="tx1"/>
-          </a:solidFill>
-          <a:latin typeface="+mn-lt"/>
-          <a:ea typeface="+mn-ea"/>
-          <a:cs typeface="+mn-cs"/>
-        </a:defRPr>
-      </a:lvl2pPr>
-      <a:lvl3pPr marL="1143000" indent="-228600" algn="l" defTabSz="457200" rtl="0" eaLnBrk="1" latinLnBrk="0" hangingPunct="1">
+      <a:lvl1pPr marL="257169" indent="-257169" algn="l" defTabSz="342892" rtl="0" eaLnBrk="1" latinLnBrk="0" hangingPunct="1">
         <a:spcBef>
           <a:spcPct val="20000"/>
         </a:spcBef>
@@ -3599,14 +3673,44 @@
           <a:ea typeface="+mn-ea"/>
           <a:cs typeface="+mn-cs"/>
         </a:defRPr>
-      </a:lvl3pPr>
-      <a:lvl4pPr marL="1600200" indent="-228600" algn="l" defTabSz="457200" rtl="0" eaLnBrk="1" latinLnBrk="0" hangingPunct="1">
+      </a:lvl1pPr>
+      <a:lvl2pPr marL="557198" indent="-214307" algn="l" defTabSz="342892" rtl="0" eaLnBrk="1" latinLnBrk="0" hangingPunct="1">
         <a:spcBef>
           <a:spcPct val="20000"/>
         </a:spcBef>
         <a:buFont typeface="Arial"/>
         <a:buChar char="–"/>
-        <a:defRPr kumimoji="1" sz="2000" kern="1200">
+        <a:defRPr kumimoji="1" sz="2100" kern="1200">
+          <a:solidFill>
+            <a:schemeClr val="tx1"/>
+          </a:solidFill>
+          <a:latin typeface="+mn-lt"/>
+          <a:ea typeface="+mn-ea"/>
+          <a:cs typeface="+mn-cs"/>
+        </a:defRPr>
+      </a:lvl2pPr>
+      <a:lvl3pPr marL="857229" indent="-171446" algn="l" defTabSz="342892" rtl="0" eaLnBrk="1" latinLnBrk="0" hangingPunct="1">
+        <a:spcBef>
+          <a:spcPct val="20000"/>
+        </a:spcBef>
+        <a:buFont typeface="Arial"/>
+        <a:buChar char="•"/>
+        <a:defRPr kumimoji="1" sz="1800" kern="1200">
+          <a:solidFill>
+            <a:schemeClr val="tx1"/>
+          </a:solidFill>
+          <a:latin typeface="+mn-lt"/>
+          <a:ea typeface="+mn-ea"/>
+          <a:cs typeface="+mn-cs"/>
+        </a:defRPr>
+      </a:lvl3pPr>
+      <a:lvl4pPr marL="1200120" indent="-171446" algn="l" defTabSz="342892" rtl="0" eaLnBrk="1" latinLnBrk="0" hangingPunct="1">
+        <a:spcBef>
+          <a:spcPct val="20000"/>
+        </a:spcBef>
+        <a:buFont typeface="Arial"/>
+        <a:buChar char="–"/>
+        <a:defRPr kumimoji="1" sz="1500" kern="1200">
           <a:solidFill>
             <a:schemeClr val="tx1"/>
           </a:solidFill>
@@ -3615,13 +3719,13 @@
           <a:cs typeface="+mn-cs"/>
         </a:defRPr>
       </a:lvl4pPr>
-      <a:lvl5pPr marL="2057400" indent="-228600" algn="l" defTabSz="457200" rtl="0" eaLnBrk="1" latinLnBrk="0" hangingPunct="1">
+      <a:lvl5pPr marL="1543011" indent="-171446" algn="l" defTabSz="342892" rtl="0" eaLnBrk="1" latinLnBrk="0" hangingPunct="1">
         <a:spcBef>
           <a:spcPct val="20000"/>
         </a:spcBef>
         <a:buFont typeface="Arial"/>
         <a:buChar char="»"/>
-        <a:defRPr kumimoji="1" sz="2000" kern="1200">
+        <a:defRPr kumimoji="1" sz="1500" kern="1200">
           <a:solidFill>
             <a:schemeClr val="tx1"/>
           </a:solidFill>
@@ -3630,13 +3734,13 @@
           <a:cs typeface="+mn-cs"/>
         </a:defRPr>
       </a:lvl5pPr>
-      <a:lvl6pPr marL="2514600" indent="-228600" algn="l" defTabSz="457200" rtl="0" eaLnBrk="1" latinLnBrk="0" hangingPunct="1">
+      <a:lvl6pPr marL="1885903" indent="-171446" algn="l" defTabSz="342892" rtl="0" eaLnBrk="1" latinLnBrk="0" hangingPunct="1">
         <a:spcBef>
           <a:spcPct val="20000"/>
         </a:spcBef>
         <a:buFont typeface="Arial"/>
         <a:buChar char="•"/>
-        <a:defRPr kumimoji="1" sz="2000" kern="1200">
+        <a:defRPr kumimoji="1" sz="1500" kern="1200">
           <a:solidFill>
             <a:schemeClr val="tx1"/>
           </a:solidFill>
@@ -3645,13 +3749,13 @@
           <a:cs typeface="+mn-cs"/>
         </a:defRPr>
       </a:lvl6pPr>
-      <a:lvl7pPr marL="2971800" indent="-228600" algn="l" defTabSz="457200" rtl="0" eaLnBrk="1" latinLnBrk="0" hangingPunct="1">
+      <a:lvl7pPr marL="2228795" indent="-171446" algn="l" defTabSz="342892" rtl="0" eaLnBrk="1" latinLnBrk="0" hangingPunct="1">
         <a:spcBef>
           <a:spcPct val="20000"/>
         </a:spcBef>
         <a:buFont typeface="Arial"/>
         <a:buChar char="•"/>
-        <a:defRPr kumimoji="1" sz="2000" kern="1200">
+        <a:defRPr kumimoji="1" sz="1500" kern="1200">
           <a:solidFill>
             <a:schemeClr val="tx1"/>
           </a:solidFill>
@@ -3660,13 +3764,13 @@
           <a:cs typeface="+mn-cs"/>
         </a:defRPr>
       </a:lvl7pPr>
-      <a:lvl8pPr marL="3429000" indent="-228600" algn="l" defTabSz="457200" rtl="0" eaLnBrk="1" latinLnBrk="0" hangingPunct="1">
+      <a:lvl8pPr marL="2571686" indent="-171446" algn="l" defTabSz="342892" rtl="0" eaLnBrk="1" latinLnBrk="0" hangingPunct="1">
         <a:spcBef>
           <a:spcPct val="20000"/>
         </a:spcBef>
         <a:buFont typeface="Arial"/>
         <a:buChar char="•"/>
-        <a:defRPr kumimoji="1" sz="2000" kern="1200">
+        <a:defRPr kumimoji="1" sz="1500" kern="1200">
           <a:solidFill>
             <a:schemeClr val="tx1"/>
           </a:solidFill>
@@ -3675,13 +3779,13 @@
           <a:cs typeface="+mn-cs"/>
         </a:defRPr>
       </a:lvl8pPr>
-      <a:lvl9pPr marL="3886200" indent="-228600" algn="l" defTabSz="457200" rtl="0" eaLnBrk="1" latinLnBrk="0" hangingPunct="1">
+      <a:lvl9pPr marL="2914577" indent="-171446" algn="l" defTabSz="342892" rtl="0" eaLnBrk="1" latinLnBrk="0" hangingPunct="1">
         <a:spcBef>
           <a:spcPct val="20000"/>
         </a:spcBef>
         <a:buFont typeface="Arial"/>
         <a:buChar char="•"/>
-        <a:defRPr kumimoji="1" sz="2000" kern="1200">
+        <a:defRPr kumimoji="1" sz="1500" kern="1200">
           <a:solidFill>
             <a:schemeClr val="tx1"/>
           </a:solidFill>
@@ -3695,8 +3799,8 @@
       <a:defPPr>
         <a:defRPr lang="ja-JP"/>
       </a:defPPr>
-      <a:lvl1pPr marL="0" algn="l" defTabSz="457200" rtl="0" eaLnBrk="1" latinLnBrk="0" hangingPunct="1">
-        <a:defRPr kumimoji="1" sz="1800" kern="1200">
+      <a:lvl1pPr marL="0" algn="l" defTabSz="342892" rtl="0" eaLnBrk="1" latinLnBrk="0" hangingPunct="1">
+        <a:defRPr kumimoji="1" sz="1350" kern="1200">
           <a:solidFill>
             <a:schemeClr val="tx1"/>
           </a:solidFill>
@@ -3705,8 +3809,8 @@
           <a:cs typeface="+mn-cs"/>
         </a:defRPr>
       </a:lvl1pPr>
-      <a:lvl2pPr marL="457200" algn="l" defTabSz="457200" rtl="0" eaLnBrk="1" latinLnBrk="0" hangingPunct="1">
-        <a:defRPr kumimoji="1" sz="1800" kern="1200">
+      <a:lvl2pPr marL="342892" algn="l" defTabSz="342892" rtl="0" eaLnBrk="1" latinLnBrk="0" hangingPunct="1">
+        <a:defRPr kumimoji="1" sz="1350" kern="1200">
           <a:solidFill>
             <a:schemeClr val="tx1"/>
           </a:solidFill>
@@ -3715,8 +3819,8 @@
           <a:cs typeface="+mn-cs"/>
         </a:defRPr>
       </a:lvl2pPr>
-      <a:lvl3pPr marL="914400" algn="l" defTabSz="457200" rtl="0" eaLnBrk="1" latinLnBrk="0" hangingPunct="1">
-        <a:defRPr kumimoji="1" sz="1800" kern="1200">
+      <a:lvl3pPr marL="685784" algn="l" defTabSz="342892" rtl="0" eaLnBrk="1" latinLnBrk="0" hangingPunct="1">
+        <a:defRPr kumimoji="1" sz="1350" kern="1200">
           <a:solidFill>
             <a:schemeClr val="tx1"/>
           </a:solidFill>
@@ -3725,8 +3829,8 @@
           <a:cs typeface="+mn-cs"/>
         </a:defRPr>
       </a:lvl3pPr>
-      <a:lvl4pPr marL="1371600" algn="l" defTabSz="457200" rtl="0" eaLnBrk="1" latinLnBrk="0" hangingPunct="1">
-        <a:defRPr kumimoji="1" sz="1800" kern="1200">
+      <a:lvl4pPr marL="1028675" algn="l" defTabSz="342892" rtl="0" eaLnBrk="1" latinLnBrk="0" hangingPunct="1">
+        <a:defRPr kumimoji="1" sz="1350" kern="1200">
           <a:solidFill>
             <a:schemeClr val="tx1"/>
           </a:solidFill>
@@ -3735,8 +3839,8 @@
           <a:cs typeface="+mn-cs"/>
         </a:defRPr>
       </a:lvl4pPr>
-      <a:lvl5pPr marL="1828800" algn="l" defTabSz="457200" rtl="0" eaLnBrk="1" latinLnBrk="0" hangingPunct="1">
-        <a:defRPr kumimoji="1" sz="1800" kern="1200">
+      <a:lvl5pPr marL="1371566" algn="l" defTabSz="342892" rtl="0" eaLnBrk="1" latinLnBrk="0" hangingPunct="1">
+        <a:defRPr kumimoji="1" sz="1350" kern="1200">
           <a:solidFill>
             <a:schemeClr val="tx1"/>
           </a:solidFill>
@@ -3745,8 +3849,8 @@
           <a:cs typeface="+mn-cs"/>
         </a:defRPr>
       </a:lvl5pPr>
-      <a:lvl6pPr marL="2286000" algn="l" defTabSz="457200" rtl="0" eaLnBrk="1" latinLnBrk="0" hangingPunct="1">
-        <a:defRPr kumimoji="1" sz="1800" kern="1200">
+      <a:lvl6pPr marL="1714457" algn="l" defTabSz="342892" rtl="0" eaLnBrk="1" latinLnBrk="0" hangingPunct="1">
+        <a:defRPr kumimoji="1" sz="1350" kern="1200">
           <a:solidFill>
             <a:schemeClr val="tx1"/>
           </a:solidFill>
@@ -3755,8 +3859,8 @@
           <a:cs typeface="+mn-cs"/>
         </a:defRPr>
       </a:lvl6pPr>
-      <a:lvl7pPr marL="2743200" algn="l" defTabSz="457200" rtl="0" eaLnBrk="1" latinLnBrk="0" hangingPunct="1">
-        <a:defRPr kumimoji="1" sz="1800" kern="1200">
+      <a:lvl7pPr marL="2057349" algn="l" defTabSz="342892" rtl="0" eaLnBrk="1" latinLnBrk="0" hangingPunct="1">
+        <a:defRPr kumimoji="1" sz="1350" kern="1200">
           <a:solidFill>
             <a:schemeClr val="tx1"/>
           </a:solidFill>
@@ -3765,8 +3869,8 @@
           <a:cs typeface="+mn-cs"/>
         </a:defRPr>
       </a:lvl7pPr>
-      <a:lvl8pPr marL="3200400" algn="l" defTabSz="457200" rtl="0" eaLnBrk="1" latinLnBrk="0" hangingPunct="1">
-        <a:defRPr kumimoji="1" sz="1800" kern="1200">
+      <a:lvl8pPr marL="2400240" algn="l" defTabSz="342892" rtl="0" eaLnBrk="1" latinLnBrk="0" hangingPunct="1">
+        <a:defRPr kumimoji="1" sz="1350" kern="1200">
           <a:solidFill>
             <a:schemeClr val="tx1"/>
           </a:solidFill>
@@ -3775,8 +3879,8 @@
           <a:cs typeface="+mn-cs"/>
         </a:defRPr>
       </a:lvl8pPr>
-      <a:lvl9pPr marL="3657600" algn="l" defTabSz="457200" rtl="0" eaLnBrk="1" latinLnBrk="0" hangingPunct="1">
-        <a:defRPr kumimoji="1" sz="1800" kern="1200">
+      <a:lvl9pPr marL="2743132" algn="l" defTabSz="342892" rtl="0" eaLnBrk="1" latinLnBrk="0" hangingPunct="1">
+        <a:defRPr kumimoji="1" sz="1350" kern="1200">
           <a:solidFill>
             <a:schemeClr val="tx1"/>
           </a:solidFill>
@@ -3816,7 +3920,7 @@
           <p:nvPr/>
         </p:nvPicPr>
         <p:blipFill>
-          <a:blip r:embed="rId2"/>
+          <a:blip r:embed="rId3"/>
           <a:srcRect/>
           <a:stretch>
             <a:fillRect/>
@@ -3824,8 +3928,8 @@
         </p:blipFill>
         <p:spPr bwMode="auto">
           <a:xfrm>
-            <a:off x="770083" y="-473221"/>
-            <a:ext cx="2253811" cy="2334772"/>
+            <a:off x="577563" y="616686"/>
+            <a:ext cx="1690358" cy="1751079"/>
           </a:xfrm>
           <a:prstGeom prst="rect">
             <a:avLst/>
@@ -3843,8 +3947,8 @@
         </p:nvSpPr>
         <p:spPr bwMode="auto">
           <a:xfrm>
-            <a:off x="317367" y="1861550"/>
-            <a:ext cx="8685384" cy="7224393"/>
+            <a:off x="238025" y="2367765"/>
+            <a:ext cx="6514038" cy="5418295"/>
           </a:xfrm>
           <a:prstGeom prst="rect">
             <a:avLst/>
@@ -3877,7 +3981,7 @@
           </a:fontRef>
         </p:style>
         <p:txBody>
-          <a:bodyPr vert="horz" wrap="square" lIns="74295" tIns="8890" rIns="74295" bIns="8890" numCol="1" anchor="t" anchorCtr="0" compatLnSpc="1">
+          <a:bodyPr vert="horz" wrap="square" lIns="55721" tIns="6668" rIns="55721" bIns="6668" numCol="1" anchor="t" anchorCtr="0" compatLnSpc="1">
             <a:prstTxWarp prst="textNoShape">
               <a:avLst/>
             </a:prstTxWarp>
@@ -3885,7 +3989,7 @@
           <a:lstStyle/>
           <a:p>
             <a:pPr algn="ctr"/>
-            <a:endParaRPr lang="ja-JP" altLang="en-US" b="1" dirty="0">
+            <a:endParaRPr lang="ja-JP" altLang="en-US" sz="1350" b="1" dirty="0">
               <a:solidFill>
                 <a:schemeClr val="tx1"/>
               </a:solidFill>
@@ -3903,8 +4007,8 @@
         </p:nvCxnSpPr>
         <p:spPr>
           <a:xfrm>
-            <a:off x="1907833" y="1371600"/>
-            <a:ext cx="0" cy="864598"/>
+            <a:off x="1430875" y="2000302"/>
+            <a:ext cx="0" cy="648449"/>
           </a:xfrm>
           <a:prstGeom prst="straightConnector1">
             <a:avLst/>
@@ -3944,8 +4048,8 @@
         </p:nvSpPr>
         <p:spPr bwMode="auto">
           <a:xfrm>
-            <a:off x="1144028" y="4006563"/>
-            <a:ext cx="1524420" cy="913579"/>
+            <a:off x="859217" y="4934858"/>
+            <a:ext cx="1143315" cy="685184"/>
           </a:xfrm>
           <a:prstGeom prst="rect">
             <a:avLst/>
@@ -3985,7 +4089,7 @@
           </a:fontRef>
         </p:style>
         <p:txBody>
-          <a:bodyPr vert="horz" wrap="square" lIns="74295" tIns="8890" rIns="74295" bIns="8890" numCol="1" anchor="ctr" anchorCtr="1" compatLnSpc="1">
+          <a:bodyPr vert="horz" wrap="square" lIns="55721" tIns="6668" rIns="55721" bIns="6668" numCol="1" anchor="ctr" anchorCtr="1" compatLnSpc="1">
             <a:prstTxWarp prst="textNoShape">
               <a:avLst/>
             </a:prstTxWarp>
@@ -3994,24 +4098,24 @@
           <a:p>
             <a:pPr algn="ctr"/>
             <a:r>
-              <a:rPr lang="en-US" altLang="ja-JP" sz="1000" b="1" dirty="0" smtClean="0"/>
+              <a:rPr lang="en-US" altLang="ja-JP" sz="750" b="1" dirty="0"/>
               <a:t>&lt;Spring MVC&gt;</a:t>
             </a:r>
           </a:p>
           <a:p>
             <a:pPr algn="ctr"/>
             <a:r>
-              <a:rPr lang="en-US" altLang="ja-JP" b="1" dirty="0" smtClean="0"/>
+              <a:rPr lang="en-US" altLang="ja-JP" sz="1350" b="1" dirty="0"/>
               <a:t>Dispatcher</a:t>
             </a:r>
           </a:p>
           <a:p>
             <a:pPr algn="ctr"/>
             <a:r>
-              <a:rPr lang="en-US" altLang="ja-JP" b="1" dirty="0" smtClean="0"/>
+              <a:rPr lang="en-US" altLang="ja-JP" sz="1350" b="1" dirty="0"/>
               <a:t>Servlet</a:t>
             </a:r>
-            <a:endParaRPr lang="ja-JP" altLang="en-US" b="1" dirty="0"/>
+            <a:endParaRPr lang="ja-JP" altLang="en-US" sz="1350" b="1" dirty="0"/>
           </a:p>
         </p:txBody>
       </p:sp>
@@ -4023,8 +4127,8 @@
         </p:nvSpPr>
         <p:spPr>
           <a:xfrm>
-            <a:off x="2826034" y="6274863"/>
-            <a:ext cx="1233160" cy="583137"/>
+            <a:off x="2119526" y="5831612"/>
+            <a:ext cx="924870" cy="437353"/>
           </a:xfrm>
           <a:prstGeom prst="roundRect">
             <a:avLst/>
@@ -4050,10 +4154,10 @@
           <a:p>
             <a:pPr algn="ctr"/>
             <a:r>
-              <a:rPr lang="en-US" altLang="ja-JP" sz="1600" b="1" dirty="0" smtClean="0"/>
+              <a:rPr lang="en-US" altLang="ja-JP" sz="1200" b="1" dirty="0"/>
               <a:t>Controller</a:t>
             </a:r>
-            <a:endParaRPr lang="ja-JP" altLang="en-US" sz="1600" b="1" dirty="0"/>
+            <a:endParaRPr lang="ja-JP" altLang="en-US" sz="1200" b="1" dirty="0"/>
           </a:p>
         </p:txBody>
       </p:sp>
@@ -4068,8 +4172,8 @@
         </p:nvCxnSpPr>
         <p:spPr>
           <a:xfrm rot="16200000" flipH="1">
-            <a:off x="1542991" y="5283389"/>
-            <a:ext cx="1646290" cy="919796"/>
+            <a:off x="1560077" y="5490839"/>
+            <a:ext cx="430247" cy="688651"/>
           </a:xfrm>
           <a:prstGeom prst="bentConnector2">
             <a:avLst/>
@@ -4109,8 +4213,8 @@
         </p:nvSpPr>
         <p:spPr bwMode="auto">
           <a:xfrm>
-            <a:off x="3682137" y="4015339"/>
-            <a:ext cx="1955844" cy="889162"/>
+            <a:off x="2761603" y="3790537"/>
+            <a:ext cx="1466883" cy="666872"/>
           </a:xfrm>
           <a:prstGeom prst="rect">
             <a:avLst/>
@@ -4150,7 +4254,7 @@
           </a:fontRef>
         </p:style>
         <p:txBody>
-          <a:bodyPr vert="horz" wrap="square" lIns="74295" tIns="8890" rIns="74295" bIns="8890" numCol="1" anchor="ctr" anchorCtr="1" compatLnSpc="1">
+          <a:bodyPr vert="horz" wrap="square" lIns="55721" tIns="6668" rIns="55721" bIns="6668" numCol="1" anchor="ctr" anchorCtr="1" compatLnSpc="1">
             <a:prstTxWarp prst="textNoShape">
               <a:avLst/>
             </a:prstTxWarp>
@@ -4159,25 +4263,25 @@
           <a:p>
             <a:pPr algn="ctr"/>
             <a:r>
-              <a:rPr lang="en-US" altLang="ja-JP" sz="1000" b="1" dirty="0" smtClean="0"/>
+              <a:rPr lang="en-US" altLang="ja-JP" sz="750" b="1" dirty="0"/>
               <a:t>&lt;Spring Web&gt;</a:t>
             </a:r>
           </a:p>
           <a:p>
             <a:pPr algn="ctr"/>
             <a:r>
-              <a:rPr lang="en-US" altLang="ja-JP" dirty="0" err="1" smtClean="0"/>
+              <a:rPr lang="en-US" altLang="ja-JP" sz="1350" dirty="0" err="1"/>
               <a:t>StandardServlet</a:t>
             </a:r>
-            <a:endParaRPr lang="en-US" altLang="ja-JP" dirty="0" smtClean="0"/>
+            <a:endParaRPr lang="en-US" altLang="ja-JP" sz="1350" dirty="0"/>
           </a:p>
           <a:p>
             <a:pPr algn="ctr"/>
             <a:r>
-              <a:rPr lang="en-US" altLang="ja-JP" dirty="0" err="1" smtClean="0"/>
+              <a:rPr lang="en-US" altLang="ja-JP" sz="1350" dirty="0" err="1"/>
               <a:t>MultipartResolver</a:t>
             </a:r>
-            <a:endParaRPr lang="ja-JP" altLang="en-US" b="1" dirty="0"/>
+            <a:endParaRPr lang="ja-JP" altLang="en-US" sz="1350" b="1" dirty="0"/>
           </a:p>
         </p:txBody>
       </p:sp>
@@ -4191,8 +4295,8 @@
         </p:nvSpPr>
         <p:spPr bwMode="auto">
           <a:xfrm>
-            <a:off x="3910477" y="5286720"/>
-            <a:ext cx="1364739" cy="652534"/>
+            <a:off x="2932859" y="5032750"/>
+            <a:ext cx="1023554" cy="489401"/>
           </a:xfrm>
           <a:prstGeom prst="rect">
             <a:avLst/>
@@ -4232,7 +4336,7 @@
           </a:fontRef>
         </p:style>
         <p:txBody>
-          <a:bodyPr vert="horz" wrap="square" lIns="74295" tIns="8890" rIns="74295" bIns="8890" numCol="1" anchor="ctr" anchorCtr="1" compatLnSpc="1">
+          <a:bodyPr vert="horz" wrap="square" lIns="55721" tIns="6668" rIns="55721" bIns="6668" numCol="1" anchor="ctr" anchorCtr="1" compatLnSpc="1">
             <a:prstTxWarp prst="textNoShape">
               <a:avLst/>
             </a:prstTxWarp>
@@ -4241,17 +4345,17 @@
           <a:p>
             <a:pPr algn="ctr"/>
             <a:r>
-              <a:rPr lang="en-US" altLang="ja-JP" sz="1000" b="1" dirty="0" smtClean="0"/>
+              <a:rPr lang="en-US" altLang="ja-JP" sz="750" b="1" dirty="0"/>
               <a:t>&lt;Spring Web&gt;</a:t>
             </a:r>
           </a:p>
           <a:p>
             <a:pPr algn="ctr"/>
             <a:r>
-              <a:rPr lang="en-US" altLang="ja-JP" dirty="0" err="1"/>
+              <a:rPr lang="en-US" altLang="ja-JP" sz="1350" dirty="0" err="1"/>
               <a:t>MultipartFile</a:t>
             </a:r>
-            <a:endParaRPr lang="ja-JP" altLang="en-US" b="1" dirty="0"/>
+            <a:endParaRPr lang="ja-JP" altLang="en-US" sz="1350" b="1" dirty="0"/>
           </a:p>
         </p:txBody>
       </p:sp>
@@ -4263,8 +4367,8 @@
         </p:nvSpPr>
         <p:spPr>
           <a:xfrm>
-            <a:off x="619315" y="2236198"/>
-            <a:ext cx="2577035" cy="981005"/>
+            <a:off x="464487" y="2648751"/>
+            <a:ext cx="1932776" cy="735754"/>
           </a:xfrm>
           <a:prstGeom prst="rect">
             <a:avLst/>
@@ -4290,21 +4394,21 @@
           <a:p>
             <a:pPr algn="ctr"/>
             <a:r>
-              <a:rPr lang="en-US" altLang="ja-JP" b="1" dirty="0"/>
+              <a:rPr lang="en-US" altLang="ja-JP" sz="1350" b="1" dirty="0"/>
               <a:t>&lt;Application Server&gt;</a:t>
             </a:r>
           </a:p>
           <a:p>
             <a:pPr algn="ctr"/>
             <a:r>
-              <a:rPr kumimoji="1" lang="en-US" altLang="ja-JP" dirty="0" smtClean="0"/>
+              <a:rPr lang="en-US" altLang="ja-JP" sz="1350" dirty="0"/>
               <a:t>Servlet</a:t>
             </a:r>
           </a:p>
           <a:p>
             <a:pPr algn="ctr"/>
             <a:r>
-              <a:rPr lang="en-US" altLang="ja-JP" dirty="0" smtClean="0"/>
+              <a:rPr lang="en-US" altLang="ja-JP" sz="1350" dirty="0"/>
               <a:t>Container</a:t>
             </a:r>
           </a:p>
@@ -4314,15 +4418,15 @@
         <p:nvCxnSpPr>
           <p:cNvPr id="70" name="カギ線コネクタ 69"/>
           <p:cNvCxnSpPr>
-            <a:stCxn id="62" idx="2"/>
+            <a:stCxn id="53" idx="2"/>
             <a:endCxn id="24" idx="0"/>
           </p:cNvCxnSpPr>
           <p:nvPr/>
         </p:nvCxnSpPr>
         <p:spPr>
-          <a:xfrm flipH="1">
-            <a:off x="1906238" y="3217203"/>
-            <a:ext cx="1595" cy="789360"/>
+          <a:xfrm>
+            <a:off x="1430875" y="4368674"/>
+            <a:ext cx="0" cy="566184"/>
           </a:xfrm>
           <a:prstGeom prst="straightConnector1">
             <a:avLst/>
@@ -4352,50 +4456,6 @@
           </a:fontRef>
         </p:style>
       </p:cxnSp>
-      <p:cxnSp>
-        <p:nvCxnSpPr>
-          <p:cNvPr id="73" name="カギ線コネクタ 72"/>
-          <p:cNvCxnSpPr>
-            <a:stCxn id="24" idx="3"/>
-            <a:endCxn id="58" idx="1"/>
-          </p:cNvCxnSpPr>
-          <p:nvPr/>
-        </p:nvCxnSpPr>
-        <p:spPr>
-          <a:xfrm flipV="1">
-            <a:off x="2668448" y="4459920"/>
-            <a:ext cx="1013689" cy="3433"/>
-          </a:xfrm>
-          <a:prstGeom prst="bentConnector3">
-            <a:avLst>
-              <a:gd name="adj1" fmla="val 50000"/>
-            </a:avLst>
-          </a:prstGeom>
-          <a:ln>
-            <a:solidFill>
-              <a:schemeClr val="tx1">
-                <a:lumMod val="65000"/>
-                <a:lumOff val="35000"/>
-              </a:schemeClr>
-            </a:solidFill>
-            <a:tailEnd type="arrow"/>
-          </a:ln>
-        </p:spPr>
-        <p:style>
-          <a:lnRef idx="2">
-            <a:schemeClr val="accent1"/>
-          </a:lnRef>
-          <a:fillRef idx="0">
-            <a:schemeClr val="accent1"/>
-          </a:fillRef>
-          <a:effectRef idx="1">
-            <a:schemeClr val="accent1"/>
-          </a:effectRef>
-          <a:fontRef idx="minor">
-            <a:schemeClr val="tx1"/>
-          </a:fontRef>
-        </p:style>
-      </p:cxnSp>
       <p:sp>
         <p:nvSpPr>
           <p:cNvPr id="78" name="File"/>
@@ -4406,8 +4466,8 @@
         </p:nvSpPr>
         <p:spPr bwMode="auto">
           <a:xfrm>
-            <a:off x="7006519" y="2595488"/>
-            <a:ext cx="1448887" cy="957943"/>
+            <a:off x="5254891" y="2918219"/>
+            <a:ext cx="1086665" cy="718457"/>
           </a:xfrm>
           <a:custGeom>
             <a:avLst/>
@@ -4570,7 +4630,7 @@
           </a:effectLst>
         </p:spPr>
         <p:txBody>
-          <a:bodyPr vert="horz" wrap="square" lIns="91440" tIns="45720" rIns="91440" bIns="45720" numCol="1" anchor="b" anchorCtr="0" compatLnSpc="1">
+          <a:bodyPr vert="horz" wrap="square" lIns="68580" tIns="34290" rIns="68580" bIns="34290" numCol="1" anchor="b" anchorCtr="0" compatLnSpc="1">
             <a:prstTxWarp prst="textNoShape">
               <a:avLst/>
             </a:prstTxWarp>
@@ -4578,7 +4638,7 @@
           <a:lstStyle/>
           <a:p>
             <a:pPr algn="ctr"/>
-            <a:endParaRPr lang="ja-JP" altLang="en-US" dirty="0"/>
+            <a:endParaRPr lang="ja-JP" altLang="en-US" sz="1350" dirty="0"/>
           </a:p>
         </p:txBody>
       </p:sp>
@@ -4590,8 +4650,8 @@
         </p:nvSpPr>
         <p:spPr>
           <a:xfrm>
-            <a:off x="7237476" y="2862264"/>
-            <a:ext cx="986972" cy="563279"/>
+            <a:off x="5333971" y="3118301"/>
+            <a:ext cx="928502" cy="422459"/>
           </a:xfrm>
           <a:prstGeom prst="flowChartDocument">
             <a:avLst/>
@@ -4626,7 +4686,7 @@
           <a:p>
             <a:pPr algn="ctr"/>
             <a:r>
-              <a:rPr kumimoji="1" lang="en-US" altLang="ja-JP" sz="1400" dirty="0" smtClean="0">
+              <a:rPr lang="en-US" altLang="ja-JP" sz="1050" dirty="0">
                 <a:solidFill>
                   <a:schemeClr val="tx1">
                     <a:lumMod val="50000"/>
@@ -4640,7 +4700,7 @@
           <a:p>
             <a:pPr algn="ctr"/>
             <a:r>
-              <a:rPr lang="en-US" altLang="ja-JP" sz="1400" dirty="0" smtClean="0">
+              <a:rPr lang="en-US" altLang="ja-JP" sz="1050" dirty="0">
                 <a:solidFill>
                   <a:schemeClr val="tx1">
                     <a:lumMod val="50000"/>
@@ -4650,7 +4710,7 @@
               </a:rPr>
               <a:t>File</a:t>
             </a:r>
-            <a:endParaRPr kumimoji="1" lang="ja-JP" altLang="en-US" sz="1400" dirty="0">
+            <a:endParaRPr lang="ja-JP" altLang="en-US" sz="1050" dirty="0">
               <a:solidFill>
                 <a:schemeClr val="tx1">
                   <a:lumMod val="50000"/>
@@ -4671,8 +4731,8 @@
         </p:nvSpPr>
         <p:spPr bwMode="auto">
           <a:xfrm>
-            <a:off x="7006518" y="6325663"/>
-            <a:ext cx="1448887" cy="1010118"/>
+            <a:off x="5254890" y="5715849"/>
+            <a:ext cx="1086665" cy="757589"/>
           </a:xfrm>
           <a:custGeom>
             <a:avLst/>
@@ -4835,7 +4895,7 @@
           </a:effectLst>
         </p:spPr>
         <p:txBody>
-          <a:bodyPr vert="horz" wrap="square" lIns="91440" tIns="45720" rIns="91440" bIns="45720" numCol="1" anchor="b" anchorCtr="0" compatLnSpc="1">
+          <a:bodyPr vert="horz" wrap="square" lIns="68580" tIns="34290" rIns="68580" bIns="34290" numCol="1" anchor="b" anchorCtr="0" compatLnSpc="1">
             <a:prstTxWarp prst="textNoShape">
               <a:avLst/>
             </a:prstTxWarp>
@@ -4843,7 +4903,7 @@
           <a:lstStyle/>
           <a:p>
             <a:pPr algn="ctr"/>
-            <a:endParaRPr lang="ja-JP" altLang="en-US" dirty="0"/>
+            <a:endParaRPr lang="ja-JP" altLang="en-US" sz="1350" dirty="0"/>
           </a:p>
         </p:txBody>
       </p:sp>
@@ -4855,8 +4915,8 @@
         </p:nvSpPr>
         <p:spPr>
           <a:xfrm>
-            <a:off x="6427010" y="1982202"/>
-            <a:ext cx="2577238" cy="646331"/>
+            <a:off x="4820258" y="2458255"/>
+            <a:ext cx="1932929" cy="507831"/>
           </a:xfrm>
           <a:prstGeom prst="rect">
             <a:avLst/>
@@ -4871,25 +4931,17 @@
           <a:p>
             <a:pPr algn="ctr"/>
             <a:r>
-              <a:rPr lang="en-US" altLang="ja-JP" dirty="0"/>
-              <a:t>Temporary </a:t>
-            </a:r>
-            <a:r>
-              <a:rPr lang="en-US" altLang="ja-JP" dirty="0" smtClean="0"/>
-              <a:t>directory</a:t>
+              <a:rPr lang="en-US" altLang="ja-JP" sz="1350" dirty="0"/>
+              <a:t>Temporary directory</a:t>
             </a:r>
           </a:p>
           <a:p>
             <a:pPr algn="ctr"/>
             <a:r>
-              <a:rPr lang="en-US" altLang="ja-JP" dirty="0"/>
-              <a:t>f</a:t>
-            </a:r>
-            <a:r>
-              <a:rPr lang="en-US" altLang="ja-JP" dirty="0" smtClean="0"/>
-              <a:t>or servlet container</a:t>
-            </a:r>
-            <a:endParaRPr kumimoji="1" lang="ja-JP" altLang="en-US" dirty="0"/>
+              <a:rPr lang="en-US" altLang="ja-JP" sz="1350" dirty="0"/>
+              <a:t>for servlet container</a:t>
+            </a:r>
+            <a:endParaRPr lang="ja-JP" altLang="en-US" sz="1350" dirty="0"/>
           </a:p>
         </p:txBody>
       </p:sp>
@@ -4901,8 +4953,8 @@
         </p:nvSpPr>
         <p:spPr>
           <a:xfrm>
-            <a:off x="2023085" y="1522259"/>
-            <a:ext cx="830168" cy="563279"/>
+            <a:off x="1517315" y="2113298"/>
+            <a:ext cx="622626" cy="422459"/>
           </a:xfrm>
           <a:prstGeom prst="flowChartDocument">
             <a:avLst/>
@@ -4937,7 +4989,7 @@
           <a:p>
             <a:pPr algn="ctr"/>
             <a:r>
-              <a:rPr lang="en-US" altLang="ja-JP" sz="1400" dirty="0" smtClean="0">
+              <a:rPr lang="en-US" altLang="ja-JP" sz="1050" dirty="0">
                 <a:solidFill>
                   <a:schemeClr val="tx1">
                     <a:lumMod val="50000"/>
@@ -4951,7 +5003,7 @@
           <a:p>
             <a:pPr algn="ctr"/>
             <a:r>
-              <a:rPr lang="en-US" altLang="ja-JP" sz="1400" dirty="0" smtClean="0">
+              <a:rPr lang="en-US" altLang="ja-JP" sz="1050" dirty="0">
                 <a:solidFill>
                   <a:schemeClr val="tx1">
                     <a:lumMod val="50000"/>
@@ -4961,7 +5013,7 @@
               </a:rPr>
               <a:t>File</a:t>
             </a:r>
-            <a:endParaRPr kumimoji="1" lang="ja-JP" altLang="en-US" sz="1400" dirty="0">
+            <a:endParaRPr lang="ja-JP" altLang="en-US" sz="1050" dirty="0">
               <a:solidFill>
                 <a:schemeClr val="tx1">
                   <a:lumMod val="50000"/>
@@ -4980,8 +5032,8 @@
         </p:nvSpPr>
         <p:spPr>
           <a:xfrm>
-            <a:off x="2853253" y="2817587"/>
-            <a:ext cx="830168" cy="563279"/>
+            <a:off x="2039402" y="3084794"/>
+            <a:ext cx="723164" cy="422459"/>
           </a:xfrm>
           <a:prstGeom prst="flowChartDocument">
             <a:avLst/>
@@ -5016,7 +5068,7 @@
           <a:p>
             <a:pPr algn="ctr"/>
             <a:r>
-              <a:rPr kumimoji="1" lang="en-US" altLang="ja-JP" sz="1400" dirty="0" smtClean="0">
+              <a:rPr lang="en-US" altLang="ja-JP" sz="1050" dirty="0">
                 <a:solidFill>
                   <a:schemeClr val="tx1">
                     <a:lumMod val="50000"/>
@@ -5026,7 +5078,7 @@
               </a:rPr>
               <a:t>Web.xml</a:t>
             </a:r>
-            <a:endParaRPr kumimoji="1" lang="ja-JP" altLang="en-US" sz="1400" dirty="0">
+            <a:endParaRPr lang="ja-JP" altLang="en-US" sz="1050" dirty="0">
               <a:solidFill>
                 <a:schemeClr val="tx1">
                   <a:lumMod val="50000"/>
@@ -5048,8 +5100,8 @@
         </p:nvCxnSpPr>
         <p:spPr>
           <a:xfrm rot="5400000" flipH="1" flipV="1">
-            <a:off x="3345607" y="5709994"/>
-            <a:ext cx="661876" cy="467863"/>
+            <a:off x="2480330" y="5379083"/>
+            <a:ext cx="554161" cy="350898"/>
           </a:xfrm>
           <a:prstGeom prst="bentConnector2">
             <a:avLst/>
@@ -5090,8 +5142,8 @@
         </p:nvCxnSpPr>
         <p:spPr>
           <a:xfrm flipV="1">
-            <a:off x="7219128" y="3388304"/>
-            <a:ext cx="511834" cy="2224541"/>
+            <a:off x="5510005" y="3512831"/>
+            <a:ext cx="288217" cy="1764619"/>
           </a:xfrm>
           <a:prstGeom prst="bentConnector2">
             <a:avLst/>
@@ -5131,8 +5183,8 @@
         </p:nvSpPr>
         <p:spPr>
           <a:xfrm>
-            <a:off x="7346673" y="6603737"/>
-            <a:ext cx="830168" cy="563279"/>
+            <a:off x="5510005" y="5924405"/>
+            <a:ext cx="622626" cy="422459"/>
           </a:xfrm>
           <a:prstGeom prst="flowChartDocument">
             <a:avLst/>
@@ -5167,7 +5219,7 @@
           <a:p>
             <a:pPr algn="ctr"/>
             <a:r>
-              <a:rPr lang="en-US" altLang="ja-JP" sz="1400" dirty="0" smtClean="0">
+              <a:rPr lang="en-US" altLang="ja-JP" sz="1050" dirty="0">
                 <a:solidFill>
                   <a:schemeClr val="tx1">
                     <a:lumMod val="50000"/>
@@ -5181,7 +5233,7 @@
           <a:p>
             <a:pPr algn="ctr"/>
             <a:r>
-              <a:rPr lang="en-US" altLang="ja-JP" sz="1400" dirty="0" smtClean="0">
+              <a:rPr lang="en-US" altLang="ja-JP" sz="1050" dirty="0">
                 <a:solidFill>
                   <a:schemeClr val="tx1">
                     <a:lumMod val="50000"/>
@@ -5191,7 +5243,7 @@
               </a:rPr>
               <a:t>File</a:t>
             </a:r>
-            <a:endParaRPr kumimoji="1" lang="ja-JP" altLang="en-US" sz="1400" dirty="0">
+            <a:endParaRPr lang="ja-JP" altLang="en-US" sz="1050" dirty="0">
               <a:solidFill>
                 <a:schemeClr val="tx1">
                   <a:lumMod val="50000"/>
@@ -5210,8 +5262,8 @@
         </p:nvSpPr>
         <p:spPr>
           <a:xfrm>
-            <a:off x="6835489" y="7348242"/>
-            <a:ext cx="1965779" cy="646331"/>
+            <a:off x="5126617" y="6451034"/>
+            <a:ext cx="1474334" cy="507831"/>
           </a:xfrm>
           <a:prstGeom prst="rect">
             <a:avLst/>
@@ -5226,29 +5278,17 @@
           <a:p>
             <a:pPr algn="ctr"/>
             <a:r>
-              <a:rPr lang="en-US" altLang="ja-JP" dirty="0" smtClean="0"/>
-              <a:t>Upload</a:t>
-            </a:r>
-            <a:r>
-              <a:rPr lang="en-US" altLang="ja-JP" dirty="0"/>
-              <a:t> </a:t>
-            </a:r>
-            <a:r>
-              <a:rPr lang="en-US" altLang="ja-JP" dirty="0" smtClean="0"/>
-              <a:t>directory</a:t>
+              <a:rPr lang="en-US" altLang="ja-JP" sz="1350" dirty="0"/>
+              <a:t>Upload directory</a:t>
             </a:r>
           </a:p>
           <a:p>
             <a:pPr algn="ctr"/>
             <a:r>
-              <a:rPr lang="en-US" altLang="ja-JP" dirty="0"/>
-              <a:t>f</a:t>
-            </a:r>
-            <a:r>
-              <a:rPr lang="en-US" altLang="ja-JP" dirty="0" smtClean="0"/>
-              <a:t>or application</a:t>
-            </a:r>
-            <a:endParaRPr kumimoji="1" lang="ja-JP" altLang="en-US" dirty="0"/>
+              <a:rPr lang="en-US" altLang="ja-JP" sz="1350" dirty="0"/>
+              <a:t>for application</a:t>
+            </a:r>
+            <a:endParaRPr lang="ja-JP" altLang="en-US" sz="1350" dirty="0"/>
           </a:p>
         </p:txBody>
       </p:sp>
@@ -5260,8 +5300,8 @@
         </p:nvSpPr>
         <p:spPr>
           <a:xfrm>
-            <a:off x="6167475" y="5242735"/>
-            <a:ext cx="1051653" cy="740219"/>
+            <a:off x="4625607" y="4999868"/>
+            <a:ext cx="884398" cy="555164"/>
           </a:xfrm>
           <a:prstGeom prst="roundRect">
             <a:avLst/>
@@ -5287,14 +5327,14 @@
           <a:p>
             <a:pPr algn="ctr"/>
             <a:r>
-              <a:rPr kumimoji="1" lang="en-US" altLang="ja-JP" sz="1600" dirty="0" smtClean="0"/>
+              <a:rPr lang="en-US" altLang="ja-JP" sz="1200" dirty="0"/>
               <a:t>&lt;servlet&gt;</a:t>
             </a:r>
           </a:p>
           <a:p>
             <a:pPr algn="ctr"/>
             <a:r>
-              <a:rPr kumimoji="1" lang="en-US" altLang="ja-JP" dirty="0" smtClean="0"/>
+              <a:rPr lang="en-US" altLang="ja-JP" sz="1350" dirty="0"/>
               <a:t>Part</a:t>
             </a:r>
           </a:p>
@@ -5311,8 +5351,8 @@
         </p:nvCxnSpPr>
         <p:spPr>
           <a:xfrm flipV="1">
-            <a:off x="5275216" y="5612845"/>
-            <a:ext cx="892259" cy="142"/>
+            <a:off x="3956413" y="5277450"/>
+            <a:ext cx="669194" cy="1"/>
           </a:xfrm>
           <a:prstGeom prst="bentConnector3">
             <a:avLst>
@@ -5355,8 +5395,8 @@
         </p:nvCxnSpPr>
         <p:spPr>
           <a:xfrm>
-            <a:off x="5637981" y="4459920"/>
-            <a:ext cx="1055321" cy="782815"/>
+            <a:off x="4228486" y="4123973"/>
+            <a:ext cx="839320" cy="875895"/>
           </a:xfrm>
           <a:prstGeom prst="bentConnector2">
             <a:avLst/>
@@ -5394,8 +5434,8 @@
         </p:nvSpPr>
         <p:spPr>
           <a:xfrm>
-            <a:off x="1375477" y="1376907"/>
-            <a:ext cx="734693" cy="536091"/>
+            <a:off x="1031608" y="2004283"/>
+            <a:ext cx="551020" cy="402068"/>
           </a:xfrm>
           <a:prstGeom prst="rect">
             <a:avLst/>
@@ -5426,14 +5466,14 @@
           <a:lstStyle/>
           <a:p>
             <a:r>
-              <a:rPr kumimoji="1" lang="en-US" altLang="ja-JP" sz="2400" dirty="0" smtClean="0">
+              <a:rPr lang="en-US" altLang="ja-JP" dirty="0">
                 <a:solidFill>
                   <a:schemeClr val="tx1"/>
                 </a:solidFill>
               </a:rPr>
               <a:t>(1)</a:t>
             </a:r>
-            <a:endParaRPr kumimoji="1" lang="ja-JP" altLang="en-US" sz="2400" dirty="0">
+            <a:endParaRPr lang="ja-JP" altLang="en-US" dirty="0">
               <a:solidFill>
                 <a:schemeClr val="tx1"/>
               </a:solidFill>
@@ -5449,8 +5489,8 @@
         </p:nvSpPr>
         <p:spPr>
           <a:xfrm>
-            <a:off x="1375477" y="3230796"/>
-            <a:ext cx="734693" cy="536091"/>
+            <a:off x="1031608" y="3430933"/>
+            <a:ext cx="551020" cy="402068"/>
           </a:xfrm>
           <a:prstGeom prst="rect">
             <a:avLst/>
@@ -5481,14 +5521,14 @@
           <a:lstStyle/>
           <a:p>
             <a:r>
-              <a:rPr kumimoji="1" lang="en-US" altLang="ja-JP" sz="2400" dirty="0" smtClean="0">
+              <a:rPr lang="en-US" altLang="ja-JP" dirty="0">
                 <a:solidFill>
                   <a:schemeClr val="tx1"/>
                 </a:solidFill>
               </a:rPr>
               <a:t>(2)</a:t>
             </a:r>
-            <a:endParaRPr kumimoji="1" lang="ja-JP" altLang="en-US" sz="2400" dirty="0">
+            <a:endParaRPr lang="ja-JP" altLang="en-US" dirty="0">
               <a:solidFill>
                 <a:schemeClr val="tx1"/>
               </a:solidFill>
@@ -5504,8 +5544,8 @@
         </p:nvSpPr>
         <p:spPr>
           <a:xfrm>
-            <a:off x="2707921" y="3960100"/>
-            <a:ext cx="734693" cy="536091"/>
+            <a:off x="1034888" y="4489622"/>
+            <a:ext cx="551020" cy="274618"/>
           </a:xfrm>
           <a:prstGeom prst="rect">
             <a:avLst/>
@@ -5536,14 +5576,14 @@
           <a:lstStyle/>
           <a:p>
             <a:r>
-              <a:rPr kumimoji="1" lang="en-US" altLang="ja-JP" sz="2400" dirty="0" smtClean="0">
+              <a:rPr lang="en-US" altLang="ja-JP" dirty="0">
                 <a:solidFill>
                   <a:schemeClr val="tx1"/>
                 </a:solidFill>
               </a:rPr>
-              <a:t>(3)</a:t>
-            </a:r>
-            <a:endParaRPr kumimoji="1" lang="ja-JP" altLang="en-US" sz="2400" dirty="0">
+              <a:t>(4)</a:t>
+            </a:r>
+            <a:endParaRPr lang="ja-JP" altLang="en-US" dirty="0">
               <a:solidFill>
                 <a:schemeClr val="tx1"/>
               </a:solidFill>
@@ -5559,8 +5599,8 @@
         </p:nvSpPr>
         <p:spPr>
           <a:xfrm>
-            <a:off x="1375477" y="5018674"/>
-            <a:ext cx="734693" cy="536091"/>
+            <a:off x="1031608" y="5686353"/>
+            <a:ext cx="551020" cy="402068"/>
           </a:xfrm>
           <a:prstGeom prst="rect">
             <a:avLst/>
@@ -5591,14 +5631,14 @@
           <a:lstStyle/>
           <a:p>
             <a:r>
-              <a:rPr kumimoji="1" lang="en-US" altLang="ja-JP" sz="2400" dirty="0" smtClean="0">
+              <a:rPr lang="en-US" altLang="ja-JP" dirty="0" smtClean="0">
                 <a:solidFill>
                   <a:schemeClr val="tx1"/>
                 </a:solidFill>
               </a:rPr>
-              <a:t>(4)</a:t>
-            </a:r>
-            <a:endParaRPr kumimoji="1" lang="ja-JP" altLang="en-US" sz="2400" dirty="0">
+              <a:t>(5)</a:t>
+            </a:r>
+            <a:endParaRPr lang="ja-JP" altLang="en-US" dirty="0">
               <a:solidFill>
                 <a:schemeClr val="tx1"/>
               </a:solidFill>
@@ -5614,8 +5654,8 @@
         </p:nvSpPr>
         <p:spPr>
           <a:xfrm>
-            <a:off x="2941852" y="5849620"/>
-            <a:ext cx="734693" cy="536091"/>
+            <a:off x="2206390" y="5458819"/>
+            <a:ext cx="551020" cy="402068"/>
           </a:xfrm>
           <a:prstGeom prst="rect">
             <a:avLst/>
@@ -5646,14 +5686,14 @@
           <a:lstStyle/>
           <a:p>
             <a:r>
-              <a:rPr kumimoji="1" lang="en-US" altLang="ja-JP" sz="2400" dirty="0" smtClean="0">
+              <a:rPr lang="en-US" altLang="ja-JP" dirty="0" smtClean="0">
                 <a:solidFill>
                   <a:schemeClr val="tx1"/>
                 </a:solidFill>
               </a:rPr>
-              <a:t>(5)</a:t>
-            </a:r>
-            <a:endParaRPr kumimoji="1" lang="ja-JP" altLang="en-US" sz="2400" dirty="0">
+              <a:t>(6)</a:t>
+            </a:r>
+            <a:endParaRPr lang="ja-JP" altLang="en-US" dirty="0">
               <a:solidFill>
                 <a:schemeClr val="tx1"/>
               </a:solidFill>
@@ -5669,8 +5709,8 @@
         </p:nvSpPr>
         <p:spPr>
           <a:xfrm>
-            <a:off x="5324968" y="5165876"/>
-            <a:ext cx="734693" cy="536091"/>
+            <a:off x="3993727" y="4846010"/>
+            <a:ext cx="551020" cy="402068"/>
           </a:xfrm>
           <a:prstGeom prst="rect">
             <a:avLst/>
@@ -5701,14 +5741,14 @@
           <a:lstStyle/>
           <a:p>
             <a:r>
-              <a:rPr kumimoji="1" lang="en-US" altLang="ja-JP" sz="2400" dirty="0" smtClean="0">
+              <a:rPr lang="en-US" altLang="ja-JP" dirty="0" smtClean="0">
                 <a:solidFill>
                   <a:schemeClr val="tx1"/>
                 </a:solidFill>
               </a:rPr>
-              <a:t>(6)</a:t>
-            </a:r>
-            <a:endParaRPr kumimoji="1" lang="ja-JP" altLang="en-US" sz="2400" dirty="0">
+              <a:t>(7)</a:t>
+            </a:r>
+            <a:endParaRPr lang="ja-JP" altLang="en-US" dirty="0">
               <a:solidFill>
                 <a:schemeClr val="tx1"/>
               </a:solidFill>
@@ -5724,8 +5764,8 @@
         </p:nvSpPr>
         <p:spPr>
           <a:xfrm>
-            <a:off x="2900990" y="6913485"/>
-            <a:ext cx="734693" cy="536091"/>
+            <a:off x="2175743" y="6278828"/>
+            <a:ext cx="551020" cy="402068"/>
           </a:xfrm>
           <a:prstGeom prst="rect">
             <a:avLst/>
@@ -5756,14 +5796,14 @@
           <a:lstStyle/>
           <a:p>
             <a:r>
-              <a:rPr kumimoji="1" lang="en-US" altLang="ja-JP" sz="2400" dirty="0" smtClean="0">
+              <a:rPr lang="en-US" altLang="ja-JP" dirty="0" smtClean="0">
                 <a:solidFill>
                   <a:schemeClr val="tx1"/>
                 </a:solidFill>
               </a:rPr>
-              <a:t>(7)</a:t>
-            </a:r>
-            <a:endParaRPr kumimoji="1" lang="ja-JP" altLang="en-US" sz="2400" dirty="0">
+              <a:t>(8)</a:t>
+            </a:r>
+            <a:endParaRPr lang="ja-JP" altLang="en-US" dirty="0">
               <a:solidFill>
                 <a:schemeClr val="tx1"/>
               </a:solidFill>
@@ -5782,8 +5822,8 @@
         </p:nvCxnSpPr>
         <p:spPr>
           <a:xfrm rot="16200000" flipH="1">
-            <a:off x="3457098" y="6843515"/>
-            <a:ext cx="794206" cy="823175"/>
+            <a:off x="2685630" y="6165295"/>
+            <a:ext cx="410042" cy="617381"/>
           </a:xfrm>
           <a:prstGeom prst="bentConnector2">
             <a:avLst/>
@@ -5815,14 +5855,14 @@
       </p:cxnSp>
       <p:sp>
         <p:nvSpPr>
-          <p:cNvPr id="314" name="正方形/長方形 313"/>
+          <p:cNvPr id="315" name="正方形/長方形 314"/>
           <p:cNvSpPr/>
           <p:nvPr/>
         </p:nvSpPr>
         <p:spPr>
           <a:xfrm>
-            <a:off x="2717907" y="4489937"/>
-            <a:ext cx="734693" cy="536091"/>
+            <a:off x="4251766" y="4163814"/>
+            <a:ext cx="585462" cy="402068"/>
           </a:xfrm>
           <a:prstGeom prst="rect">
             <a:avLst/>
@@ -5853,69 +5893,22 @@
           <a:lstStyle/>
           <a:p>
             <a:r>
-              <a:rPr kumimoji="1" lang="en-US" altLang="ja-JP" sz="2400" dirty="0" smtClean="0">
+              <a:rPr lang="en-US" altLang="ja-JP" dirty="0">
                 <a:solidFill>
                   <a:schemeClr val="tx1"/>
                 </a:solidFill>
               </a:rPr>
-              <a:t>(9)</a:t>
-            </a:r>
-            <a:endParaRPr kumimoji="1" lang="ja-JP" altLang="en-US" sz="2400" dirty="0">
-              <a:solidFill>
-                <a:schemeClr val="tx1"/>
-              </a:solidFill>
-            </a:endParaRPr>
-          </a:p>
-        </p:txBody>
-      </p:sp>
-      <p:sp>
-        <p:nvSpPr>
-          <p:cNvPr id="315" name="正方形/長方形 314"/>
-          <p:cNvSpPr/>
-          <p:nvPr/>
-        </p:nvSpPr>
-        <p:spPr>
-          <a:xfrm>
-            <a:off x="5683963" y="4461636"/>
-            <a:ext cx="734693" cy="536091"/>
-          </a:xfrm>
-          <a:prstGeom prst="rect">
-            <a:avLst/>
-          </a:prstGeom>
-          <a:noFill/>
-          <a:ln>
-            <a:noFill/>
-          </a:ln>
-        </p:spPr>
-        <p:style>
-          <a:lnRef idx="2">
-            <a:schemeClr val="accent1">
-              <a:shade val="50000"/>
-            </a:schemeClr>
-          </a:lnRef>
-          <a:fillRef idx="1">
-            <a:schemeClr val="accent1"/>
-          </a:fillRef>
-          <a:effectRef idx="0">
-            <a:schemeClr val="accent1"/>
-          </a:effectRef>
-          <a:fontRef idx="minor">
-            <a:schemeClr val="lt1"/>
-          </a:fontRef>
-        </p:style>
-        <p:txBody>
-          <a:bodyPr rtlCol="0" anchor="t"/>
-          <a:lstStyle/>
-          <a:p>
-            <a:r>
-              <a:rPr kumimoji="1" lang="en-US" altLang="ja-JP" sz="2400" dirty="0" smtClean="0">
+              <a:t>(</a:t>
+            </a:r>
+            <a:r>
+              <a:rPr lang="en-US" altLang="ja-JP" dirty="0" smtClean="0">
                 <a:solidFill>
                   <a:schemeClr val="tx1"/>
                 </a:solidFill>
               </a:rPr>
-              <a:t>(10)</a:t>
-            </a:r>
-            <a:endParaRPr kumimoji="1" lang="ja-JP" altLang="en-US" sz="2400" dirty="0">
+              <a:t>11)</a:t>
+            </a:r>
+            <a:endParaRPr lang="ja-JP" altLang="en-US" dirty="0">
               <a:solidFill>
                 <a:schemeClr val="tx1"/>
               </a:solidFill>
@@ -5932,7 +5925,7 @@
           <p:nvPr/>
         </p:nvPicPr>
         <p:blipFill>
-          <a:blip r:embed="rId3">
+          <a:blip r:embed="rId4">
             <a:extLst>
               <a:ext uri="{28A0092B-C50C-407E-A947-70E740481C1C}">
                 <a14:useLocalDpi xmlns:a14="http://schemas.microsoft.com/office/drawing/2010/main" val="0"/>
@@ -5946,8 +5939,8 @@
         </p:blipFill>
         <p:spPr bwMode="auto">
           <a:xfrm>
-            <a:off x="1129514" y="395741"/>
-            <a:ext cx="1546383" cy="611361"/>
+            <a:off x="847136" y="1268408"/>
+            <a:ext cx="1159787" cy="458521"/>
           </a:xfrm>
           <a:prstGeom prst="rect">
             <a:avLst/>
@@ -5985,8 +5978,8 @@
         </p:nvSpPr>
         <p:spPr>
           <a:xfrm>
-            <a:off x="4265789" y="7360638"/>
-            <a:ext cx="1233160" cy="583136"/>
+            <a:off x="3199342" y="6460331"/>
+            <a:ext cx="924870" cy="437352"/>
           </a:xfrm>
           <a:prstGeom prst="roundRect">
             <a:avLst/>
@@ -6012,10 +6005,10 @@
           <a:p>
             <a:pPr algn="ctr"/>
             <a:r>
-              <a:rPr lang="en-US" altLang="ja-JP" sz="1600" b="1" dirty="0" smtClean="0"/>
+              <a:rPr lang="en-US" altLang="ja-JP" sz="1200" b="1" dirty="0"/>
               <a:t>Service</a:t>
             </a:r>
-            <a:endParaRPr lang="ja-JP" altLang="en-US" sz="1600" b="1" dirty="0"/>
+            <a:endParaRPr lang="ja-JP" altLang="en-US" sz="1200" b="1" dirty="0"/>
           </a:p>
         </p:txBody>
       </p:sp>
@@ -6029,8 +6022,8 @@
         </p:nvSpPr>
         <p:spPr bwMode="auto">
           <a:xfrm>
-            <a:off x="7173551" y="8153477"/>
-            <a:ext cx="1176412" cy="874407"/>
+            <a:off x="5380163" y="7054960"/>
+            <a:ext cx="882309" cy="655805"/>
           </a:xfrm>
           <a:prstGeom prst="flowChartMagneticDisk">
             <a:avLst/>
@@ -6055,38 +6048,26 @@
           </a:fontRef>
         </p:style>
         <p:txBody>
-          <a:bodyPr vert="horz" wrap="square" lIns="74295" tIns="8890" rIns="74295" bIns="8890" numCol="1" anchor="t" anchorCtr="0" compatLnSpc="1">
+          <a:bodyPr vert="horz" wrap="square" lIns="55721" tIns="6668" rIns="55721" bIns="6668" numCol="1" anchor="t" anchorCtr="0" compatLnSpc="1">
             <a:prstTxWarp prst="textNoShape">
               <a:avLst/>
             </a:prstTxWarp>
           </a:bodyPr>
           <a:lstStyle/>
           <a:p>
-            <a:pPr marL="0" marR="0" lvl="0" indent="0" algn="ctr" defTabSz="914400" rtl="0" eaLnBrk="1" fontAlgn="base" latinLnBrk="0" hangingPunct="1">
-              <a:lnSpc>
-                <a:spcPct val="100000"/>
-              </a:lnSpc>
+            <a:pPr algn="ctr" defTabSz="685784" fontAlgn="base">
               <a:spcBef>
                 <a:spcPct val="0"/>
               </a:spcBef>
               <a:spcAft>
                 <a:spcPct val="0"/>
               </a:spcAft>
-              <a:buClrTx/>
-              <a:buSzTx/>
-              <a:buFontTx/>
-              <a:buNone/>
-              <a:tabLst/>
             </a:pPr>
             <a:r>
-              <a:rPr kumimoji="1" lang="en-US" altLang="ja-JP" sz="1800" b="0" i="0" u="none" strike="noStrike" cap="none" normalizeH="0" baseline="0" dirty="0" smtClean="0">
-                <a:ln>
-                  <a:noFill/>
-                </a:ln>
+              <a:rPr lang="en-US" altLang="ja-JP" sz="1350" dirty="0">
                 <a:solidFill>
                   <a:schemeClr val="bg1"/>
                 </a:solidFill>
-                <a:effectLst/>
                 <a:latin typeface="Arial" pitchFamily="34" charset="0"/>
                 <a:ea typeface="ＭＳ Ｐゴシック" pitchFamily="50" charset="-128"/>
                 <a:cs typeface="ＭＳ Ｐゴシック" pitchFamily="50" charset="-128"/>
@@ -6106,8 +6087,8 @@
         </p:nvCxnSpPr>
         <p:spPr>
           <a:xfrm>
-            <a:off x="5498949" y="7652206"/>
-            <a:ext cx="1003451" cy="0"/>
+            <a:off x="4124212" y="6679007"/>
+            <a:ext cx="752588" cy="0"/>
           </a:xfrm>
           <a:prstGeom prst="straightConnector1">
             <a:avLst/>
@@ -6145,8 +6126,8 @@
         </p:nvSpPr>
         <p:spPr>
           <a:xfrm>
-            <a:off x="5541509" y="7167016"/>
-            <a:ext cx="734693" cy="536091"/>
+            <a:off x="4156132" y="6315114"/>
+            <a:ext cx="585462" cy="402068"/>
           </a:xfrm>
           <a:prstGeom prst="rect">
             <a:avLst/>
@@ -6177,14 +6158,14 @@
           <a:lstStyle/>
           <a:p>
             <a:r>
-              <a:rPr kumimoji="1" lang="en-US" altLang="ja-JP" sz="2400" dirty="0" smtClean="0">
+              <a:rPr lang="en-US" altLang="ja-JP" dirty="0" smtClean="0">
                 <a:solidFill>
                   <a:schemeClr val="tx1"/>
                 </a:solidFill>
               </a:rPr>
-              <a:t>(8)</a:t>
-            </a:r>
-            <a:endParaRPr kumimoji="1" lang="ja-JP" altLang="en-US" sz="2400" dirty="0">
+              <a:t>(9)</a:t>
+            </a:r>
+            <a:endParaRPr lang="ja-JP" altLang="en-US" dirty="0">
               <a:solidFill>
                 <a:schemeClr val="tx1"/>
               </a:solidFill>
@@ -6200,8 +6181,8 @@
         </p:nvSpPr>
         <p:spPr>
           <a:xfrm>
-            <a:off x="6625287" y="6325663"/>
-            <a:ext cx="408479" cy="2629651"/>
+            <a:off x="4968967" y="5715851"/>
+            <a:ext cx="306359" cy="1972238"/>
           </a:xfrm>
           <a:prstGeom prst="leftBrace">
             <a:avLst/>
@@ -6235,7 +6216,285 @@
           <a:lstStyle/>
           <a:p>
             <a:pPr algn="ctr"/>
-            <a:endParaRPr kumimoji="1" lang="ja-JP" altLang="en-US"/>
+            <a:endParaRPr lang="ja-JP" altLang="en-US" sz="1350"/>
+          </a:p>
+        </p:txBody>
+      </p:sp>
+      <p:sp>
+        <p:nvSpPr>
+          <p:cNvPr id="53" name="Rectangle 66"/>
+          <p:cNvSpPr>
+            <a:spLocks noChangeArrowheads="1"/>
+          </p:cNvSpPr>
+          <p:nvPr/>
+        </p:nvSpPr>
+        <p:spPr bwMode="auto">
+          <a:xfrm>
+            <a:off x="838826" y="3879273"/>
+            <a:ext cx="1184097" cy="489401"/>
+          </a:xfrm>
+          <a:prstGeom prst="rect">
+            <a:avLst/>
+          </a:prstGeom>
+          <a:gradFill>
+            <a:gsLst>
+              <a:gs pos="0">
+                <a:srgbClr val="81A042"/>
+              </a:gs>
+              <a:gs pos="100000">
+                <a:srgbClr val="BDD292"/>
+              </a:gs>
+            </a:gsLst>
+          </a:gradFill>
+          <a:ln w="25400">
+            <a:solidFill>
+              <a:schemeClr val="accent3">
+                <a:lumMod val="75000"/>
+              </a:schemeClr>
+            </a:solidFill>
+            <a:headEnd/>
+            <a:tailEnd/>
+          </a:ln>
+        </p:spPr>
+        <p:style>
+          <a:lnRef idx="1">
+            <a:schemeClr val="accent3"/>
+          </a:lnRef>
+          <a:fillRef idx="3">
+            <a:schemeClr val="accent3"/>
+          </a:fillRef>
+          <a:effectRef idx="2">
+            <a:schemeClr val="accent3"/>
+          </a:effectRef>
+          <a:fontRef idx="minor">
+            <a:schemeClr val="lt1"/>
+          </a:fontRef>
+        </p:style>
+        <p:txBody>
+          <a:bodyPr vert="horz" wrap="square" lIns="55721" tIns="6668" rIns="55721" bIns="6668" numCol="1" anchor="ctr" anchorCtr="1" compatLnSpc="1">
+            <a:prstTxWarp prst="textNoShape">
+              <a:avLst/>
+            </a:prstTxWarp>
+          </a:bodyPr>
+          <a:lstStyle/>
+          <a:p>
+            <a:pPr algn="ctr"/>
+            <a:r>
+              <a:rPr lang="en-US" altLang="ja-JP" sz="750" b="1" dirty="0"/>
+              <a:t>&lt;Spring Web&gt;</a:t>
+            </a:r>
+          </a:p>
+          <a:p>
+            <a:pPr algn="ctr"/>
+            <a:r>
+              <a:rPr lang="en-US" altLang="ja-JP" sz="1350" dirty="0" err="1"/>
+              <a:t>MultipartFilter</a:t>
+            </a:r>
+            <a:endParaRPr lang="ja-JP" altLang="en-US" sz="1350" b="1" dirty="0"/>
+          </a:p>
+        </p:txBody>
+      </p:sp>
+      <p:cxnSp>
+        <p:nvCxnSpPr>
+          <p:cNvPr id="54" name="カギ線コネクタ 69"/>
+          <p:cNvCxnSpPr>
+            <a:stCxn id="62" idx="2"/>
+            <a:endCxn id="53" idx="0"/>
+          </p:cNvCxnSpPr>
+          <p:nvPr/>
+        </p:nvCxnSpPr>
+        <p:spPr>
+          <a:xfrm>
+            <a:off x="1430875" y="3384505"/>
+            <a:ext cx="0" cy="494768"/>
+          </a:xfrm>
+          <a:prstGeom prst="straightConnector1">
+            <a:avLst/>
+          </a:prstGeom>
+          <a:ln>
+            <a:solidFill>
+              <a:schemeClr val="tx1">
+                <a:lumMod val="65000"/>
+                <a:lumOff val="35000"/>
+              </a:schemeClr>
+            </a:solidFill>
+            <a:tailEnd type="arrow"/>
+          </a:ln>
+        </p:spPr>
+        <p:style>
+          <a:lnRef idx="2">
+            <a:schemeClr val="accent1"/>
+          </a:lnRef>
+          <a:fillRef idx="0">
+            <a:schemeClr val="accent1"/>
+          </a:fillRef>
+          <a:effectRef idx="1">
+            <a:schemeClr val="accent1"/>
+          </a:effectRef>
+          <a:fontRef idx="minor">
+            <a:schemeClr val="tx1"/>
+          </a:fontRef>
+        </p:style>
+      </p:cxnSp>
+      <p:cxnSp>
+        <p:nvCxnSpPr>
+          <p:cNvPr id="61" name="カギ線コネクタ 60"/>
+          <p:cNvCxnSpPr>
+            <a:stCxn id="53" idx="3"/>
+            <a:endCxn id="58" idx="1"/>
+          </p:cNvCxnSpPr>
+          <p:nvPr/>
+        </p:nvCxnSpPr>
+        <p:spPr>
+          <a:xfrm flipV="1">
+            <a:off x="2022923" y="4123973"/>
+            <a:ext cx="738680" cy="1"/>
+          </a:xfrm>
+          <a:prstGeom prst="bentConnector3">
+            <a:avLst>
+              <a:gd name="adj1" fmla="val 50000"/>
+            </a:avLst>
+          </a:prstGeom>
+          <a:ln>
+            <a:solidFill>
+              <a:schemeClr val="tx1">
+                <a:lumMod val="65000"/>
+                <a:lumOff val="35000"/>
+              </a:schemeClr>
+            </a:solidFill>
+            <a:tailEnd type="arrow"/>
+          </a:ln>
+        </p:spPr>
+        <p:style>
+          <a:lnRef idx="2">
+            <a:schemeClr val="accent1"/>
+          </a:lnRef>
+          <a:fillRef idx="0">
+            <a:schemeClr val="accent1"/>
+          </a:fillRef>
+          <a:effectRef idx="1">
+            <a:schemeClr val="accent1"/>
+          </a:effectRef>
+          <a:fontRef idx="minor">
+            <a:schemeClr val="tx1"/>
+          </a:fontRef>
+        </p:style>
+      </p:cxnSp>
+      <p:sp>
+        <p:nvSpPr>
+          <p:cNvPr id="64" name="正方形/長方形 63"/>
+          <p:cNvSpPr/>
+          <p:nvPr/>
+        </p:nvSpPr>
+        <p:spPr>
+          <a:xfrm>
+            <a:off x="2039402" y="3746301"/>
+            <a:ext cx="551020" cy="274618"/>
+          </a:xfrm>
+          <a:prstGeom prst="rect">
+            <a:avLst/>
+          </a:prstGeom>
+          <a:noFill/>
+          <a:ln>
+            <a:noFill/>
+          </a:ln>
+        </p:spPr>
+        <p:style>
+          <a:lnRef idx="2">
+            <a:schemeClr val="accent1">
+              <a:shade val="50000"/>
+            </a:schemeClr>
+          </a:lnRef>
+          <a:fillRef idx="1">
+            <a:schemeClr val="accent1"/>
+          </a:fillRef>
+          <a:effectRef idx="0">
+            <a:schemeClr val="accent1"/>
+          </a:effectRef>
+          <a:fontRef idx="minor">
+            <a:schemeClr val="lt1"/>
+          </a:fontRef>
+        </p:style>
+        <p:txBody>
+          <a:bodyPr rtlCol="0" anchor="t"/>
+          <a:lstStyle/>
+          <a:p>
+            <a:r>
+              <a:rPr lang="en-US" altLang="ja-JP" dirty="0">
+                <a:solidFill>
+                  <a:schemeClr val="tx1"/>
+                </a:solidFill>
+              </a:rPr>
+              <a:t>(3)</a:t>
+            </a:r>
+            <a:endParaRPr lang="ja-JP" altLang="en-US" dirty="0">
+              <a:solidFill>
+                <a:schemeClr val="tx1"/>
+              </a:solidFill>
+            </a:endParaRPr>
+          </a:p>
+        </p:txBody>
+      </p:sp>
+      <p:sp>
+        <p:nvSpPr>
+          <p:cNvPr id="66" name="正方形/長方形 65"/>
+          <p:cNvSpPr/>
+          <p:nvPr/>
+        </p:nvSpPr>
+        <p:spPr>
+          <a:xfrm>
+            <a:off x="2008884" y="4168474"/>
+            <a:ext cx="585462" cy="402068"/>
+          </a:xfrm>
+          <a:prstGeom prst="rect">
+            <a:avLst/>
+          </a:prstGeom>
+          <a:noFill/>
+          <a:ln>
+            <a:noFill/>
+          </a:ln>
+        </p:spPr>
+        <p:style>
+          <a:lnRef idx="2">
+            <a:schemeClr val="accent1">
+              <a:shade val="50000"/>
+            </a:schemeClr>
+          </a:lnRef>
+          <a:fillRef idx="1">
+            <a:schemeClr val="accent1"/>
+          </a:fillRef>
+          <a:effectRef idx="0">
+            <a:schemeClr val="accent1"/>
+          </a:effectRef>
+          <a:fontRef idx="minor">
+            <a:schemeClr val="lt1"/>
+          </a:fontRef>
+        </p:style>
+        <p:txBody>
+          <a:bodyPr rtlCol="0" anchor="t"/>
+          <a:lstStyle/>
+          <a:p>
+            <a:r>
+              <a:rPr lang="en-US" altLang="ja-JP" dirty="0">
+                <a:solidFill>
+                  <a:schemeClr val="tx1"/>
+                </a:solidFill>
+              </a:rPr>
+              <a:t>(</a:t>
+            </a:r>
+            <a:r>
+              <a:rPr lang="en-US" altLang="ja-JP" dirty="0" smtClean="0">
+                <a:solidFill>
+                  <a:schemeClr val="tx1"/>
+                </a:solidFill>
+              </a:rPr>
+              <a:t>10)</a:t>
+            </a:r>
+            <a:endParaRPr lang="ja-JP" altLang="en-US" dirty="0">
+              <a:solidFill>
+                <a:schemeClr val="tx1"/>
+              </a:solidFill>
+            </a:endParaRPr>
           </a:p>
         </p:txBody>
       </p:sp>
@@ -6293,8 +6552,8 @@
         </p:blipFill>
         <p:spPr bwMode="auto">
           <a:xfrm>
-            <a:off x="719913" y="-250284"/>
-            <a:ext cx="1965229" cy="2035823"/>
+            <a:off x="539935" y="1812538"/>
+            <a:ext cx="1473922" cy="1526867"/>
           </a:xfrm>
           <a:prstGeom prst="rect">
             <a:avLst/>
@@ -6319,8 +6578,8 @@
         </p:blipFill>
         <p:spPr bwMode="auto">
           <a:xfrm>
-            <a:off x="3390541" y="-227073"/>
-            <a:ext cx="1965229" cy="2035823"/>
+            <a:off x="2542906" y="1829946"/>
+            <a:ext cx="1473922" cy="1526867"/>
           </a:xfrm>
           <a:prstGeom prst="rect">
             <a:avLst/>
@@ -6345,8 +6604,8 @@
         </p:blipFill>
         <p:spPr bwMode="auto">
           <a:xfrm>
-            <a:off x="6365969" y="-250285"/>
-            <a:ext cx="1965229" cy="2035823"/>
+            <a:off x="4774477" y="1812537"/>
+            <a:ext cx="1473922" cy="1526867"/>
           </a:xfrm>
           <a:prstGeom prst="rect">
             <a:avLst/>
@@ -6362,8 +6621,8 @@
         </p:nvSpPr>
         <p:spPr>
           <a:xfrm>
-            <a:off x="2373303" y="2041401"/>
-            <a:ext cx="1118838" cy="583137"/>
+            <a:off x="1779977" y="3531302"/>
+            <a:ext cx="839129" cy="437353"/>
           </a:xfrm>
           <a:prstGeom prst="roundRect">
             <a:avLst/>
@@ -6389,10 +6648,10 @@
           <a:p>
             <a:pPr algn="ctr"/>
             <a:r>
-              <a:rPr lang="en-US" altLang="ja-JP" sz="1200" b="1" dirty="0" smtClean="0"/>
+              <a:rPr lang="en-US" altLang="ja-JP" sz="900" b="1" dirty="0"/>
               <a:t>Controller</a:t>
             </a:r>
-            <a:endParaRPr lang="ja-JP" altLang="en-US" sz="1200" b="1" dirty="0"/>
+            <a:endParaRPr lang="ja-JP" altLang="en-US" sz="900" b="1" dirty="0"/>
           </a:p>
         </p:txBody>
       </p:sp>
@@ -6406,8 +6665,8 @@
         </p:nvCxnSpPr>
         <p:spPr>
           <a:xfrm rot="16200000" flipH="1">
-            <a:off x="1584089" y="1543756"/>
-            <a:ext cx="975868" cy="602560"/>
+            <a:off x="1188067" y="3158067"/>
+            <a:ext cx="731901" cy="451920"/>
           </a:xfrm>
           <a:prstGeom prst="bentConnector2">
             <a:avLst/>
@@ -6447,8 +6706,8 @@
         </p:nvSpPr>
         <p:spPr bwMode="auto">
           <a:xfrm>
-            <a:off x="3390541" y="3833164"/>
-            <a:ext cx="2384728" cy="1988456"/>
+            <a:off x="2542907" y="4875123"/>
+            <a:ext cx="1788546" cy="1491342"/>
           </a:xfrm>
           <a:custGeom>
             <a:avLst/>
@@ -6611,7 +6870,7 @@
           </a:effectLst>
         </p:spPr>
         <p:txBody>
-          <a:bodyPr vert="horz" wrap="square" lIns="91440" tIns="45720" rIns="91440" bIns="45720" numCol="1" anchor="b" anchorCtr="0" compatLnSpc="1">
+          <a:bodyPr vert="horz" wrap="square" lIns="68580" tIns="34290" rIns="68580" bIns="34290" numCol="1" anchor="b" anchorCtr="0" compatLnSpc="1">
             <a:prstTxWarp prst="textNoShape">
               <a:avLst/>
             </a:prstTxWarp>
@@ -6620,18 +6879,10 @@
           <a:p>
             <a:pPr algn="ctr"/>
             <a:r>
-              <a:rPr lang="en-US" altLang="ja-JP" dirty="0" smtClean="0"/>
-              <a:t>Upload Temporary</a:t>
-            </a:r>
-            <a:r>
-              <a:rPr lang="en-US" altLang="ja-JP" dirty="0"/>
-              <a:t> </a:t>
-            </a:r>
-            <a:r>
-              <a:rPr lang="en-US" altLang="ja-JP" dirty="0" smtClean="0"/>
-              <a:t>directory</a:t>
-            </a:r>
-            <a:endParaRPr lang="ja-JP" altLang="en-US" dirty="0"/>
+              <a:rPr lang="en-US" altLang="ja-JP" sz="1350" dirty="0"/>
+              <a:t>Upload Temporary directory</a:t>
+            </a:r>
+            <a:endParaRPr lang="ja-JP" altLang="en-US" sz="1350" dirty="0"/>
           </a:p>
         </p:txBody>
       </p:sp>
@@ -6645,8 +6896,8 @@
         </p:nvSpPr>
         <p:spPr bwMode="auto">
           <a:xfrm>
-            <a:off x="6370883" y="3807549"/>
-            <a:ext cx="2413666" cy="1988456"/>
+            <a:off x="4778163" y="4855913"/>
+            <a:ext cx="1810250" cy="1491342"/>
           </a:xfrm>
           <a:custGeom>
             <a:avLst/>
@@ -6809,7 +7060,7 @@
           </a:effectLst>
         </p:spPr>
         <p:txBody>
-          <a:bodyPr vert="horz" wrap="square" lIns="91440" tIns="45720" rIns="91440" bIns="45720" numCol="1" anchor="b" anchorCtr="0" compatLnSpc="1">
+          <a:bodyPr vert="horz" wrap="square" lIns="68580" tIns="34290" rIns="68580" bIns="34290" numCol="1" anchor="b" anchorCtr="0" compatLnSpc="1">
             <a:prstTxWarp prst="textNoShape">
               <a:avLst/>
             </a:prstTxWarp>
@@ -6818,14 +7069,10 @@
           <a:p>
             <a:pPr algn="ctr"/>
             <a:r>
-              <a:rPr lang="en-US" altLang="ja-JP" dirty="0" smtClean="0"/>
-              <a:t>Upload </a:t>
-            </a:r>
-            <a:r>
-              <a:rPr lang="en-US" altLang="ja-JP" dirty="0"/>
-              <a:t>directory</a:t>
-            </a:r>
-            <a:endParaRPr lang="ja-JP" altLang="en-US" dirty="0"/>
+              <a:rPr lang="en-US" altLang="ja-JP" sz="1350" dirty="0"/>
+              <a:t>Upload directory</a:t>
+            </a:r>
+            <a:endParaRPr lang="ja-JP" altLang="en-US" sz="1350" dirty="0"/>
           </a:p>
         </p:txBody>
       </p:sp>
@@ -6837,8 +7084,8 @@
         </p:nvSpPr>
         <p:spPr>
           <a:xfrm>
-            <a:off x="4081919" y="4257703"/>
-            <a:ext cx="986972" cy="747486"/>
+            <a:off x="3061440" y="5193527"/>
+            <a:ext cx="740229" cy="560615"/>
           </a:xfrm>
           <a:prstGeom prst="flowChartDocument">
             <a:avLst/>
@@ -6873,7 +7120,7 @@
           <a:p>
             <a:pPr algn="ctr"/>
             <a:r>
-              <a:rPr kumimoji="1" lang="en-US" altLang="ja-JP" sz="1400" dirty="0" smtClean="0">
+              <a:rPr lang="en-US" altLang="ja-JP" sz="1050" dirty="0">
                 <a:solidFill>
                   <a:schemeClr val="tx1">
                     <a:lumMod val="50000"/>
@@ -6887,7 +7134,7 @@
           <a:p>
             <a:pPr algn="ctr"/>
             <a:r>
-              <a:rPr lang="en-US" altLang="ja-JP" sz="1400" dirty="0" smtClean="0">
+              <a:rPr lang="en-US" altLang="ja-JP" sz="1050" dirty="0">
                 <a:solidFill>
                   <a:schemeClr val="tx1">
                     <a:lumMod val="50000"/>
@@ -6897,7 +7144,7 @@
               </a:rPr>
               <a:t>File</a:t>
             </a:r>
-            <a:endParaRPr kumimoji="1" lang="ja-JP" altLang="en-US" sz="1400" dirty="0">
+            <a:endParaRPr lang="ja-JP" altLang="en-US" sz="1050" dirty="0">
               <a:solidFill>
                 <a:schemeClr val="tx1">
                   <a:lumMod val="50000"/>
@@ -6916,8 +7163,8 @@
         </p:nvSpPr>
         <p:spPr>
           <a:xfrm>
-            <a:off x="6788832" y="4257703"/>
-            <a:ext cx="986972" cy="747486"/>
+            <a:off x="5091625" y="5193527"/>
+            <a:ext cx="740229" cy="560615"/>
           </a:xfrm>
           <a:prstGeom prst="flowChartDocument">
             <a:avLst/>
@@ -6951,7 +7198,7 @@
           <a:p>
             <a:pPr algn="ctr"/>
             <a:r>
-              <a:rPr kumimoji="1" lang="en-US" altLang="ja-JP" sz="1400" dirty="0" smtClean="0">
+              <a:rPr lang="en-US" altLang="ja-JP" sz="1050" dirty="0">
                 <a:solidFill>
                   <a:schemeClr val="tx1"/>
                 </a:solidFill>
@@ -6962,14 +7209,14 @@
           <a:p>
             <a:pPr algn="ctr"/>
             <a:r>
-              <a:rPr lang="en-US" altLang="ja-JP" sz="1400" dirty="0" smtClean="0">
+              <a:rPr lang="en-US" altLang="ja-JP" sz="1050" dirty="0">
                 <a:solidFill>
                   <a:schemeClr val="tx1"/>
                 </a:solidFill>
               </a:rPr>
               <a:t>File</a:t>
             </a:r>
-            <a:endParaRPr kumimoji="1" lang="ja-JP" altLang="en-US" sz="1400" dirty="0">
+            <a:endParaRPr lang="ja-JP" altLang="en-US" sz="1050" dirty="0">
               <a:solidFill>
                 <a:schemeClr val="tx1"/>
               </a:solidFill>
@@ -6985,8 +7232,8 @@
         </p:nvSpPr>
         <p:spPr>
           <a:xfrm>
-            <a:off x="5247132" y="2005116"/>
-            <a:ext cx="1118838" cy="583137"/>
+            <a:off x="3935349" y="3504088"/>
+            <a:ext cx="839129" cy="437353"/>
           </a:xfrm>
           <a:prstGeom prst="roundRect">
             <a:avLst/>
@@ -7012,10 +7259,10 @@
           <a:p>
             <a:pPr algn="ctr"/>
             <a:r>
-              <a:rPr lang="en-US" altLang="ja-JP" sz="1200" b="1" dirty="0" smtClean="0"/>
+              <a:rPr lang="en-US" altLang="ja-JP" sz="900" b="1" dirty="0"/>
               <a:t>Controller</a:t>
             </a:r>
-            <a:endParaRPr lang="ja-JP" altLang="en-US" sz="1200" b="1" dirty="0"/>
+            <a:endParaRPr lang="ja-JP" altLang="en-US" sz="900" b="1" dirty="0"/>
           </a:p>
         </p:txBody>
       </p:sp>
@@ -7030,8 +7277,8 @@
         </p:nvCxnSpPr>
         <p:spPr>
           <a:xfrm rot="16200000" flipH="1">
-            <a:off x="2503866" y="3053393"/>
-            <a:ext cx="2006908" cy="1149197"/>
+            <a:off x="1877900" y="4290296"/>
+            <a:ext cx="1505181" cy="861898"/>
           </a:xfrm>
           <a:prstGeom prst="bentConnector2">
             <a:avLst/>
@@ -7069,8 +7316,8 @@
         </p:nvCxnSpPr>
         <p:spPr>
           <a:xfrm rot="5400000" flipH="1" flipV="1">
-            <a:off x="2693252" y="1091567"/>
-            <a:ext cx="1189305" cy="710364"/>
+            <a:off x="2025711" y="2824697"/>
+            <a:ext cx="880437" cy="532774"/>
           </a:xfrm>
           <a:prstGeom prst="bentConnector2">
             <a:avLst/>
@@ -7110,8 +7357,8 @@
         </p:nvCxnSpPr>
         <p:spPr>
           <a:xfrm rot="16200000" flipH="1">
-            <a:off x="4340516" y="1390068"/>
-            <a:ext cx="971695" cy="841537"/>
+            <a:off x="3255388" y="3042802"/>
+            <a:ext cx="728771" cy="631153"/>
           </a:xfrm>
           <a:prstGeom prst="bentConnector2">
             <a:avLst/>
@@ -7152,8 +7399,8 @@
         </p:nvCxnSpPr>
         <p:spPr>
           <a:xfrm rot="5400000" flipH="1" flipV="1">
-            <a:off x="5628766" y="1029881"/>
-            <a:ext cx="1153020" cy="797450"/>
+            <a:off x="4227346" y="2778434"/>
+            <a:ext cx="853223" cy="598087"/>
           </a:xfrm>
           <a:prstGeom prst="bentConnector2">
             <a:avLst/>
@@ -7191,8 +7438,8 @@
         </p:nvSpPr>
         <p:spPr>
           <a:xfrm>
-            <a:off x="1238070" y="482188"/>
-            <a:ext cx="914400" cy="646331"/>
+            <a:off x="928553" y="2361892"/>
+            <a:ext cx="685800" cy="507831"/>
           </a:xfrm>
           <a:prstGeom prst="rect">
             <a:avLst/>
@@ -7207,17 +7454,17 @@
           <a:p>
             <a:pPr algn="ctr"/>
             <a:r>
-              <a:rPr kumimoji="1" lang="en-US" altLang="ja-JP" dirty="0" smtClean="0"/>
+              <a:rPr lang="en-US" altLang="ja-JP" sz="1350" dirty="0"/>
               <a:t>Input</a:t>
             </a:r>
           </a:p>
           <a:p>
             <a:pPr algn="ctr"/>
             <a:r>
-              <a:rPr lang="en-US" altLang="ja-JP" dirty="0" smtClean="0"/>
+              <a:rPr lang="en-US" altLang="ja-JP" sz="1350" dirty="0"/>
               <a:t>Screen</a:t>
             </a:r>
-            <a:endParaRPr kumimoji="1" lang="ja-JP" altLang="en-US" dirty="0"/>
+            <a:endParaRPr lang="ja-JP" altLang="en-US" sz="1350" dirty="0"/>
           </a:p>
         </p:txBody>
       </p:sp>
@@ -7229,8 +7476,8 @@
         </p:nvSpPr>
         <p:spPr>
           <a:xfrm>
-            <a:off x="1350246" y="1598373"/>
-            <a:ext cx="833953" cy="493323"/>
+            <a:off x="1012685" y="3199030"/>
+            <a:ext cx="625465" cy="369992"/>
           </a:xfrm>
           <a:prstGeom prst="flowChartDocument">
             <a:avLst/>
@@ -7264,7 +7511,7 @@
           <a:p>
             <a:pPr algn="ctr"/>
             <a:r>
-              <a:rPr kumimoji="1" lang="en-US" altLang="ja-JP" sz="1400" dirty="0" smtClean="0">
+              <a:rPr lang="en-US" altLang="ja-JP" sz="1050" dirty="0">
                 <a:solidFill>
                   <a:schemeClr val="tx1"/>
                 </a:solidFill>
@@ -7275,14 +7522,14 @@
           <a:p>
             <a:pPr algn="ctr"/>
             <a:r>
-              <a:rPr lang="en-US" altLang="ja-JP" sz="1400" dirty="0" smtClean="0">
+              <a:rPr lang="en-US" altLang="ja-JP" sz="1050" dirty="0">
                 <a:solidFill>
                   <a:schemeClr val="tx1"/>
                 </a:solidFill>
               </a:rPr>
               <a:t>File</a:t>
             </a:r>
-            <a:endParaRPr kumimoji="1" lang="ja-JP" altLang="en-US" sz="1400" dirty="0">
+            <a:endParaRPr lang="ja-JP" altLang="en-US" sz="1050" dirty="0">
               <a:solidFill>
                 <a:schemeClr val="tx1"/>
               </a:solidFill>
@@ -7298,8 +7545,8 @@
         </p:nvSpPr>
         <p:spPr>
           <a:xfrm>
-            <a:off x="3643086" y="528930"/>
-            <a:ext cx="1487713" cy="646331"/>
+            <a:off x="2732316" y="2396949"/>
+            <a:ext cx="1115785" cy="507831"/>
           </a:xfrm>
           <a:prstGeom prst="rect">
             <a:avLst/>
@@ -7314,17 +7561,17 @@
           <a:p>
             <a:pPr algn="ctr"/>
             <a:r>
-              <a:rPr kumimoji="1" lang="en-US" altLang="ja-JP" dirty="0" smtClean="0"/>
+              <a:rPr lang="en-US" altLang="ja-JP" sz="1350" dirty="0"/>
               <a:t>Confirm</a:t>
             </a:r>
           </a:p>
           <a:p>
             <a:pPr algn="ctr"/>
             <a:r>
-              <a:rPr lang="en-US" altLang="ja-JP" dirty="0" smtClean="0"/>
+              <a:rPr lang="en-US" altLang="ja-JP" sz="1350" dirty="0"/>
               <a:t>Screen</a:t>
             </a:r>
-            <a:endParaRPr kumimoji="1" lang="ja-JP" altLang="en-US" dirty="0"/>
+            <a:endParaRPr lang="ja-JP" altLang="en-US" sz="1350" dirty="0"/>
           </a:p>
         </p:txBody>
       </p:sp>
@@ -7336,8 +7583,8 @@
         </p:nvSpPr>
         <p:spPr>
           <a:xfrm>
-            <a:off x="6604001" y="528930"/>
-            <a:ext cx="1465942" cy="646331"/>
+            <a:off x="4953001" y="2396949"/>
+            <a:ext cx="1099457" cy="507831"/>
           </a:xfrm>
           <a:prstGeom prst="rect">
             <a:avLst/>
@@ -7352,17 +7599,17 @@
           <a:p>
             <a:pPr algn="ctr"/>
             <a:r>
-              <a:rPr kumimoji="1" lang="en-US" altLang="ja-JP" dirty="0" smtClean="0"/>
+              <a:rPr lang="en-US" altLang="ja-JP" sz="1350" dirty="0"/>
               <a:t>Complete</a:t>
             </a:r>
           </a:p>
           <a:p>
             <a:pPr algn="ctr"/>
             <a:r>
-              <a:rPr lang="en-US" altLang="ja-JP" dirty="0" smtClean="0"/>
+              <a:rPr lang="en-US" altLang="ja-JP" sz="1350" dirty="0"/>
               <a:t>Screen</a:t>
             </a:r>
-            <a:endParaRPr kumimoji="1" lang="ja-JP" altLang="en-US" dirty="0"/>
+            <a:endParaRPr lang="ja-JP" altLang="en-US" sz="1350" dirty="0"/>
           </a:p>
         </p:txBody>
       </p:sp>
@@ -7374,8 +7621,8 @@
         </p:nvSpPr>
         <p:spPr>
           <a:xfrm>
-            <a:off x="1350246" y="2296685"/>
-            <a:ext cx="734693" cy="536091"/>
+            <a:off x="1012685" y="3722764"/>
+            <a:ext cx="551020" cy="402068"/>
           </a:xfrm>
           <a:prstGeom prst="rect">
             <a:avLst/>
@@ -7406,14 +7653,14 @@
           <a:lstStyle/>
           <a:p>
             <a:r>
-              <a:rPr kumimoji="1" lang="en-US" altLang="ja-JP" sz="2400" dirty="0" smtClean="0">
+              <a:rPr lang="en-US" altLang="ja-JP" dirty="0">
                 <a:solidFill>
                   <a:schemeClr val="tx1"/>
                 </a:solidFill>
               </a:rPr>
               <a:t>(1)</a:t>
             </a:r>
-            <a:endParaRPr kumimoji="1" lang="ja-JP" altLang="en-US" sz="2400" dirty="0">
+            <a:endParaRPr lang="ja-JP" altLang="en-US" dirty="0">
               <a:solidFill>
                 <a:schemeClr val="tx1"/>
               </a:solidFill>
@@ -7429,8 +7676,8 @@
         </p:nvSpPr>
         <p:spPr>
           <a:xfrm>
-            <a:off x="2818184" y="4733990"/>
-            <a:ext cx="734693" cy="536091"/>
+            <a:off x="2113639" y="5550743"/>
+            <a:ext cx="551020" cy="402068"/>
           </a:xfrm>
           <a:prstGeom prst="rect">
             <a:avLst/>
@@ -7461,14 +7708,14 @@
           <a:lstStyle/>
           <a:p>
             <a:r>
-              <a:rPr kumimoji="1" lang="en-US" altLang="ja-JP" sz="2400" dirty="0" smtClean="0">
+              <a:rPr lang="en-US" altLang="ja-JP" dirty="0">
                 <a:solidFill>
                   <a:schemeClr val="tx1"/>
                 </a:solidFill>
               </a:rPr>
               <a:t>(2)</a:t>
             </a:r>
-            <a:endParaRPr kumimoji="1" lang="ja-JP" altLang="en-US" sz="2400" dirty="0">
+            <a:endParaRPr lang="ja-JP" altLang="en-US" dirty="0">
               <a:solidFill>
                 <a:schemeClr val="tx1"/>
               </a:solidFill>
@@ -7484,8 +7731,8 @@
         </p:nvSpPr>
         <p:spPr>
           <a:xfrm>
-            <a:off x="2767624" y="333584"/>
-            <a:ext cx="734693" cy="536091"/>
+            <a:off x="2075719" y="2250439"/>
+            <a:ext cx="551020" cy="402068"/>
           </a:xfrm>
           <a:prstGeom prst="rect">
             <a:avLst/>
@@ -7516,14 +7763,14 @@
           <a:lstStyle/>
           <a:p>
             <a:r>
-              <a:rPr kumimoji="1" lang="en-US" altLang="ja-JP" sz="2400" dirty="0" smtClean="0">
+              <a:rPr lang="en-US" altLang="ja-JP" dirty="0">
                 <a:solidFill>
                   <a:schemeClr val="tx1"/>
                 </a:solidFill>
               </a:rPr>
               <a:t>(3)</a:t>
             </a:r>
-            <a:endParaRPr kumimoji="1" lang="ja-JP" altLang="en-US" sz="2400" dirty="0">
+            <a:endParaRPr lang="ja-JP" altLang="en-US" dirty="0">
               <a:solidFill>
                 <a:schemeClr val="tx1"/>
               </a:solidFill>
@@ -7539,8 +7786,8 @@
         </p:nvSpPr>
         <p:spPr>
           <a:xfrm>
-            <a:off x="4450080" y="1623344"/>
-            <a:ext cx="734693" cy="536091"/>
+            <a:off x="3337561" y="3217759"/>
+            <a:ext cx="551020" cy="402068"/>
           </a:xfrm>
           <a:prstGeom prst="rect">
             <a:avLst/>
@@ -7571,14 +7818,14 @@
           <a:lstStyle/>
           <a:p>
             <a:r>
-              <a:rPr kumimoji="1" lang="en-US" altLang="ja-JP" sz="2400" dirty="0" smtClean="0">
+              <a:rPr lang="en-US" altLang="ja-JP" dirty="0">
                 <a:solidFill>
                   <a:schemeClr val="tx1"/>
                 </a:solidFill>
               </a:rPr>
               <a:t>(4)</a:t>
             </a:r>
-            <a:endParaRPr kumimoji="1" lang="ja-JP" altLang="en-US" sz="2400" dirty="0">
+            <a:endParaRPr lang="ja-JP" altLang="en-US" dirty="0">
               <a:solidFill>
                 <a:schemeClr val="tx1"/>
               </a:solidFill>
@@ -7594,8 +7841,8 @@
         </p:nvSpPr>
         <p:spPr>
           <a:xfrm>
-            <a:off x="5692012" y="3976049"/>
-            <a:ext cx="734693" cy="536091"/>
+            <a:off x="4269010" y="4982287"/>
+            <a:ext cx="551020" cy="402068"/>
           </a:xfrm>
           <a:prstGeom prst="rect">
             <a:avLst/>
@@ -7626,14 +7873,14 @@
           <a:lstStyle/>
           <a:p>
             <a:r>
-              <a:rPr kumimoji="1" lang="en-US" altLang="ja-JP" sz="2400" dirty="0" smtClean="0">
+              <a:rPr lang="en-US" altLang="ja-JP" dirty="0">
                 <a:solidFill>
                   <a:schemeClr val="tx1"/>
                 </a:solidFill>
               </a:rPr>
               <a:t>(6)</a:t>
             </a:r>
-            <a:endParaRPr kumimoji="1" lang="ja-JP" altLang="en-US" sz="2400" dirty="0">
+            <a:endParaRPr lang="ja-JP" altLang="en-US" dirty="0">
               <a:solidFill>
                 <a:schemeClr val="tx1"/>
               </a:solidFill>
@@ -7649,8 +7896,8 @@
         </p:nvSpPr>
         <p:spPr>
           <a:xfrm>
-            <a:off x="5775269" y="333584"/>
-            <a:ext cx="734693" cy="536091"/>
+            <a:off x="4331453" y="2250439"/>
+            <a:ext cx="551020" cy="402068"/>
           </a:xfrm>
           <a:prstGeom prst="rect">
             <a:avLst/>
@@ -7681,14 +7928,14 @@
           <a:lstStyle/>
           <a:p>
             <a:r>
-              <a:rPr kumimoji="1" lang="en-US" altLang="ja-JP" sz="2400" dirty="0" smtClean="0">
+              <a:rPr lang="en-US" altLang="ja-JP" dirty="0">
                 <a:solidFill>
                   <a:schemeClr val="tx1"/>
                 </a:solidFill>
               </a:rPr>
               <a:t>(7)</a:t>
             </a:r>
-            <a:endParaRPr kumimoji="1" lang="ja-JP" altLang="en-US" sz="2400" dirty="0">
+            <a:endParaRPr lang="ja-JP" altLang="en-US" dirty="0">
               <a:solidFill>
                 <a:schemeClr val="tx1"/>
               </a:solidFill>
@@ -7704,8 +7951,8 @@
         </p:nvSpPr>
         <p:spPr>
           <a:xfrm>
-            <a:off x="682387" y="3737453"/>
-            <a:ext cx="1690916" cy="630681"/>
+            <a:off x="511790" y="4803340"/>
+            <a:ext cx="1268187" cy="473011"/>
           </a:xfrm>
           <a:prstGeom prst="borderCallout2">
             <a:avLst>
@@ -7746,7 +7993,7 @@
           <a:p>
             <a:pPr algn="ctr"/>
             <a:r>
-              <a:rPr kumimoji="1" lang="en-US" altLang="ja-JP" dirty="0" smtClean="0">
+              <a:rPr lang="en-US" altLang="ja-JP" sz="1350" dirty="0">
                 <a:solidFill>
                   <a:schemeClr val="tx1"/>
                 </a:solidFill>
@@ -7757,14 +8004,14 @@
           <a:p>
             <a:pPr algn="ctr"/>
             <a:r>
-              <a:rPr lang="en-US" altLang="ja-JP" dirty="0" smtClean="0">
+              <a:rPr lang="en-US" altLang="ja-JP" sz="1350" dirty="0">
                 <a:solidFill>
                   <a:schemeClr val="tx1"/>
                 </a:solidFill>
               </a:rPr>
               <a:t>Upload</a:t>
             </a:r>
-            <a:endParaRPr kumimoji="1" lang="ja-JP" altLang="en-US" dirty="0">
+            <a:endParaRPr lang="ja-JP" altLang="en-US" sz="1350" dirty="0">
               <a:solidFill>
                 <a:schemeClr val="tx1"/>
               </a:solidFill>
@@ -7782,8 +8029,8 @@
         </p:nvSpPr>
         <p:spPr bwMode="auto">
           <a:xfrm>
-            <a:off x="7186179" y="5739669"/>
-            <a:ext cx="1590373" cy="825258"/>
+            <a:off x="5389635" y="6305002"/>
+            <a:ext cx="1192780" cy="618944"/>
           </a:xfrm>
           <a:prstGeom prst="flowChartMagneticDisk">
             <a:avLst/>
@@ -7808,38 +8055,26 @@
           </a:fontRef>
         </p:style>
         <p:txBody>
-          <a:bodyPr vert="horz" wrap="square" lIns="74295" tIns="8890" rIns="74295" bIns="8890" numCol="1" anchor="t" anchorCtr="0" compatLnSpc="1">
+          <a:bodyPr vert="horz" wrap="square" lIns="55721" tIns="6668" rIns="55721" bIns="6668" numCol="1" anchor="t" anchorCtr="0" compatLnSpc="1">
             <a:prstTxWarp prst="textNoShape">
               <a:avLst/>
             </a:prstTxWarp>
           </a:bodyPr>
           <a:lstStyle/>
           <a:p>
-            <a:pPr marL="0" marR="0" lvl="0" indent="0" algn="ctr" defTabSz="914400" rtl="0" eaLnBrk="1" fontAlgn="base" latinLnBrk="0" hangingPunct="1">
-              <a:lnSpc>
-                <a:spcPct val="100000"/>
-              </a:lnSpc>
+            <a:pPr algn="ctr" defTabSz="685784" fontAlgn="base">
               <a:spcBef>
                 <a:spcPct val="0"/>
               </a:spcBef>
               <a:spcAft>
                 <a:spcPct val="0"/>
               </a:spcAft>
-              <a:buClrTx/>
-              <a:buSzTx/>
-              <a:buFontTx/>
-              <a:buNone/>
-              <a:tabLst/>
             </a:pPr>
             <a:r>
-              <a:rPr kumimoji="1" lang="en-US" altLang="ja-JP" sz="1800" b="0" i="0" u="none" strike="noStrike" cap="none" normalizeH="0" baseline="0" dirty="0" smtClean="0">
-                <a:ln>
-                  <a:noFill/>
-                </a:ln>
+              <a:rPr lang="en-US" altLang="ja-JP" sz="1350" dirty="0">
                 <a:solidFill>
                   <a:schemeClr val="bg1"/>
                 </a:solidFill>
-                <a:effectLst/>
                 <a:latin typeface="Arial" pitchFamily="34" charset="0"/>
                 <a:ea typeface="ＭＳ Ｐゴシック" pitchFamily="50" charset="-128"/>
                 <a:cs typeface="ＭＳ Ｐゴシック" pitchFamily="50" charset="-128"/>
@@ -7857,8 +8092,8 @@
         </p:nvSpPr>
         <p:spPr>
           <a:xfrm>
-            <a:off x="6708359" y="5821060"/>
-            <a:ext cx="734693" cy="536091"/>
+            <a:off x="5031270" y="6366046"/>
+            <a:ext cx="551020" cy="402068"/>
           </a:xfrm>
           <a:prstGeom prst="rect">
             <a:avLst/>
@@ -7889,14 +8124,14 @@
           <a:lstStyle/>
           <a:p>
             <a:r>
-              <a:rPr kumimoji="1" lang="en-US" altLang="ja-JP" sz="2400" dirty="0" smtClean="0">
+              <a:rPr lang="en-US" altLang="ja-JP" dirty="0">
                 <a:solidFill>
                   <a:schemeClr val="tx1"/>
                 </a:solidFill>
               </a:rPr>
               <a:t>or</a:t>
             </a:r>
-            <a:endParaRPr kumimoji="1" lang="ja-JP" altLang="en-US" sz="2400" dirty="0">
+            <a:endParaRPr lang="ja-JP" altLang="en-US" dirty="0">
               <a:solidFill>
                 <a:schemeClr val="tx1"/>
               </a:solidFill>
@@ -7912,8 +8147,8 @@
         </p:nvSpPr>
         <p:spPr>
           <a:xfrm>
-            <a:off x="5244788" y="3011653"/>
-            <a:ext cx="1118838" cy="583137"/>
+            <a:off x="3933591" y="4258991"/>
+            <a:ext cx="839129" cy="437353"/>
           </a:xfrm>
           <a:prstGeom prst="roundRect">
             <a:avLst/>
@@ -7939,10 +8174,10 @@
           <a:p>
             <a:pPr algn="ctr"/>
             <a:r>
-              <a:rPr lang="en-US" altLang="ja-JP" sz="1200" b="1" dirty="0" smtClean="0"/>
+              <a:rPr lang="en-US" altLang="ja-JP" sz="900" b="1" dirty="0"/>
               <a:t>Service</a:t>
             </a:r>
-            <a:endParaRPr lang="ja-JP" altLang="en-US" sz="1200" b="1" dirty="0"/>
+            <a:endParaRPr lang="ja-JP" altLang="en-US" sz="900" b="1" dirty="0"/>
           </a:p>
         </p:txBody>
       </p:sp>
@@ -7954,8 +8189,8 @@
         </p:nvSpPr>
         <p:spPr>
           <a:xfrm>
-            <a:off x="4445503" y="3434020"/>
-            <a:ext cx="2975611" cy="810076"/>
+            <a:off x="3334129" y="4575766"/>
+            <a:ext cx="2231708" cy="607557"/>
           </a:xfrm>
           <a:prstGeom prst="curvedDownArrow">
             <a:avLst/>
@@ -7984,14 +8219,14 @@
           <a:p>
             <a:pPr algn="ctr"/>
             <a:r>
-              <a:rPr kumimoji="1" lang="en-US" altLang="ja-JP" dirty="0" smtClean="0">
+              <a:rPr lang="en-US" altLang="ja-JP" sz="1350" dirty="0">
                 <a:solidFill>
                   <a:schemeClr val="tx1"/>
                 </a:solidFill>
               </a:rPr>
               <a:t>Move File</a:t>
             </a:r>
-            <a:endParaRPr kumimoji="1" lang="ja-JP" altLang="en-US" dirty="0">
+            <a:endParaRPr lang="ja-JP" altLang="en-US" sz="1350" dirty="0">
               <a:solidFill>
                 <a:schemeClr val="tx1"/>
               </a:solidFill>
@@ -8010,8 +8245,8 @@
         </p:nvCxnSpPr>
         <p:spPr>
           <a:xfrm flipH="1">
-            <a:off x="5804207" y="2588253"/>
-            <a:ext cx="2344" cy="423400"/>
+            <a:off x="4353156" y="3941440"/>
+            <a:ext cx="1758" cy="317550"/>
           </a:xfrm>
           <a:prstGeom prst="straightConnector1">
             <a:avLst/>
@@ -8049,8 +8284,8 @@
         </p:nvSpPr>
         <p:spPr>
           <a:xfrm>
-            <a:off x="5844127" y="2564730"/>
-            <a:ext cx="734693" cy="536091"/>
+            <a:off x="4383096" y="3923799"/>
+            <a:ext cx="551020" cy="402068"/>
           </a:xfrm>
           <a:prstGeom prst="rect">
             <a:avLst/>
@@ -8081,14 +8316,14 @@
           <a:lstStyle/>
           <a:p>
             <a:r>
-              <a:rPr kumimoji="1" lang="en-US" altLang="ja-JP" sz="2400" dirty="0" smtClean="0">
+              <a:rPr lang="en-US" altLang="ja-JP" dirty="0">
                 <a:solidFill>
                   <a:schemeClr val="tx1"/>
                 </a:solidFill>
               </a:rPr>
               <a:t>(5)</a:t>
             </a:r>
-            <a:endParaRPr kumimoji="1" lang="ja-JP" altLang="en-US" sz="2400" dirty="0">
+            <a:endParaRPr lang="ja-JP" altLang="en-US" dirty="0">
               <a:solidFill>
                 <a:schemeClr val="tx1"/>
               </a:solidFill>
@@ -8106,8 +8341,8 @@
         </p:nvSpPr>
         <p:spPr bwMode="auto">
           <a:xfrm>
-            <a:off x="4184896" y="5739669"/>
-            <a:ext cx="1590373" cy="825258"/>
+            <a:off x="3138673" y="6305002"/>
+            <a:ext cx="1192780" cy="618944"/>
           </a:xfrm>
           <a:prstGeom prst="flowChartMagneticDisk">
             <a:avLst/>
@@ -8132,38 +8367,26 @@
           </a:fontRef>
         </p:style>
         <p:txBody>
-          <a:bodyPr vert="horz" wrap="square" lIns="74295" tIns="8890" rIns="74295" bIns="8890" numCol="1" anchor="t" anchorCtr="0" compatLnSpc="1">
+          <a:bodyPr vert="horz" wrap="square" lIns="55721" tIns="6668" rIns="55721" bIns="6668" numCol="1" anchor="t" anchorCtr="0" compatLnSpc="1">
             <a:prstTxWarp prst="textNoShape">
               <a:avLst/>
             </a:prstTxWarp>
           </a:bodyPr>
           <a:lstStyle/>
           <a:p>
-            <a:pPr marL="0" marR="0" lvl="0" indent="0" algn="ctr" defTabSz="914400" rtl="0" eaLnBrk="1" fontAlgn="base" latinLnBrk="0" hangingPunct="1">
-              <a:lnSpc>
-                <a:spcPct val="100000"/>
-              </a:lnSpc>
+            <a:pPr algn="ctr" defTabSz="685784" fontAlgn="base">
               <a:spcBef>
                 <a:spcPct val="0"/>
               </a:spcBef>
               <a:spcAft>
                 <a:spcPct val="0"/>
               </a:spcAft>
-              <a:buClrTx/>
-              <a:buSzTx/>
-              <a:buFontTx/>
-              <a:buNone/>
-              <a:tabLst/>
             </a:pPr>
             <a:r>
-              <a:rPr kumimoji="1" lang="en-US" altLang="ja-JP" sz="1800" b="0" i="0" u="none" strike="noStrike" cap="none" normalizeH="0" baseline="0" dirty="0" smtClean="0">
-                <a:ln>
-                  <a:noFill/>
-                </a:ln>
+              <a:rPr lang="en-US" altLang="ja-JP" sz="1350" dirty="0">
                 <a:solidFill>
                   <a:schemeClr val="bg1"/>
                 </a:solidFill>
-                <a:effectLst/>
                 <a:latin typeface="Arial" pitchFamily="34" charset="0"/>
                 <a:ea typeface="ＭＳ Ｐゴシック" pitchFamily="50" charset="-128"/>
                 <a:cs typeface="ＭＳ Ｐゴシック" pitchFamily="50" charset="-128"/>
@@ -8181,8 +8404,8 @@
         </p:nvSpPr>
         <p:spPr>
           <a:xfrm>
-            <a:off x="3714928" y="5778182"/>
-            <a:ext cx="734693" cy="536091"/>
+            <a:off x="2786197" y="6333887"/>
+            <a:ext cx="551020" cy="402068"/>
           </a:xfrm>
           <a:prstGeom prst="rect">
             <a:avLst/>
@@ -8213,14 +8436,14 @@
           <a:lstStyle/>
           <a:p>
             <a:r>
-              <a:rPr kumimoji="1" lang="en-US" altLang="ja-JP" sz="2400" dirty="0" smtClean="0">
+              <a:rPr lang="en-US" altLang="ja-JP" dirty="0">
                 <a:solidFill>
                   <a:schemeClr val="tx1"/>
                 </a:solidFill>
               </a:rPr>
               <a:t>or</a:t>
             </a:r>
-            <a:endParaRPr kumimoji="1" lang="ja-JP" altLang="en-US" sz="2400" dirty="0">
+            <a:endParaRPr lang="ja-JP" altLang="en-US" dirty="0">
               <a:solidFill>
                 <a:schemeClr val="tx1"/>
               </a:solidFill>

</xml_diff>

<commit_message>
Passed version of terasolunaorg-guideline-110292532
</commit_message>
<xml_diff>
--- a/source/ArchitectureInDetail/images_FileUpload/materialFileUpload.pptx
+++ b/source/ArchitectureInDetail/images_FileUpload/materialFileUpload.pptx
@@ -11,7 +11,7 @@
     <p:sldId id="304" r:id="rId2"/>
     <p:sldId id="303" r:id="rId3"/>
   </p:sldIdLst>
-  <p:sldSz cx="9144000" cy="6858000" type="screen4x3"/>
+  <p:sldSz cx="6858000" cy="9144000" type="screen4x3"/>
   <p:notesSz cx="6858000" cy="9144000"/>
   <p:defaultTextStyle>
     <a:defPPr>
@@ -119,6 +119,20 @@
         </p14:section>
       </p14:sectionLst>
     </p:ext>
+    <p:ext uri="{EFAFB233-063F-42B5-8137-9DF3F51BA10A}">
+      <p15:sldGuideLst xmlns:p15="http://schemas.microsoft.com/office/powerpoint/2012/main">
+        <p15:guide id="1" orient="horz" pos="2880" userDrawn="1">
+          <p15:clr>
+            <a:srgbClr val="A4A3A4"/>
+          </p15:clr>
+        </p15:guide>
+        <p15:guide id="2" pos="2160" userDrawn="1">
+          <p15:clr>
+            <a:srgbClr val="A4A3A4"/>
+          </p15:clr>
+        </p15:guide>
+      </p15:sldGuideLst>
+    </p:ext>
   </p:extLst>
 </p:presentation>
 </file>
@@ -206,7 +220,7 @@
             <a:fld id="{3BB47352-BF5A-4CD2-B029-996118CD8E01}" type="datetimeFigureOut">
               <a:rPr kumimoji="1" lang="ja-JP" altLang="en-US" smtClean="0"/>
               <a:pPr/>
-              <a:t>2013/11/29</a:t>
+              <a:t>2016/2/5</a:t>
             </a:fld>
             <a:endParaRPr kumimoji="1" lang="ja-JP" altLang="en-US"/>
           </a:p>
@@ -224,8 +238,8 @@
         </p:nvSpPr>
         <p:spPr>
           <a:xfrm>
-            <a:off x="1143000" y="685800"/>
-            <a:ext cx="4572000" cy="3429000"/>
+            <a:off x="2143125" y="685800"/>
+            <a:ext cx="2571750" cy="3429000"/>
           </a:xfrm>
           <a:prstGeom prst="rect">
             <a:avLst/>
@@ -507,6 +521,96 @@
 </p:notesMaster>
 </file>
 
+<file path=ppt/notesSlides/notesSlide1.xml><?xml version="1.0" encoding="utf-8"?>
+<p:notes xmlns:a="http://schemas.openxmlformats.org/drawingml/2006/main" xmlns:r="http://schemas.openxmlformats.org/officeDocument/2006/relationships" xmlns:p="http://schemas.openxmlformats.org/presentationml/2006/main">
+  <p:cSld>
+    <p:spTree>
+      <p:nvGrpSpPr>
+        <p:cNvPr id="1" name=""/>
+        <p:cNvGrpSpPr/>
+        <p:nvPr/>
+      </p:nvGrpSpPr>
+      <p:grpSpPr>
+        <a:xfrm>
+          <a:off x="0" y="0"/>
+          <a:ext cx="0" cy="0"/>
+          <a:chOff x="0" y="0"/>
+          <a:chExt cx="0" cy="0"/>
+        </a:xfrm>
+      </p:grpSpPr>
+      <p:sp>
+        <p:nvSpPr>
+          <p:cNvPr id="2" name="スライド イメージ プレースホルダー 1"/>
+          <p:cNvSpPr>
+            <a:spLocks noGrp="1" noRot="1" noChangeAspect="1"/>
+          </p:cNvSpPr>
+          <p:nvPr>
+            <p:ph type="sldImg"/>
+          </p:nvPr>
+        </p:nvSpPr>
+        <p:spPr>
+          <a:xfrm>
+            <a:off x="2143125" y="685800"/>
+            <a:ext cx="2571750" cy="3429000"/>
+          </a:xfrm>
+        </p:spPr>
+      </p:sp>
+      <p:sp>
+        <p:nvSpPr>
+          <p:cNvPr id="3" name="ノート プレースホルダー 2"/>
+          <p:cNvSpPr>
+            <a:spLocks noGrp="1"/>
+          </p:cNvSpPr>
+          <p:nvPr>
+            <p:ph type="body" idx="1"/>
+          </p:nvPr>
+        </p:nvSpPr>
+        <p:spPr/>
+        <p:txBody>
+          <a:bodyPr/>
+          <a:lstStyle/>
+          <a:p>
+            <a:endParaRPr kumimoji="1" lang="ja-JP" altLang="en-US" dirty="0"/>
+          </a:p>
+        </p:txBody>
+      </p:sp>
+      <p:sp>
+        <p:nvSpPr>
+          <p:cNvPr id="4" name="スライド番号プレースホルダー 3"/>
+          <p:cNvSpPr>
+            <a:spLocks noGrp="1"/>
+          </p:cNvSpPr>
+          <p:nvPr>
+            <p:ph type="sldNum" sz="quarter" idx="10"/>
+          </p:nvPr>
+        </p:nvSpPr>
+        <p:spPr/>
+        <p:txBody>
+          <a:bodyPr/>
+          <a:lstStyle/>
+          <a:p>
+            <a:fld id="{003CFFA3-9D07-4088-826B-DF328166082C}" type="slidenum">
+              <a:rPr kumimoji="1" lang="ja-JP" altLang="en-US" smtClean="0"/>
+              <a:pPr/>
+              <a:t>1</a:t>
+            </a:fld>
+            <a:endParaRPr kumimoji="1" lang="ja-JP" altLang="en-US"/>
+          </a:p>
+        </p:txBody>
+      </p:sp>
+    </p:spTree>
+    <p:extLst>
+      <p:ext uri="{BB962C8B-B14F-4D97-AF65-F5344CB8AC3E}">
+        <p14:creationId xmlns:p14="http://schemas.microsoft.com/office/powerpoint/2010/main" val="2210372606"/>
+      </p:ext>
+    </p:extLst>
+  </p:cSld>
+  <p:clrMapOvr>
+    <a:masterClrMapping/>
+  </p:clrMapOvr>
+</p:notes>
+</file>
+
 <file path=ppt/slideLayouts/slideLayout1.xml><?xml version="1.0" encoding="utf-8"?>
 <p:sldLayout xmlns:a="http://schemas.openxmlformats.org/drawingml/2006/main" xmlns:r="http://schemas.openxmlformats.org/officeDocument/2006/relationships" xmlns:p="http://schemas.openxmlformats.org/presentationml/2006/main" type="title" preserve="1">
   <p:cSld name="タイトル スライド">
@@ -536,8 +640,8 @@
         </p:nvSpPr>
         <p:spPr>
           <a:xfrm>
-            <a:off x="685800" y="2130425"/>
-            <a:ext cx="7772400" cy="1470025"/>
+            <a:off x="514350" y="2840569"/>
+            <a:ext cx="5829300" cy="1960033"/>
           </a:xfrm>
         </p:spPr>
         <p:txBody>
@@ -564,8 +668,8 @@
         </p:nvSpPr>
         <p:spPr>
           <a:xfrm>
-            <a:off x="1371600" y="3886200"/>
-            <a:ext cx="6400800" cy="1752600"/>
+            <a:off x="1028700" y="5181600"/>
+            <a:ext cx="4800600" cy="2336800"/>
           </a:xfrm>
         </p:spPr>
         <p:txBody>
@@ -581,7 +685,7 @@
                 </a:solidFill>
               </a:defRPr>
             </a:lvl1pPr>
-            <a:lvl2pPr marL="457200" indent="0" algn="ctr">
+            <a:lvl2pPr marL="342892" indent="0" algn="ctr">
               <a:buNone/>
               <a:defRPr>
                 <a:solidFill>
@@ -591,7 +695,7 @@
                 </a:solidFill>
               </a:defRPr>
             </a:lvl2pPr>
-            <a:lvl3pPr marL="914400" indent="0" algn="ctr">
+            <a:lvl3pPr marL="685784" indent="0" algn="ctr">
               <a:buNone/>
               <a:defRPr>
                 <a:solidFill>
@@ -601,7 +705,7 @@
                 </a:solidFill>
               </a:defRPr>
             </a:lvl3pPr>
-            <a:lvl4pPr marL="1371600" indent="0" algn="ctr">
+            <a:lvl4pPr marL="1028675" indent="0" algn="ctr">
               <a:buNone/>
               <a:defRPr>
                 <a:solidFill>
@@ -611,7 +715,7 @@
                 </a:solidFill>
               </a:defRPr>
             </a:lvl4pPr>
-            <a:lvl5pPr marL="1828800" indent="0" algn="ctr">
+            <a:lvl5pPr marL="1371566" indent="0" algn="ctr">
               <a:buNone/>
               <a:defRPr>
                 <a:solidFill>
@@ -621,7 +725,7 @@
                 </a:solidFill>
               </a:defRPr>
             </a:lvl5pPr>
-            <a:lvl6pPr marL="2286000" indent="0" algn="ctr">
+            <a:lvl6pPr marL="1714457" indent="0" algn="ctr">
               <a:buNone/>
               <a:defRPr>
                 <a:solidFill>
@@ -631,7 +735,7 @@
                 </a:solidFill>
               </a:defRPr>
             </a:lvl6pPr>
-            <a:lvl7pPr marL="2743200" indent="0" algn="ctr">
+            <a:lvl7pPr marL="2057349" indent="0" algn="ctr">
               <a:buNone/>
               <a:defRPr>
                 <a:solidFill>
@@ -641,7 +745,7 @@
                 </a:solidFill>
               </a:defRPr>
             </a:lvl7pPr>
-            <a:lvl8pPr marL="3200400" indent="0" algn="ctr">
+            <a:lvl8pPr marL="2400240" indent="0" algn="ctr">
               <a:buNone/>
               <a:defRPr>
                 <a:solidFill>
@@ -651,7 +755,7 @@
                 </a:solidFill>
               </a:defRPr>
             </a:lvl8pPr>
-            <a:lvl9pPr marL="3657600" indent="0" algn="ctr">
+            <a:lvl9pPr marL="2743132" indent="0" algn="ctr">
               <a:buNone/>
               <a:defRPr>
                 <a:solidFill>
@@ -689,7 +793,7 @@
             <a:fld id="{7B9B12EC-6AA0-374B-A2D3-850081A07A26}" type="datetimeFigureOut">
               <a:rPr kumimoji="1" lang="ja-JP" altLang="en-US" smtClean="0"/>
               <a:pPr/>
-              <a:t>2013/11/29</a:t>
+              <a:t>2016/2/5</a:t>
             </a:fld>
             <a:endParaRPr kumimoji="1" lang="ja-JP" altLang="en-US"/>
           </a:p>
@@ -893,7 +997,7 @@
             <a:fld id="{7B9B12EC-6AA0-374B-A2D3-850081A07A26}" type="datetimeFigureOut">
               <a:rPr kumimoji="1" lang="ja-JP" altLang="en-US" smtClean="0"/>
               <a:pPr/>
-              <a:t>2013/11/29</a:t>
+              <a:t>2016/2/5</a:t>
             </a:fld>
             <a:endParaRPr kumimoji="1" lang="ja-JP" altLang="en-US"/>
           </a:p>
@@ -984,8 +1088,8 @@
         </p:nvSpPr>
         <p:spPr>
           <a:xfrm>
-            <a:off x="6629400" y="274638"/>
-            <a:ext cx="2057400" cy="5851525"/>
+            <a:off x="4972050" y="366186"/>
+            <a:ext cx="1543050" cy="7802033"/>
           </a:xfrm>
         </p:spPr>
         <p:txBody>
@@ -1012,8 +1116,8 @@
         </p:nvSpPr>
         <p:spPr>
           <a:xfrm>
-            <a:off x="457200" y="274638"/>
-            <a:ext cx="6019800" cy="5851525"/>
+            <a:off x="342900" y="366186"/>
+            <a:ext cx="4514850" cy="7802033"/>
           </a:xfrm>
         </p:spPr>
         <p:txBody>
@@ -1107,7 +1211,7 @@
             <a:fld id="{7B9B12EC-6AA0-374B-A2D3-850081A07A26}" type="datetimeFigureOut">
               <a:rPr kumimoji="1" lang="ja-JP" altLang="en-US" smtClean="0"/>
               <a:pPr/>
-              <a:t>2013/11/29</a:t>
+              <a:t>2016/2/5</a:t>
             </a:fld>
             <a:endParaRPr kumimoji="1" lang="ja-JP" altLang="en-US"/>
           </a:p>
@@ -1311,7 +1415,7 @@
             <a:fld id="{7B9B12EC-6AA0-374B-A2D3-850081A07A26}" type="datetimeFigureOut">
               <a:rPr kumimoji="1" lang="ja-JP" altLang="en-US" smtClean="0"/>
               <a:pPr/>
-              <a:t>2013/11/29</a:t>
+              <a:t>2016/2/5</a:t>
             </a:fld>
             <a:endParaRPr kumimoji="1" lang="ja-JP" altLang="en-US"/>
           </a:p>
@@ -1402,15 +1506,15 @@
         </p:nvSpPr>
         <p:spPr>
           <a:xfrm>
-            <a:off x="722313" y="4406900"/>
-            <a:ext cx="7772400" cy="1362075"/>
+            <a:off x="541735" y="5875867"/>
+            <a:ext cx="5829300" cy="1816100"/>
           </a:xfrm>
         </p:spPr>
         <p:txBody>
           <a:bodyPr anchor="t"/>
           <a:lstStyle>
             <a:lvl1pPr algn="l">
-              <a:defRPr sz="4000" b="1" cap="all"/>
+              <a:defRPr sz="3000" b="1" cap="all"/>
             </a:lvl1pPr>
           </a:lstStyle>
           <a:p>
@@ -1434,8 +1538,8 @@
         </p:nvSpPr>
         <p:spPr>
           <a:xfrm>
-            <a:off x="722313" y="2906713"/>
-            <a:ext cx="7772400" cy="1500187"/>
+            <a:off x="541735" y="3875620"/>
+            <a:ext cx="5829300" cy="2000249"/>
           </a:xfrm>
         </p:spPr>
         <p:txBody>
@@ -1443,7 +1547,7 @@
           <a:lstStyle>
             <a:lvl1pPr marL="0" indent="0">
               <a:buNone/>
-              <a:defRPr sz="2000">
+              <a:defRPr sz="1500">
                 <a:solidFill>
                   <a:schemeClr val="tx1">
                     <a:tint val="75000"/>
@@ -1451,9 +1555,9 @@
                 </a:solidFill>
               </a:defRPr>
             </a:lvl1pPr>
-            <a:lvl2pPr marL="457200" indent="0">
+            <a:lvl2pPr marL="342892" indent="0">
               <a:buNone/>
-              <a:defRPr sz="1800">
+              <a:defRPr sz="1350">
                 <a:solidFill>
                   <a:schemeClr val="tx1">
                     <a:tint val="75000"/>
@@ -1461,9 +1565,9 @@
                 </a:solidFill>
               </a:defRPr>
             </a:lvl2pPr>
-            <a:lvl3pPr marL="914400" indent="0">
+            <a:lvl3pPr marL="685784" indent="0">
               <a:buNone/>
-              <a:defRPr sz="1600">
+              <a:defRPr sz="1200">
                 <a:solidFill>
                   <a:schemeClr val="tx1">
                     <a:tint val="75000"/>
@@ -1471,9 +1575,9 @@
                 </a:solidFill>
               </a:defRPr>
             </a:lvl3pPr>
-            <a:lvl4pPr marL="1371600" indent="0">
+            <a:lvl4pPr marL="1028675" indent="0">
               <a:buNone/>
-              <a:defRPr sz="1400">
+              <a:defRPr sz="1050">
                 <a:solidFill>
                   <a:schemeClr val="tx1">
                     <a:tint val="75000"/>
@@ -1481,9 +1585,9 @@
                 </a:solidFill>
               </a:defRPr>
             </a:lvl4pPr>
-            <a:lvl5pPr marL="1828800" indent="0">
+            <a:lvl5pPr marL="1371566" indent="0">
               <a:buNone/>
-              <a:defRPr sz="1400">
+              <a:defRPr sz="1050">
                 <a:solidFill>
                   <a:schemeClr val="tx1">
                     <a:tint val="75000"/>
@@ -1491,9 +1595,9 @@
                 </a:solidFill>
               </a:defRPr>
             </a:lvl5pPr>
-            <a:lvl6pPr marL="2286000" indent="0">
+            <a:lvl6pPr marL="1714457" indent="0">
               <a:buNone/>
-              <a:defRPr sz="1400">
+              <a:defRPr sz="1050">
                 <a:solidFill>
                   <a:schemeClr val="tx1">
                     <a:tint val="75000"/>
@@ -1501,9 +1605,9 @@
                 </a:solidFill>
               </a:defRPr>
             </a:lvl6pPr>
-            <a:lvl7pPr marL="2743200" indent="0">
+            <a:lvl7pPr marL="2057349" indent="0">
               <a:buNone/>
-              <a:defRPr sz="1400">
+              <a:defRPr sz="1050">
                 <a:solidFill>
                   <a:schemeClr val="tx1">
                     <a:tint val="75000"/>
@@ -1511,9 +1615,9 @@
                 </a:solidFill>
               </a:defRPr>
             </a:lvl7pPr>
-            <a:lvl8pPr marL="3200400" indent="0">
+            <a:lvl8pPr marL="2400240" indent="0">
               <a:buNone/>
-              <a:defRPr sz="1400">
+              <a:defRPr sz="1050">
                 <a:solidFill>
                   <a:schemeClr val="tx1">
                     <a:tint val="75000"/>
@@ -1521,9 +1625,9 @@
                 </a:solidFill>
               </a:defRPr>
             </a:lvl8pPr>
-            <a:lvl9pPr marL="3657600" indent="0">
+            <a:lvl9pPr marL="2743132" indent="0">
               <a:buNone/>
-              <a:defRPr sz="1400">
+              <a:defRPr sz="1050">
                 <a:solidFill>
                   <a:schemeClr val="tx1">
                     <a:tint val="75000"/>
@@ -1559,7 +1663,7 @@
             <a:fld id="{7B9B12EC-6AA0-374B-A2D3-850081A07A26}" type="datetimeFigureOut">
               <a:rPr kumimoji="1" lang="ja-JP" altLang="en-US" smtClean="0"/>
               <a:pPr/>
-              <a:t>2013/11/29</a:t>
+              <a:t>2016/2/5</a:t>
             </a:fld>
             <a:endParaRPr kumimoji="1" lang="ja-JP" altLang="en-US"/>
           </a:p>
@@ -1673,39 +1777,39 @@
         </p:nvSpPr>
         <p:spPr>
           <a:xfrm>
-            <a:off x="457200" y="1600200"/>
-            <a:ext cx="4038600" cy="4525963"/>
+            <a:off x="342900" y="2133602"/>
+            <a:ext cx="3028950" cy="6034617"/>
           </a:xfrm>
         </p:spPr>
         <p:txBody>
           <a:bodyPr/>
           <a:lstStyle>
             <a:lvl1pPr>
-              <a:defRPr sz="2800"/>
+              <a:defRPr sz="2100"/>
             </a:lvl1pPr>
             <a:lvl2pPr>
-              <a:defRPr sz="2400"/>
+              <a:defRPr sz="1800"/>
             </a:lvl2pPr>
             <a:lvl3pPr>
-              <a:defRPr sz="2000"/>
+              <a:defRPr sz="1500"/>
             </a:lvl3pPr>
             <a:lvl4pPr>
-              <a:defRPr sz="1800"/>
+              <a:defRPr sz="1350"/>
             </a:lvl4pPr>
             <a:lvl5pPr>
-              <a:defRPr sz="1800"/>
+              <a:defRPr sz="1350"/>
             </a:lvl5pPr>
             <a:lvl6pPr>
-              <a:defRPr sz="1800"/>
+              <a:defRPr sz="1350"/>
             </a:lvl6pPr>
             <a:lvl7pPr>
-              <a:defRPr sz="1800"/>
+              <a:defRPr sz="1350"/>
             </a:lvl7pPr>
             <a:lvl8pPr>
-              <a:defRPr sz="1800"/>
+              <a:defRPr sz="1350"/>
             </a:lvl8pPr>
             <a:lvl9pPr>
-              <a:defRPr sz="1800"/>
+              <a:defRPr sz="1350"/>
             </a:lvl9pPr>
           </a:lstStyle>
           <a:p>
@@ -1790,39 +1894,39 @@
         </p:nvSpPr>
         <p:spPr>
           <a:xfrm>
-            <a:off x="4648200" y="1600200"/>
-            <a:ext cx="4038600" cy="4525963"/>
+            <a:off x="3486150" y="2133602"/>
+            <a:ext cx="3028950" cy="6034617"/>
           </a:xfrm>
         </p:spPr>
         <p:txBody>
           <a:bodyPr/>
           <a:lstStyle>
             <a:lvl1pPr>
-              <a:defRPr sz="2800"/>
+              <a:defRPr sz="2100"/>
             </a:lvl1pPr>
             <a:lvl2pPr>
-              <a:defRPr sz="2400"/>
+              <a:defRPr sz="1800"/>
             </a:lvl2pPr>
             <a:lvl3pPr>
-              <a:defRPr sz="2000"/>
+              <a:defRPr sz="1500"/>
             </a:lvl3pPr>
             <a:lvl4pPr>
-              <a:defRPr sz="1800"/>
+              <a:defRPr sz="1350"/>
             </a:lvl4pPr>
             <a:lvl5pPr>
-              <a:defRPr sz="1800"/>
+              <a:defRPr sz="1350"/>
             </a:lvl5pPr>
             <a:lvl6pPr>
-              <a:defRPr sz="1800"/>
+              <a:defRPr sz="1350"/>
             </a:lvl6pPr>
             <a:lvl7pPr>
-              <a:defRPr sz="1800"/>
+              <a:defRPr sz="1350"/>
             </a:lvl7pPr>
             <a:lvl8pPr>
-              <a:defRPr sz="1800"/>
+              <a:defRPr sz="1350"/>
             </a:lvl8pPr>
             <a:lvl9pPr>
-              <a:defRPr sz="1800"/>
+              <a:defRPr sz="1350"/>
             </a:lvl9pPr>
           </a:lstStyle>
           <a:p>
@@ -1913,7 +2017,7 @@
             <a:fld id="{7B9B12EC-6AA0-374B-A2D3-850081A07A26}" type="datetimeFigureOut">
               <a:rPr kumimoji="1" lang="ja-JP" altLang="en-US" smtClean="0"/>
               <a:pPr/>
-              <a:t>2013/11/29</a:t>
+              <a:t>2016/2/5</a:t>
             </a:fld>
             <a:endParaRPr kumimoji="1" lang="ja-JP" altLang="en-US"/>
           </a:p>
@@ -2031,8 +2135,8 @@
         </p:nvSpPr>
         <p:spPr>
           <a:xfrm>
-            <a:off x="457200" y="1535113"/>
-            <a:ext cx="4040188" cy="639762"/>
+            <a:off x="342901" y="2046817"/>
+            <a:ext cx="3030141" cy="853016"/>
           </a:xfrm>
         </p:spPr>
         <p:txBody>
@@ -2040,39 +2144,39 @@
           <a:lstStyle>
             <a:lvl1pPr marL="0" indent="0">
               <a:buNone/>
-              <a:defRPr sz="2400" b="1"/>
+              <a:defRPr sz="1800" b="1"/>
             </a:lvl1pPr>
-            <a:lvl2pPr marL="457200" indent="0">
+            <a:lvl2pPr marL="342892" indent="0">
               <a:buNone/>
-              <a:defRPr sz="2000" b="1"/>
+              <a:defRPr sz="1500" b="1"/>
             </a:lvl2pPr>
-            <a:lvl3pPr marL="914400" indent="0">
+            <a:lvl3pPr marL="685784" indent="0">
               <a:buNone/>
-              <a:defRPr sz="1800" b="1"/>
+              <a:defRPr sz="1350" b="1"/>
             </a:lvl3pPr>
-            <a:lvl4pPr marL="1371600" indent="0">
+            <a:lvl4pPr marL="1028675" indent="0">
               <a:buNone/>
-              <a:defRPr sz="1600" b="1"/>
+              <a:defRPr sz="1200" b="1"/>
             </a:lvl4pPr>
-            <a:lvl5pPr marL="1828800" indent="0">
+            <a:lvl5pPr marL="1371566" indent="0">
               <a:buNone/>
-              <a:defRPr sz="1600" b="1"/>
+              <a:defRPr sz="1200" b="1"/>
             </a:lvl5pPr>
-            <a:lvl6pPr marL="2286000" indent="0">
+            <a:lvl6pPr marL="1714457" indent="0">
               <a:buNone/>
-              <a:defRPr sz="1600" b="1"/>
+              <a:defRPr sz="1200" b="1"/>
             </a:lvl6pPr>
-            <a:lvl7pPr marL="2743200" indent="0">
+            <a:lvl7pPr marL="2057349" indent="0">
               <a:buNone/>
-              <a:defRPr sz="1600" b="1"/>
+              <a:defRPr sz="1200" b="1"/>
             </a:lvl7pPr>
-            <a:lvl8pPr marL="3200400" indent="0">
+            <a:lvl8pPr marL="2400240" indent="0">
               <a:buNone/>
-              <a:defRPr sz="1600" b="1"/>
+              <a:defRPr sz="1200" b="1"/>
             </a:lvl8pPr>
-            <a:lvl9pPr marL="3657600" indent="0">
+            <a:lvl9pPr marL="2743132" indent="0">
               <a:buNone/>
-              <a:defRPr sz="1600" b="1"/>
+              <a:defRPr sz="1200" b="1"/>
             </a:lvl9pPr>
           </a:lstStyle>
           <a:p>
@@ -2096,39 +2200,39 @@
         </p:nvSpPr>
         <p:spPr>
           <a:xfrm>
-            <a:off x="457200" y="2174875"/>
-            <a:ext cx="4040188" cy="3951288"/>
+            <a:off x="342901" y="2899833"/>
+            <a:ext cx="3030141" cy="5268384"/>
           </a:xfrm>
         </p:spPr>
         <p:txBody>
           <a:bodyPr/>
           <a:lstStyle>
             <a:lvl1pPr>
-              <a:defRPr sz="2400"/>
+              <a:defRPr sz="1800"/>
             </a:lvl1pPr>
             <a:lvl2pPr>
-              <a:defRPr sz="2000"/>
+              <a:defRPr sz="1500"/>
             </a:lvl2pPr>
             <a:lvl3pPr>
-              <a:defRPr sz="1800"/>
+              <a:defRPr sz="1350"/>
             </a:lvl3pPr>
             <a:lvl4pPr>
-              <a:defRPr sz="1600"/>
+              <a:defRPr sz="1200"/>
             </a:lvl4pPr>
             <a:lvl5pPr>
-              <a:defRPr sz="1600"/>
+              <a:defRPr sz="1200"/>
             </a:lvl5pPr>
             <a:lvl6pPr>
-              <a:defRPr sz="1600"/>
+              <a:defRPr sz="1200"/>
             </a:lvl6pPr>
             <a:lvl7pPr>
-              <a:defRPr sz="1600"/>
+              <a:defRPr sz="1200"/>
             </a:lvl7pPr>
             <a:lvl8pPr>
-              <a:defRPr sz="1600"/>
+              <a:defRPr sz="1200"/>
             </a:lvl8pPr>
             <a:lvl9pPr>
-              <a:defRPr sz="1600"/>
+              <a:defRPr sz="1200"/>
             </a:lvl9pPr>
           </a:lstStyle>
           <a:p>
@@ -2213,8 +2317,8 @@
         </p:nvSpPr>
         <p:spPr>
           <a:xfrm>
-            <a:off x="4645025" y="1535113"/>
-            <a:ext cx="4041775" cy="639762"/>
+            <a:off x="3483770" y="2046817"/>
+            <a:ext cx="3031331" cy="853016"/>
           </a:xfrm>
         </p:spPr>
         <p:txBody>
@@ -2222,39 +2326,39 @@
           <a:lstStyle>
             <a:lvl1pPr marL="0" indent="0">
               <a:buNone/>
-              <a:defRPr sz="2400" b="1"/>
+              <a:defRPr sz="1800" b="1"/>
             </a:lvl1pPr>
-            <a:lvl2pPr marL="457200" indent="0">
+            <a:lvl2pPr marL="342892" indent="0">
               <a:buNone/>
-              <a:defRPr sz="2000" b="1"/>
+              <a:defRPr sz="1500" b="1"/>
             </a:lvl2pPr>
-            <a:lvl3pPr marL="914400" indent="0">
+            <a:lvl3pPr marL="685784" indent="0">
               <a:buNone/>
-              <a:defRPr sz="1800" b="1"/>
+              <a:defRPr sz="1350" b="1"/>
             </a:lvl3pPr>
-            <a:lvl4pPr marL="1371600" indent="0">
+            <a:lvl4pPr marL="1028675" indent="0">
               <a:buNone/>
-              <a:defRPr sz="1600" b="1"/>
+              <a:defRPr sz="1200" b="1"/>
             </a:lvl4pPr>
-            <a:lvl5pPr marL="1828800" indent="0">
+            <a:lvl5pPr marL="1371566" indent="0">
               <a:buNone/>
-              <a:defRPr sz="1600" b="1"/>
+              <a:defRPr sz="1200" b="1"/>
             </a:lvl5pPr>
-            <a:lvl6pPr marL="2286000" indent="0">
+            <a:lvl6pPr marL="1714457" indent="0">
               <a:buNone/>
-              <a:defRPr sz="1600" b="1"/>
+              <a:defRPr sz="1200" b="1"/>
             </a:lvl6pPr>
-            <a:lvl7pPr marL="2743200" indent="0">
+            <a:lvl7pPr marL="2057349" indent="0">
               <a:buNone/>
-              <a:defRPr sz="1600" b="1"/>
+              <a:defRPr sz="1200" b="1"/>
             </a:lvl7pPr>
-            <a:lvl8pPr marL="3200400" indent="0">
+            <a:lvl8pPr marL="2400240" indent="0">
               <a:buNone/>
-              <a:defRPr sz="1600" b="1"/>
+              <a:defRPr sz="1200" b="1"/>
             </a:lvl8pPr>
-            <a:lvl9pPr marL="3657600" indent="0">
+            <a:lvl9pPr marL="2743132" indent="0">
               <a:buNone/>
-              <a:defRPr sz="1600" b="1"/>
+              <a:defRPr sz="1200" b="1"/>
             </a:lvl9pPr>
           </a:lstStyle>
           <a:p>
@@ -2278,39 +2382,39 @@
         </p:nvSpPr>
         <p:spPr>
           <a:xfrm>
-            <a:off x="4645025" y="2174875"/>
-            <a:ext cx="4041775" cy="3951288"/>
+            <a:off x="3483770" y="2899833"/>
+            <a:ext cx="3031331" cy="5268384"/>
           </a:xfrm>
         </p:spPr>
         <p:txBody>
           <a:bodyPr/>
           <a:lstStyle>
             <a:lvl1pPr>
-              <a:defRPr sz="2400"/>
+              <a:defRPr sz="1800"/>
             </a:lvl1pPr>
             <a:lvl2pPr>
-              <a:defRPr sz="2000"/>
+              <a:defRPr sz="1500"/>
             </a:lvl2pPr>
             <a:lvl3pPr>
-              <a:defRPr sz="1800"/>
+              <a:defRPr sz="1350"/>
             </a:lvl3pPr>
             <a:lvl4pPr>
-              <a:defRPr sz="1600"/>
+              <a:defRPr sz="1200"/>
             </a:lvl4pPr>
             <a:lvl5pPr>
-              <a:defRPr sz="1600"/>
+              <a:defRPr sz="1200"/>
             </a:lvl5pPr>
             <a:lvl6pPr>
-              <a:defRPr sz="1600"/>
+              <a:defRPr sz="1200"/>
             </a:lvl6pPr>
             <a:lvl7pPr>
-              <a:defRPr sz="1600"/>
+              <a:defRPr sz="1200"/>
             </a:lvl7pPr>
             <a:lvl8pPr>
-              <a:defRPr sz="1600"/>
+              <a:defRPr sz="1200"/>
             </a:lvl8pPr>
             <a:lvl9pPr>
-              <a:defRPr sz="1600"/>
+              <a:defRPr sz="1200"/>
             </a:lvl9pPr>
           </a:lstStyle>
           <a:p>
@@ -2401,7 +2505,7 @@
             <a:fld id="{7B9B12EC-6AA0-374B-A2D3-850081A07A26}" type="datetimeFigureOut">
               <a:rPr kumimoji="1" lang="ja-JP" altLang="en-US" smtClean="0"/>
               <a:pPr/>
-              <a:t>2013/11/29</a:t>
+              <a:t>2016/2/5</a:t>
             </a:fld>
             <a:endParaRPr kumimoji="1" lang="ja-JP" altLang="en-US"/>
           </a:p>
@@ -2521,7 +2625,7 @@
             <a:fld id="{7B9B12EC-6AA0-374B-A2D3-850081A07A26}" type="datetimeFigureOut">
               <a:rPr kumimoji="1" lang="ja-JP" altLang="en-US" smtClean="0"/>
               <a:pPr/>
-              <a:t>2013/11/29</a:t>
+              <a:t>2016/2/5</a:t>
             </a:fld>
             <a:endParaRPr kumimoji="1" lang="ja-JP" altLang="en-US"/>
           </a:p>
@@ -2618,7 +2722,7 @@
             <a:fld id="{7B9B12EC-6AA0-374B-A2D3-850081A07A26}" type="datetimeFigureOut">
               <a:rPr kumimoji="1" lang="ja-JP" altLang="en-US" smtClean="0"/>
               <a:pPr/>
-              <a:t>2013/11/29</a:t>
+              <a:t>2016/2/5</a:t>
             </a:fld>
             <a:endParaRPr kumimoji="1" lang="ja-JP" altLang="en-US"/>
           </a:p>
@@ -2709,15 +2813,15 @@
         </p:nvSpPr>
         <p:spPr>
           <a:xfrm>
-            <a:off x="457200" y="273050"/>
-            <a:ext cx="3008313" cy="1162050"/>
+            <a:off x="342901" y="364067"/>
+            <a:ext cx="2256235" cy="1549400"/>
           </a:xfrm>
         </p:spPr>
         <p:txBody>
           <a:bodyPr anchor="b"/>
           <a:lstStyle>
             <a:lvl1pPr algn="l">
-              <a:defRPr sz="2000" b="1"/>
+              <a:defRPr sz="1500" b="1"/>
             </a:lvl1pPr>
           </a:lstStyle>
           <a:p>
@@ -2741,39 +2845,39 @@
         </p:nvSpPr>
         <p:spPr>
           <a:xfrm>
-            <a:off x="3575050" y="273050"/>
-            <a:ext cx="5111750" cy="5853113"/>
+            <a:off x="2681288" y="364069"/>
+            <a:ext cx="3833813" cy="7804151"/>
           </a:xfrm>
         </p:spPr>
         <p:txBody>
           <a:bodyPr/>
           <a:lstStyle>
             <a:lvl1pPr>
-              <a:defRPr sz="3200"/>
+              <a:defRPr sz="2400"/>
             </a:lvl1pPr>
             <a:lvl2pPr>
-              <a:defRPr sz="2800"/>
+              <a:defRPr sz="2100"/>
             </a:lvl2pPr>
             <a:lvl3pPr>
-              <a:defRPr sz="2400"/>
+              <a:defRPr sz="1800"/>
             </a:lvl3pPr>
             <a:lvl4pPr>
-              <a:defRPr sz="2000"/>
+              <a:defRPr sz="1500"/>
             </a:lvl4pPr>
             <a:lvl5pPr>
-              <a:defRPr sz="2000"/>
+              <a:defRPr sz="1500"/>
             </a:lvl5pPr>
             <a:lvl6pPr>
-              <a:defRPr sz="2000"/>
+              <a:defRPr sz="1500"/>
             </a:lvl6pPr>
             <a:lvl7pPr>
-              <a:defRPr sz="2000"/>
+              <a:defRPr sz="1500"/>
             </a:lvl7pPr>
             <a:lvl8pPr>
-              <a:defRPr sz="2000"/>
+              <a:defRPr sz="1500"/>
             </a:lvl8pPr>
             <a:lvl9pPr>
-              <a:defRPr sz="2000"/>
+              <a:defRPr sz="1500"/>
             </a:lvl9pPr>
           </a:lstStyle>
           <a:p>
@@ -2858,8 +2962,8 @@
         </p:nvSpPr>
         <p:spPr>
           <a:xfrm>
-            <a:off x="457200" y="1435100"/>
-            <a:ext cx="3008313" cy="4691063"/>
+            <a:off x="342901" y="1913469"/>
+            <a:ext cx="2256235" cy="6254751"/>
           </a:xfrm>
         </p:spPr>
         <p:txBody>
@@ -2867,39 +2971,39 @@
           <a:lstStyle>
             <a:lvl1pPr marL="0" indent="0">
               <a:buNone/>
-              <a:defRPr sz="1400"/>
+              <a:defRPr sz="1050"/>
             </a:lvl1pPr>
-            <a:lvl2pPr marL="457200" indent="0">
-              <a:buNone/>
-              <a:defRPr sz="1200"/>
-            </a:lvl2pPr>
-            <a:lvl3pPr marL="914400" indent="0">
-              <a:buNone/>
-              <a:defRPr sz="1000"/>
-            </a:lvl3pPr>
-            <a:lvl4pPr marL="1371600" indent="0">
+            <a:lvl2pPr marL="342892" indent="0">
               <a:buNone/>
               <a:defRPr sz="900"/>
+            </a:lvl2pPr>
+            <a:lvl3pPr marL="685784" indent="0">
+              <a:buNone/>
+              <a:defRPr sz="750"/>
+            </a:lvl3pPr>
+            <a:lvl4pPr marL="1028675" indent="0">
+              <a:buNone/>
+              <a:defRPr sz="675"/>
             </a:lvl4pPr>
-            <a:lvl5pPr marL="1828800" indent="0">
+            <a:lvl5pPr marL="1371566" indent="0">
               <a:buNone/>
-              <a:defRPr sz="900"/>
+              <a:defRPr sz="675"/>
             </a:lvl5pPr>
-            <a:lvl6pPr marL="2286000" indent="0">
+            <a:lvl6pPr marL="1714457" indent="0">
               <a:buNone/>
-              <a:defRPr sz="900"/>
+              <a:defRPr sz="675"/>
             </a:lvl6pPr>
-            <a:lvl7pPr marL="2743200" indent="0">
+            <a:lvl7pPr marL="2057349" indent="0">
               <a:buNone/>
-              <a:defRPr sz="900"/>
+              <a:defRPr sz="675"/>
             </a:lvl7pPr>
-            <a:lvl8pPr marL="3200400" indent="0">
+            <a:lvl8pPr marL="2400240" indent="0">
               <a:buNone/>
-              <a:defRPr sz="900"/>
+              <a:defRPr sz="675"/>
             </a:lvl8pPr>
-            <a:lvl9pPr marL="3657600" indent="0">
+            <a:lvl9pPr marL="2743132" indent="0">
               <a:buNone/>
-              <a:defRPr sz="900"/>
+              <a:defRPr sz="675"/>
             </a:lvl9pPr>
           </a:lstStyle>
           <a:p>
@@ -2929,7 +3033,7 @@
             <a:fld id="{7B9B12EC-6AA0-374B-A2D3-850081A07A26}" type="datetimeFigureOut">
               <a:rPr kumimoji="1" lang="ja-JP" altLang="en-US" smtClean="0"/>
               <a:pPr/>
-              <a:t>2013/11/29</a:t>
+              <a:t>2016/2/5</a:t>
             </a:fld>
             <a:endParaRPr kumimoji="1" lang="ja-JP" altLang="en-US"/>
           </a:p>
@@ -3020,15 +3124,15 @@
         </p:nvSpPr>
         <p:spPr>
           <a:xfrm>
-            <a:off x="1792288" y="4800600"/>
-            <a:ext cx="5486400" cy="566738"/>
+            <a:off x="1344216" y="6400801"/>
+            <a:ext cx="4114800" cy="755651"/>
           </a:xfrm>
         </p:spPr>
         <p:txBody>
           <a:bodyPr anchor="b"/>
           <a:lstStyle>
             <a:lvl1pPr algn="l">
-              <a:defRPr sz="2000" b="1"/>
+              <a:defRPr sz="1500" b="1"/>
             </a:lvl1pPr>
           </a:lstStyle>
           <a:p>
@@ -3052,8 +3156,8 @@
         </p:nvSpPr>
         <p:spPr>
           <a:xfrm>
-            <a:off x="1792288" y="612775"/>
-            <a:ext cx="5486400" cy="4114800"/>
+            <a:off x="1344216" y="817033"/>
+            <a:ext cx="4114800" cy="5486400"/>
           </a:xfrm>
         </p:spPr>
         <p:txBody>
@@ -3061,39 +3165,39 @@
           <a:lstStyle>
             <a:lvl1pPr marL="0" indent="0">
               <a:buNone/>
-              <a:defRPr sz="3200"/>
+              <a:defRPr sz="2400"/>
             </a:lvl1pPr>
-            <a:lvl2pPr marL="457200" indent="0">
+            <a:lvl2pPr marL="342892" indent="0">
               <a:buNone/>
-              <a:defRPr sz="2800"/>
+              <a:defRPr sz="2100"/>
             </a:lvl2pPr>
-            <a:lvl3pPr marL="914400" indent="0">
+            <a:lvl3pPr marL="685784" indent="0">
               <a:buNone/>
-              <a:defRPr sz="2400"/>
+              <a:defRPr sz="1800"/>
             </a:lvl3pPr>
-            <a:lvl4pPr marL="1371600" indent="0">
+            <a:lvl4pPr marL="1028675" indent="0">
               <a:buNone/>
-              <a:defRPr sz="2000"/>
+              <a:defRPr sz="1500"/>
             </a:lvl4pPr>
-            <a:lvl5pPr marL="1828800" indent="0">
+            <a:lvl5pPr marL="1371566" indent="0">
               <a:buNone/>
-              <a:defRPr sz="2000"/>
+              <a:defRPr sz="1500"/>
             </a:lvl5pPr>
-            <a:lvl6pPr marL="2286000" indent="0">
+            <a:lvl6pPr marL="1714457" indent="0">
               <a:buNone/>
-              <a:defRPr sz="2000"/>
+              <a:defRPr sz="1500"/>
             </a:lvl6pPr>
-            <a:lvl7pPr marL="2743200" indent="0">
+            <a:lvl7pPr marL="2057349" indent="0">
               <a:buNone/>
-              <a:defRPr sz="2000"/>
+              <a:defRPr sz="1500"/>
             </a:lvl7pPr>
-            <a:lvl8pPr marL="3200400" indent="0">
+            <a:lvl8pPr marL="2400240" indent="0">
               <a:buNone/>
-              <a:defRPr sz="2000"/>
+              <a:defRPr sz="1500"/>
             </a:lvl8pPr>
-            <a:lvl9pPr marL="3657600" indent="0">
+            <a:lvl9pPr marL="2743132" indent="0">
               <a:buNone/>
-              <a:defRPr sz="2000"/>
+              <a:defRPr sz="1500"/>
             </a:lvl9pPr>
           </a:lstStyle>
           <a:p>
@@ -3113,8 +3217,8 @@
         </p:nvSpPr>
         <p:spPr>
           <a:xfrm>
-            <a:off x="1792288" y="5367338"/>
-            <a:ext cx="5486400" cy="804862"/>
+            <a:off x="1344216" y="7156452"/>
+            <a:ext cx="4114800" cy="1073149"/>
           </a:xfrm>
         </p:spPr>
         <p:txBody>
@@ -3122,39 +3226,39 @@
           <a:lstStyle>
             <a:lvl1pPr marL="0" indent="0">
               <a:buNone/>
-              <a:defRPr sz="1400"/>
+              <a:defRPr sz="1050"/>
             </a:lvl1pPr>
-            <a:lvl2pPr marL="457200" indent="0">
-              <a:buNone/>
-              <a:defRPr sz="1200"/>
-            </a:lvl2pPr>
-            <a:lvl3pPr marL="914400" indent="0">
-              <a:buNone/>
-              <a:defRPr sz="1000"/>
-            </a:lvl3pPr>
-            <a:lvl4pPr marL="1371600" indent="0">
+            <a:lvl2pPr marL="342892" indent="0">
               <a:buNone/>
               <a:defRPr sz="900"/>
+            </a:lvl2pPr>
+            <a:lvl3pPr marL="685784" indent="0">
+              <a:buNone/>
+              <a:defRPr sz="750"/>
+            </a:lvl3pPr>
+            <a:lvl4pPr marL="1028675" indent="0">
+              <a:buNone/>
+              <a:defRPr sz="675"/>
             </a:lvl4pPr>
-            <a:lvl5pPr marL="1828800" indent="0">
+            <a:lvl5pPr marL="1371566" indent="0">
               <a:buNone/>
-              <a:defRPr sz="900"/>
+              <a:defRPr sz="675"/>
             </a:lvl5pPr>
-            <a:lvl6pPr marL="2286000" indent="0">
+            <a:lvl6pPr marL="1714457" indent="0">
               <a:buNone/>
-              <a:defRPr sz="900"/>
+              <a:defRPr sz="675"/>
             </a:lvl6pPr>
-            <a:lvl7pPr marL="2743200" indent="0">
+            <a:lvl7pPr marL="2057349" indent="0">
               <a:buNone/>
-              <a:defRPr sz="900"/>
+              <a:defRPr sz="675"/>
             </a:lvl7pPr>
-            <a:lvl8pPr marL="3200400" indent="0">
+            <a:lvl8pPr marL="2400240" indent="0">
               <a:buNone/>
-              <a:defRPr sz="900"/>
+              <a:defRPr sz="675"/>
             </a:lvl8pPr>
-            <a:lvl9pPr marL="3657600" indent="0">
+            <a:lvl9pPr marL="2743132" indent="0">
               <a:buNone/>
-              <a:defRPr sz="900"/>
+              <a:defRPr sz="675"/>
             </a:lvl9pPr>
           </a:lstStyle>
           <a:p>
@@ -3184,7 +3288,7 @@
             <a:fld id="{7B9B12EC-6AA0-374B-A2D3-850081A07A26}" type="datetimeFigureOut">
               <a:rPr kumimoji="1" lang="ja-JP" altLang="en-US" smtClean="0"/>
               <a:pPr/>
-              <a:t>2013/11/29</a:t>
+              <a:t>2016/2/5</a:t>
             </a:fld>
             <a:endParaRPr kumimoji="1" lang="ja-JP" altLang="en-US"/>
           </a:p>
@@ -3280,8 +3384,8 @@
         </p:nvSpPr>
         <p:spPr>
           <a:xfrm>
-            <a:off x="457200" y="274638"/>
-            <a:ext cx="8229600" cy="1143000"/>
+            <a:off x="342900" y="366184"/>
+            <a:ext cx="6172200" cy="1524000"/>
           </a:xfrm>
           <a:prstGeom prst="rect">
             <a:avLst/>
@@ -3313,8 +3417,8 @@
         </p:nvSpPr>
         <p:spPr>
           <a:xfrm>
-            <a:off x="457200" y="1600200"/>
-            <a:ext cx="8229600" cy="4525963"/>
+            <a:off x="342900" y="2133602"/>
+            <a:ext cx="6172200" cy="6034617"/>
           </a:xfrm>
           <a:prstGeom prst="rect">
             <a:avLst/>
@@ -3407,8 +3511,8 @@
         </p:nvSpPr>
         <p:spPr>
           <a:xfrm>
-            <a:off x="457200" y="6356350"/>
-            <a:ext cx="2133600" cy="365125"/>
+            <a:off x="342900" y="8475136"/>
+            <a:ext cx="1600200" cy="486833"/>
           </a:xfrm>
           <a:prstGeom prst="rect">
             <a:avLst/>
@@ -3418,7 +3522,7 @@
           <a:bodyPr vert="horz" lIns="91440" tIns="45720" rIns="91440" bIns="45720" rtlCol="0" anchor="ctr"/>
           <a:lstStyle>
             <a:lvl1pPr algn="l">
-              <a:defRPr sz="1200">
+              <a:defRPr sz="900">
                 <a:solidFill>
                   <a:schemeClr val="tx1">
                     <a:tint val="75000"/>
@@ -3431,7 +3535,7 @@
             <a:fld id="{7B9B12EC-6AA0-374B-A2D3-850081A07A26}" type="datetimeFigureOut">
               <a:rPr kumimoji="1" lang="ja-JP" altLang="en-US" smtClean="0"/>
               <a:pPr/>
-              <a:t>2013/11/29</a:t>
+              <a:t>2016/2/5</a:t>
             </a:fld>
             <a:endParaRPr kumimoji="1" lang="ja-JP" altLang="en-US"/>
           </a:p>
@@ -3449,8 +3553,8 @@
         </p:nvSpPr>
         <p:spPr>
           <a:xfrm>
-            <a:off x="3124200" y="6356350"/>
-            <a:ext cx="2895600" cy="365125"/>
+            <a:off x="2343150" y="8475136"/>
+            <a:ext cx="2171700" cy="486833"/>
           </a:xfrm>
           <a:prstGeom prst="rect">
             <a:avLst/>
@@ -3460,7 +3564,7 @@
           <a:bodyPr vert="horz" lIns="91440" tIns="45720" rIns="91440" bIns="45720" rtlCol="0" anchor="ctr"/>
           <a:lstStyle>
             <a:lvl1pPr algn="ctr">
-              <a:defRPr sz="1200">
+              <a:defRPr sz="900">
                 <a:solidFill>
                   <a:schemeClr val="tx1">
                     <a:tint val="75000"/>
@@ -3486,8 +3590,8 @@
         </p:nvSpPr>
         <p:spPr>
           <a:xfrm>
-            <a:off x="6553200" y="6356350"/>
-            <a:ext cx="2133600" cy="365125"/>
+            <a:off x="4914900" y="8475136"/>
+            <a:ext cx="1600200" cy="486833"/>
           </a:xfrm>
           <a:prstGeom prst="rect">
             <a:avLst/>
@@ -3497,7 +3601,7 @@
           <a:bodyPr vert="horz" lIns="91440" tIns="45720" rIns="91440" bIns="45720" rtlCol="0" anchor="ctr"/>
           <a:lstStyle>
             <a:lvl1pPr algn="r">
-              <a:defRPr sz="1200">
+              <a:defRPr sz="900">
                 <a:solidFill>
                   <a:schemeClr val="tx1">
                     <a:tint val="75000"/>
@@ -3539,12 +3643,12 @@
   </p:sldLayoutIdLst>
   <p:txStyles>
     <p:titleStyle>
-      <a:lvl1pPr algn="ctr" defTabSz="457200" rtl="0" eaLnBrk="1" latinLnBrk="0" hangingPunct="1">
+      <a:lvl1pPr algn="ctr" defTabSz="342892" rtl="0" eaLnBrk="1" latinLnBrk="0" hangingPunct="1">
         <a:spcBef>
           <a:spcPct val="0"/>
         </a:spcBef>
         <a:buNone/>
-        <a:defRPr kumimoji="1" sz="4400" kern="1200">
+        <a:defRPr kumimoji="1" sz="3300" kern="1200">
           <a:solidFill>
             <a:schemeClr val="tx1"/>
           </a:solidFill>
@@ -3555,37 +3659,7 @@
       </a:lvl1pPr>
     </p:titleStyle>
     <p:bodyStyle>
-      <a:lvl1pPr marL="342900" indent="-342900" algn="l" defTabSz="457200" rtl="0" eaLnBrk="1" latinLnBrk="0" hangingPunct="1">
-        <a:spcBef>
-          <a:spcPct val="20000"/>
-        </a:spcBef>
-        <a:buFont typeface="Arial"/>
-        <a:buChar char="•"/>
-        <a:defRPr kumimoji="1" sz="3200" kern="1200">
-          <a:solidFill>
-            <a:schemeClr val="tx1"/>
-          </a:solidFill>
-          <a:latin typeface="+mn-lt"/>
-          <a:ea typeface="+mn-ea"/>
-          <a:cs typeface="+mn-cs"/>
-        </a:defRPr>
-      </a:lvl1pPr>
-      <a:lvl2pPr marL="742950" indent="-285750" algn="l" defTabSz="457200" rtl="0" eaLnBrk="1" latinLnBrk="0" hangingPunct="1">
-        <a:spcBef>
-          <a:spcPct val="20000"/>
-        </a:spcBef>
-        <a:buFont typeface="Arial"/>
-        <a:buChar char="–"/>
-        <a:defRPr kumimoji="1" sz="2800" kern="1200">
-          <a:solidFill>
-            <a:schemeClr val="tx1"/>
-          </a:solidFill>
-          <a:latin typeface="+mn-lt"/>
-          <a:ea typeface="+mn-ea"/>
-          <a:cs typeface="+mn-cs"/>
-        </a:defRPr>
-      </a:lvl2pPr>
-      <a:lvl3pPr marL="1143000" indent="-228600" algn="l" defTabSz="457200" rtl="0" eaLnBrk="1" latinLnBrk="0" hangingPunct="1">
+      <a:lvl1pPr marL="257169" indent="-257169" algn="l" defTabSz="342892" rtl="0" eaLnBrk="1" latinLnBrk="0" hangingPunct="1">
         <a:spcBef>
           <a:spcPct val="20000"/>
         </a:spcBef>
@@ -3599,14 +3673,44 @@
           <a:ea typeface="+mn-ea"/>
           <a:cs typeface="+mn-cs"/>
         </a:defRPr>
-      </a:lvl3pPr>
-      <a:lvl4pPr marL="1600200" indent="-228600" algn="l" defTabSz="457200" rtl="0" eaLnBrk="1" latinLnBrk="0" hangingPunct="1">
+      </a:lvl1pPr>
+      <a:lvl2pPr marL="557198" indent="-214307" algn="l" defTabSz="342892" rtl="0" eaLnBrk="1" latinLnBrk="0" hangingPunct="1">
         <a:spcBef>
           <a:spcPct val="20000"/>
         </a:spcBef>
         <a:buFont typeface="Arial"/>
         <a:buChar char="–"/>
-        <a:defRPr kumimoji="1" sz="2000" kern="1200">
+        <a:defRPr kumimoji="1" sz="2100" kern="1200">
+          <a:solidFill>
+            <a:schemeClr val="tx1"/>
+          </a:solidFill>
+          <a:latin typeface="+mn-lt"/>
+          <a:ea typeface="+mn-ea"/>
+          <a:cs typeface="+mn-cs"/>
+        </a:defRPr>
+      </a:lvl2pPr>
+      <a:lvl3pPr marL="857229" indent="-171446" algn="l" defTabSz="342892" rtl="0" eaLnBrk="1" latinLnBrk="0" hangingPunct="1">
+        <a:spcBef>
+          <a:spcPct val="20000"/>
+        </a:spcBef>
+        <a:buFont typeface="Arial"/>
+        <a:buChar char="•"/>
+        <a:defRPr kumimoji="1" sz="1800" kern="1200">
+          <a:solidFill>
+            <a:schemeClr val="tx1"/>
+          </a:solidFill>
+          <a:latin typeface="+mn-lt"/>
+          <a:ea typeface="+mn-ea"/>
+          <a:cs typeface="+mn-cs"/>
+        </a:defRPr>
+      </a:lvl3pPr>
+      <a:lvl4pPr marL="1200120" indent="-171446" algn="l" defTabSz="342892" rtl="0" eaLnBrk="1" latinLnBrk="0" hangingPunct="1">
+        <a:spcBef>
+          <a:spcPct val="20000"/>
+        </a:spcBef>
+        <a:buFont typeface="Arial"/>
+        <a:buChar char="–"/>
+        <a:defRPr kumimoji="1" sz="1500" kern="1200">
           <a:solidFill>
             <a:schemeClr val="tx1"/>
           </a:solidFill>
@@ -3615,13 +3719,13 @@
           <a:cs typeface="+mn-cs"/>
         </a:defRPr>
       </a:lvl4pPr>
-      <a:lvl5pPr marL="2057400" indent="-228600" algn="l" defTabSz="457200" rtl="0" eaLnBrk="1" latinLnBrk="0" hangingPunct="1">
+      <a:lvl5pPr marL="1543011" indent="-171446" algn="l" defTabSz="342892" rtl="0" eaLnBrk="1" latinLnBrk="0" hangingPunct="1">
         <a:spcBef>
           <a:spcPct val="20000"/>
         </a:spcBef>
         <a:buFont typeface="Arial"/>
         <a:buChar char="»"/>
-        <a:defRPr kumimoji="1" sz="2000" kern="1200">
+        <a:defRPr kumimoji="1" sz="1500" kern="1200">
           <a:solidFill>
             <a:schemeClr val="tx1"/>
           </a:solidFill>
@@ -3630,13 +3734,13 @@
           <a:cs typeface="+mn-cs"/>
         </a:defRPr>
       </a:lvl5pPr>
-      <a:lvl6pPr marL="2514600" indent="-228600" algn="l" defTabSz="457200" rtl="0" eaLnBrk="1" latinLnBrk="0" hangingPunct="1">
+      <a:lvl6pPr marL="1885903" indent="-171446" algn="l" defTabSz="342892" rtl="0" eaLnBrk="1" latinLnBrk="0" hangingPunct="1">
         <a:spcBef>
           <a:spcPct val="20000"/>
         </a:spcBef>
         <a:buFont typeface="Arial"/>
         <a:buChar char="•"/>
-        <a:defRPr kumimoji="1" sz="2000" kern="1200">
+        <a:defRPr kumimoji="1" sz="1500" kern="1200">
           <a:solidFill>
             <a:schemeClr val="tx1"/>
           </a:solidFill>
@@ -3645,13 +3749,13 @@
           <a:cs typeface="+mn-cs"/>
         </a:defRPr>
       </a:lvl6pPr>
-      <a:lvl7pPr marL="2971800" indent="-228600" algn="l" defTabSz="457200" rtl="0" eaLnBrk="1" latinLnBrk="0" hangingPunct="1">
+      <a:lvl7pPr marL="2228795" indent="-171446" algn="l" defTabSz="342892" rtl="0" eaLnBrk="1" latinLnBrk="0" hangingPunct="1">
         <a:spcBef>
           <a:spcPct val="20000"/>
         </a:spcBef>
         <a:buFont typeface="Arial"/>
         <a:buChar char="•"/>
-        <a:defRPr kumimoji="1" sz="2000" kern="1200">
+        <a:defRPr kumimoji="1" sz="1500" kern="1200">
           <a:solidFill>
             <a:schemeClr val="tx1"/>
           </a:solidFill>
@@ -3660,13 +3764,13 @@
           <a:cs typeface="+mn-cs"/>
         </a:defRPr>
       </a:lvl7pPr>
-      <a:lvl8pPr marL="3429000" indent="-228600" algn="l" defTabSz="457200" rtl="0" eaLnBrk="1" latinLnBrk="0" hangingPunct="1">
+      <a:lvl8pPr marL="2571686" indent="-171446" algn="l" defTabSz="342892" rtl="0" eaLnBrk="1" latinLnBrk="0" hangingPunct="1">
         <a:spcBef>
           <a:spcPct val="20000"/>
         </a:spcBef>
         <a:buFont typeface="Arial"/>
         <a:buChar char="•"/>
-        <a:defRPr kumimoji="1" sz="2000" kern="1200">
+        <a:defRPr kumimoji="1" sz="1500" kern="1200">
           <a:solidFill>
             <a:schemeClr val="tx1"/>
           </a:solidFill>
@@ -3675,13 +3779,13 @@
           <a:cs typeface="+mn-cs"/>
         </a:defRPr>
       </a:lvl8pPr>
-      <a:lvl9pPr marL="3886200" indent="-228600" algn="l" defTabSz="457200" rtl="0" eaLnBrk="1" latinLnBrk="0" hangingPunct="1">
+      <a:lvl9pPr marL="2914577" indent="-171446" algn="l" defTabSz="342892" rtl="0" eaLnBrk="1" latinLnBrk="0" hangingPunct="1">
         <a:spcBef>
           <a:spcPct val="20000"/>
         </a:spcBef>
         <a:buFont typeface="Arial"/>
         <a:buChar char="•"/>
-        <a:defRPr kumimoji="1" sz="2000" kern="1200">
+        <a:defRPr kumimoji="1" sz="1500" kern="1200">
           <a:solidFill>
             <a:schemeClr val="tx1"/>
           </a:solidFill>
@@ -3695,8 +3799,8 @@
       <a:defPPr>
         <a:defRPr lang="ja-JP"/>
       </a:defPPr>
-      <a:lvl1pPr marL="0" algn="l" defTabSz="457200" rtl="0" eaLnBrk="1" latinLnBrk="0" hangingPunct="1">
-        <a:defRPr kumimoji="1" sz="1800" kern="1200">
+      <a:lvl1pPr marL="0" algn="l" defTabSz="342892" rtl="0" eaLnBrk="1" latinLnBrk="0" hangingPunct="1">
+        <a:defRPr kumimoji="1" sz="1350" kern="1200">
           <a:solidFill>
             <a:schemeClr val="tx1"/>
           </a:solidFill>
@@ -3705,8 +3809,8 @@
           <a:cs typeface="+mn-cs"/>
         </a:defRPr>
       </a:lvl1pPr>
-      <a:lvl2pPr marL="457200" algn="l" defTabSz="457200" rtl="0" eaLnBrk="1" latinLnBrk="0" hangingPunct="1">
-        <a:defRPr kumimoji="1" sz="1800" kern="1200">
+      <a:lvl2pPr marL="342892" algn="l" defTabSz="342892" rtl="0" eaLnBrk="1" latinLnBrk="0" hangingPunct="1">
+        <a:defRPr kumimoji="1" sz="1350" kern="1200">
           <a:solidFill>
             <a:schemeClr val="tx1"/>
           </a:solidFill>
@@ -3715,8 +3819,8 @@
           <a:cs typeface="+mn-cs"/>
         </a:defRPr>
       </a:lvl2pPr>
-      <a:lvl3pPr marL="914400" algn="l" defTabSz="457200" rtl="0" eaLnBrk="1" latinLnBrk="0" hangingPunct="1">
-        <a:defRPr kumimoji="1" sz="1800" kern="1200">
+      <a:lvl3pPr marL="685784" algn="l" defTabSz="342892" rtl="0" eaLnBrk="1" latinLnBrk="0" hangingPunct="1">
+        <a:defRPr kumimoji="1" sz="1350" kern="1200">
           <a:solidFill>
             <a:schemeClr val="tx1"/>
           </a:solidFill>
@@ -3725,8 +3829,8 @@
           <a:cs typeface="+mn-cs"/>
         </a:defRPr>
       </a:lvl3pPr>
-      <a:lvl4pPr marL="1371600" algn="l" defTabSz="457200" rtl="0" eaLnBrk="1" latinLnBrk="0" hangingPunct="1">
-        <a:defRPr kumimoji="1" sz="1800" kern="1200">
+      <a:lvl4pPr marL="1028675" algn="l" defTabSz="342892" rtl="0" eaLnBrk="1" latinLnBrk="0" hangingPunct="1">
+        <a:defRPr kumimoji="1" sz="1350" kern="1200">
           <a:solidFill>
             <a:schemeClr val="tx1"/>
           </a:solidFill>
@@ -3735,8 +3839,8 @@
           <a:cs typeface="+mn-cs"/>
         </a:defRPr>
       </a:lvl4pPr>
-      <a:lvl5pPr marL="1828800" algn="l" defTabSz="457200" rtl="0" eaLnBrk="1" latinLnBrk="0" hangingPunct="1">
-        <a:defRPr kumimoji="1" sz="1800" kern="1200">
+      <a:lvl5pPr marL="1371566" algn="l" defTabSz="342892" rtl="0" eaLnBrk="1" latinLnBrk="0" hangingPunct="1">
+        <a:defRPr kumimoji="1" sz="1350" kern="1200">
           <a:solidFill>
             <a:schemeClr val="tx1"/>
           </a:solidFill>
@@ -3745,8 +3849,8 @@
           <a:cs typeface="+mn-cs"/>
         </a:defRPr>
       </a:lvl5pPr>
-      <a:lvl6pPr marL="2286000" algn="l" defTabSz="457200" rtl="0" eaLnBrk="1" latinLnBrk="0" hangingPunct="1">
-        <a:defRPr kumimoji="1" sz="1800" kern="1200">
+      <a:lvl6pPr marL="1714457" algn="l" defTabSz="342892" rtl="0" eaLnBrk="1" latinLnBrk="0" hangingPunct="1">
+        <a:defRPr kumimoji="1" sz="1350" kern="1200">
           <a:solidFill>
             <a:schemeClr val="tx1"/>
           </a:solidFill>
@@ -3755,8 +3859,8 @@
           <a:cs typeface="+mn-cs"/>
         </a:defRPr>
       </a:lvl6pPr>
-      <a:lvl7pPr marL="2743200" algn="l" defTabSz="457200" rtl="0" eaLnBrk="1" latinLnBrk="0" hangingPunct="1">
-        <a:defRPr kumimoji="1" sz="1800" kern="1200">
+      <a:lvl7pPr marL="2057349" algn="l" defTabSz="342892" rtl="0" eaLnBrk="1" latinLnBrk="0" hangingPunct="1">
+        <a:defRPr kumimoji="1" sz="1350" kern="1200">
           <a:solidFill>
             <a:schemeClr val="tx1"/>
           </a:solidFill>
@@ -3765,8 +3869,8 @@
           <a:cs typeface="+mn-cs"/>
         </a:defRPr>
       </a:lvl7pPr>
-      <a:lvl8pPr marL="3200400" algn="l" defTabSz="457200" rtl="0" eaLnBrk="1" latinLnBrk="0" hangingPunct="1">
-        <a:defRPr kumimoji="1" sz="1800" kern="1200">
+      <a:lvl8pPr marL="2400240" algn="l" defTabSz="342892" rtl="0" eaLnBrk="1" latinLnBrk="0" hangingPunct="1">
+        <a:defRPr kumimoji="1" sz="1350" kern="1200">
           <a:solidFill>
             <a:schemeClr val="tx1"/>
           </a:solidFill>
@@ -3775,8 +3879,8 @@
           <a:cs typeface="+mn-cs"/>
         </a:defRPr>
       </a:lvl8pPr>
-      <a:lvl9pPr marL="3657600" algn="l" defTabSz="457200" rtl="0" eaLnBrk="1" latinLnBrk="0" hangingPunct="1">
-        <a:defRPr kumimoji="1" sz="1800" kern="1200">
+      <a:lvl9pPr marL="2743132" algn="l" defTabSz="342892" rtl="0" eaLnBrk="1" latinLnBrk="0" hangingPunct="1">
+        <a:defRPr kumimoji="1" sz="1350" kern="1200">
           <a:solidFill>
             <a:schemeClr val="tx1"/>
           </a:solidFill>
@@ -3816,7 +3920,7 @@
           <p:nvPr/>
         </p:nvPicPr>
         <p:blipFill>
-          <a:blip r:embed="rId2"/>
+          <a:blip r:embed="rId3"/>
           <a:srcRect/>
           <a:stretch>
             <a:fillRect/>
@@ -3824,8 +3928,8 @@
         </p:blipFill>
         <p:spPr bwMode="auto">
           <a:xfrm>
-            <a:off x="770083" y="-473221"/>
-            <a:ext cx="2253811" cy="2334772"/>
+            <a:off x="577563" y="616686"/>
+            <a:ext cx="1690358" cy="1751079"/>
           </a:xfrm>
           <a:prstGeom prst="rect">
             <a:avLst/>
@@ -3843,8 +3947,8 @@
         </p:nvSpPr>
         <p:spPr bwMode="auto">
           <a:xfrm>
-            <a:off x="317367" y="1861550"/>
-            <a:ext cx="8685384" cy="7224393"/>
+            <a:off x="238025" y="2367765"/>
+            <a:ext cx="6514038" cy="5418295"/>
           </a:xfrm>
           <a:prstGeom prst="rect">
             <a:avLst/>
@@ -3877,7 +3981,7 @@
           </a:fontRef>
         </p:style>
         <p:txBody>
-          <a:bodyPr vert="horz" wrap="square" lIns="74295" tIns="8890" rIns="74295" bIns="8890" numCol="1" anchor="t" anchorCtr="0" compatLnSpc="1">
+          <a:bodyPr vert="horz" wrap="square" lIns="55721" tIns="6668" rIns="55721" bIns="6668" numCol="1" anchor="t" anchorCtr="0" compatLnSpc="1">
             <a:prstTxWarp prst="textNoShape">
               <a:avLst/>
             </a:prstTxWarp>
@@ -3885,7 +3989,7 @@
           <a:lstStyle/>
           <a:p>
             <a:pPr algn="ctr"/>
-            <a:endParaRPr lang="ja-JP" altLang="en-US" b="1" dirty="0">
+            <a:endParaRPr lang="ja-JP" altLang="en-US" sz="1350" b="1" dirty="0">
               <a:solidFill>
                 <a:schemeClr val="tx1"/>
               </a:solidFill>
@@ -3903,8 +4007,8 @@
         </p:nvCxnSpPr>
         <p:spPr>
           <a:xfrm>
-            <a:off x="1907833" y="1371600"/>
-            <a:ext cx="0" cy="864598"/>
+            <a:off x="1430875" y="2000302"/>
+            <a:ext cx="0" cy="648449"/>
           </a:xfrm>
           <a:prstGeom prst="straightConnector1">
             <a:avLst/>
@@ -3944,8 +4048,8 @@
         </p:nvSpPr>
         <p:spPr bwMode="auto">
           <a:xfrm>
-            <a:off x="1144028" y="4006563"/>
-            <a:ext cx="1524420" cy="913579"/>
+            <a:off x="859217" y="4934858"/>
+            <a:ext cx="1143315" cy="685184"/>
           </a:xfrm>
           <a:prstGeom prst="rect">
             <a:avLst/>
@@ -3985,7 +4089,7 @@
           </a:fontRef>
         </p:style>
         <p:txBody>
-          <a:bodyPr vert="horz" wrap="square" lIns="74295" tIns="8890" rIns="74295" bIns="8890" numCol="1" anchor="ctr" anchorCtr="1" compatLnSpc="1">
+          <a:bodyPr vert="horz" wrap="square" lIns="55721" tIns="6668" rIns="55721" bIns="6668" numCol="1" anchor="ctr" anchorCtr="1" compatLnSpc="1">
             <a:prstTxWarp prst="textNoShape">
               <a:avLst/>
             </a:prstTxWarp>
@@ -3994,24 +4098,24 @@
           <a:p>
             <a:pPr algn="ctr"/>
             <a:r>
-              <a:rPr lang="en-US" altLang="ja-JP" sz="1000" b="1" dirty="0" smtClean="0"/>
+              <a:rPr lang="en-US" altLang="ja-JP" sz="750" b="1" dirty="0"/>
               <a:t>&lt;Spring MVC&gt;</a:t>
             </a:r>
           </a:p>
           <a:p>
             <a:pPr algn="ctr"/>
             <a:r>
-              <a:rPr lang="en-US" altLang="ja-JP" b="1" dirty="0" smtClean="0"/>
+              <a:rPr lang="en-US" altLang="ja-JP" sz="1350" b="1" dirty="0"/>
               <a:t>Dispatcher</a:t>
             </a:r>
           </a:p>
           <a:p>
             <a:pPr algn="ctr"/>
             <a:r>
-              <a:rPr lang="en-US" altLang="ja-JP" b="1" dirty="0" smtClean="0"/>
+              <a:rPr lang="en-US" altLang="ja-JP" sz="1350" b="1" dirty="0"/>
               <a:t>Servlet</a:t>
             </a:r>
-            <a:endParaRPr lang="ja-JP" altLang="en-US" b="1" dirty="0"/>
+            <a:endParaRPr lang="ja-JP" altLang="en-US" sz="1350" b="1" dirty="0"/>
           </a:p>
         </p:txBody>
       </p:sp>
@@ -4023,8 +4127,8 @@
         </p:nvSpPr>
         <p:spPr>
           <a:xfrm>
-            <a:off x="2826034" y="6274863"/>
-            <a:ext cx="1233160" cy="583137"/>
+            <a:off x="2119526" y="5831612"/>
+            <a:ext cx="924870" cy="437353"/>
           </a:xfrm>
           <a:prstGeom prst="roundRect">
             <a:avLst/>
@@ -4050,10 +4154,10 @@
           <a:p>
             <a:pPr algn="ctr"/>
             <a:r>
-              <a:rPr lang="en-US" altLang="ja-JP" sz="1600" b="1" dirty="0" smtClean="0"/>
+              <a:rPr lang="en-US" altLang="ja-JP" sz="1200" b="1" dirty="0"/>
               <a:t>Controller</a:t>
             </a:r>
-            <a:endParaRPr lang="ja-JP" altLang="en-US" sz="1600" b="1" dirty="0"/>
+            <a:endParaRPr lang="ja-JP" altLang="en-US" sz="1200" b="1" dirty="0"/>
           </a:p>
         </p:txBody>
       </p:sp>
@@ -4068,8 +4172,8 @@
         </p:nvCxnSpPr>
         <p:spPr>
           <a:xfrm rot="16200000" flipH="1">
-            <a:off x="1542991" y="5283389"/>
-            <a:ext cx="1646290" cy="919796"/>
+            <a:off x="1560077" y="5490839"/>
+            <a:ext cx="430247" cy="688651"/>
           </a:xfrm>
           <a:prstGeom prst="bentConnector2">
             <a:avLst/>
@@ -4109,8 +4213,8 @@
         </p:nvSpPr>
         <p:spPr bwMode="auto">
           <a:xfrm>
-            <a:off x="3682137" y="4015339"/>
-            <a:ext cx="1955844" cy="889162"/>
+            <a:off x="2761603" y="3790537"/>
+            <a:ext cx="1466883" cy="666872"/>
           </a:xfrm>
           <a:prstGeom prst="rect">
             <a:avLst/>
@@ -4150,7 +4254,7 @@
           </a:fontRef>
         </p:style>
         <p:txBody>
-          <a:bodyPr vert="horz" wrap="square" lIns="74295" tIns="8890" rIns="74295" bIns="8890" numCol="1" anchor="ctr" anchorCtr="1" compatLnSpc="1">
+          <a:bodyPr vert="horz" wrap="square" lIns="55721" tIns="6668" rIns="55721" bIns="6668" numCol="1" anchor="ctr" anchorCtr="1" compatLnSpc="1">
             <a:prstTxWarp prst="textNoShape">
               <a:avLst/>
             </a:prstTxWarp>
@@ -4159,25 +4263,25 @@
           <a:p>
             <a:pPr algn="ctr"/>
             <a:r>
-              <a:rPr lang="en-US" altLang="ja-JP" sz="1000" b="1" dirty="0" smtClean="0"/>
+              <a:rPr lang="en-US" altLang="ja-JP" sz="750" b="1" dirty="0"/>
               <a:t>&lt;Spring Web&gt;</a:t>
             </a:r>
           </a:p>
           <a:p>
             <a:pPr algn="ctr"/>
             <a:r>
-              <a:rPr lang="en-US" altLang="ja-JP" dirty="0" err="1" smtClean="0"/>
+              <a:rPr lang="en-US" altLang="ja-JP" sz="1350" dirty="0" err="1"/>
               <a:t>StandardServlet</a:t>
             </a:r>
-            <a:endParaRPr lang="en-US" altLang="ja-JP" dirty="0" smtClean="0"/>
+            <a:endParaRPr lang="en-US" altLang="ja-JP" sz="1350" dirty="0"/>
           </a:p>
           <a:p>
             <a:pPr algn="ctr"/>
             <a:r>
-              <a:rPr lang="en-US" altLang="ja-JP" dirty="0" err="1" smtClean="0"/>
+              <a:rPr lang="en-US" altLang="ja-JP" sz="1350" dirty="0" err="1"/>
               <a:t>MultipartResolver</a:t>
             </a:r>
-            <a:endParaRPr lang="ja-JP" altLang="en-US" b="1" dirty="0"/>
+            <a:endParaRPr lang="ja-JP" altLang="en-US" sz="1350" b="1" dirty="0"/>
           </a:p>
         </p:txBody>
       </p:sp>
@@ -4191,8 +4295,8 @@
         </p:nvSpPr>
         <p:spPr bwMode="auto">
           <a:xfrm>
-            <a:off x="3910477" y="5286720"/>
-            <a:ext cx="1364739" cy="652534"/>
+            <a:off x="2932859" y="5032750"/>
+            <a:ext cx="1023554" cy="489401"/>
           </a:xfrm>
           <a:prstGeom prst="rect">
             <a:avLst/>
@@ -4232,7 +4336,7 @@
           </a:fontRef>
         </p:style>
         <p:txBody>
-          <a:bodyPr vert="horz" wrap="square" lIns="74295" tIns="8890" rIns="74295" bIns="8890" numCol="1" anchor="ctr" anchorCtr="1" compatLnSpc="1">
+          <a:bodyPr vert="horz" wrap="square" lIns="55721" tIns="6668" rIns="55721" bIns="6668" numCol="1" anchor="ctr" anchorCtr="1" compatLnSpc="1">
             <a:prstTxWarp prst="textNoShape">
               <a:avLst/>
             </a:prstTxWarp>
@@ -4241,17 +4345,17 @@
           <a:p>
             <a:pPr algn="ctr"/>
             <a:r>
-              <a:rPr lang="en-US" altLang="ja-JP" sz="1000" b="1" dirty="0" smtClean="0"/>
+              <a:rPr lang="en-US" altLang="ja-JP" sz="750" b="1" dirty="0"/>
               <a:t>&lt;Spring Web&gt;</a:t>
             </a:r>
           </a:p>
           <a:p>
             <a:pPr algn="ctr"/>
             <a:r>
-              <a:rPr lang="en-US" altLang="ja-JP" dirty="0" err="1"/>
+              <a:rPr lang="en-US" altLang="ja-JP" sz="1350" dirty="0" err="1"/>
               <a:t>MultipartFile</a:t>
             </a:r>
-            <a:endParaRPr lang="ja-JP" altLang="en-US" b="1" dirty="0"/>
+            <a:endParaRPr lang="ja-JP" altLang="en-US" sz="1350" b="1" dirty="0"/>
           </a:p>
         </p:txBody>
       </p:sp>
@@ -4263,8 +4367,8 @@
         </p:nvSpPr>
         <p:spPr>
           <a:xfrm>
-            <a:off x="619315" y="2236198"/>
-            <a:ext cx="2577035" cy="981005"/>
+            <a:off x="464487" y="2648751"/>
+            <a:ext cx="1932776" cy="735754"/>
           </a:xfrm>
           <a:prstGeom prst="rect">
             <a:avLst/>
@@ -4290,21 +4394,21 @@
           <a:p>
             <a:pPr algn="ctr"/>
             <a:r>
-              <a:rPr lang="en-US" altLang="ja-JP" b="1" dirty="0"/>
+              <a:rPr lang="en-US" altLang="ja-JP" sz="1350" b="1" dirty="0"/>
               <a:t>&lt;Application Server&gt;</a:t>
             </a:r>
           </a:p>
           <a:p>
             <a:pPr algn="ctr"/>
             <a:r>
-              <a:rPr kumimoji="1" lang="en-US" altLang="ja-JP" dirty="0" smtClean="0"/>
+              <a:rPr lang="en-US" altLang="ja-JP" sz="1350" dirty="0"/>
               <a:t>Servlet</a:t>
             </a:r>
           </a:p>
           <a:p>
             <a:pPr algn="ctr"/>
             <a:r>
-              <a:rPr lang="en-US" altLang="ja-JP" dirty="0" smtClean="0"/>
+              <a:rPr lang="en-US" altLang="ja-JP" sz="1350" dirty="0"/>
               <a:t>Container</a:t>
             </a:r>
           </a:p>
@@ -4314,15 +4418,15 @@
         <p:nvCxnSpPr>
           <p:cNvPr id="70" name="カギ線コネクタ 69"/>
           <p:cNvCxnSpPr>
-            <a:stCxn id="62" idx="2"/>
+            <a:stCxn id="53" idx="2"/>
             <a:endCxn id="24" idx="0"/>
           </p:cNvCxnSpPr>
           <p:nvPr/>
         </p:nvCxnSpPr>
         <p:spPr>
-          <a:xfrm flipH="1">
-            <a:off x="1906238" y="3217203"/>
-            <a:ext cx="1595" cy="789360"/>
+          <a:xfrm>
+            <a:off x="1430875" y="4368674"/>
+            <a:ext cx="0" cy="566184"/>
           </a:xfrm>
           <a:prstGeom prst="straightConnector1">
             <a:avLst/>
@@ -4352,50 +4456,6 @@
           </a:fontRef>
         </p:style>
       </p:cxnSp>
-      <p:cxnSp>
-        <p:nvCxnSpPr>
-          <p:cNvPr id="73" name="カギ線コネクタ 72"/>
-          <p:cNvCxnSpPr>
-            <a:stCxn id="24" idx="3"/>
-            <a:endCxn id="58" idx="1"/>
-          </p:cNvCxnSpPr>
-          <p:nvPr/>
-        </p:nvCxnSpPr>
-        <p:spPr>
-          <a:xfrm flipV="1">
-            <a:off x="2668448" y="4459920"/>
-            <a:ext cx="1013689" cy="3433"/>
-          </a:xfrm>
-          <a:prstGeom prst="bentConnector3">
-            <a:avLst>
-              <a:gd name="adj1" fmla="val 50000"/>
-            </a:avLst>
-          </a:prstGeom>
-          <a:ln>
-            <a:solidFill>
-              <a:schemeClr val="tx1">
-                <a:lumMod val="65000"/>
-                <a:lumOff val="35000"/>
-              </a:schemeClr>
-            </a:solidFill>
-            <a:tailEnd type="arrow"/>
-          </a:ln>
-        </p:spPr>
-        <p:style>
-          <a:lnRef idx="2">
-            <a:schemeClr val="accent1"/>
-          </a:lnRef>
-          <a:fillRef idx="0">
-            <a:schemeClr val="accent1"/>
-          </a:fillRef>
-          <a:effectRef idx="1">
-            <a:schemeClr val="accent1"/>
-          </a:effectRef>
-          <a:fontRef idx="minor">
-            <a:schemeClr val="tx1"/>
-          </a:fontRef>
-        </p:style>
-      </p:cxnSp>
       <p:sp>
         <p:nvSpPr>
           <p:cNvPr id="78" name="File"/>
@@ -4406,8 +4466,8 @@
         </p:nvSpPr>
         <p:spPr bwMode="auto">
           <a:xfrm>
-            <a:off x="7006519" y="2595488"/>
-            <a:ext cx="1448887" cy="957943"/>
+            <a:off x="5254891" y="2918219"/>
+            <a:ext cx="1086665" cy="718457"/>
           </a:xfrm>
           <a:custGeom>
             <a:avLst/>
@@ -4570,7 +4630,7 @@
           </a:effectLst>
         </p:spPr>
         <p:txBody>
-          <a:bodyPr vert="horz" wrap="square" lIns="91440" tIns="45720" rIns="91440" bIns="45720" numCol="1" anchor="b" anchorCtr="0" compatLnSpc="1">
+          <a:bodyPr vert="horz" wrap="square" lIns="68580" tIns="34290" rIns="68580" bIns="34290" numCol="1" anchor="b" anchorCtr="0" compatLnSpc="1">
             <a:prstTxWarp prst="textNoShape">
               <a:avLst/>
             </a:prstTxWarp>
@@ -4578,7 +4638,7 @@
           <a:lstStyle/>
           <a:p>
             <a:pPr algn="ctr"/>
-            <a:endParaRPr lang="ja-JP" altLang="en-US" dirty="0"/>
+            <a:endParaRPr lang="ja-JP" altLang="en-US" sz="1350" dirty="0"/>
           </a:p>
         </p:txBody>
       </p:sp>
@@ -4590,8 +4650,8 @@
         </p:nvSpPr>
         <p:spPr>
           <a:xfrm>
-            <a:off x="7237476" y="2862264"/>
-            <a:ext cx="986972" cy="563279"/>
+            <a:off x="5333971" y="3118301"/>
+            <a:ext cx="928502" cy="422459"/>
           </a:xfrm>
           <a:prstGeom prst="flowChartDocument">
             <a:avLst/>
@@ -4626,7 +4686,7 @@
           <a:p>
             <a:pPr algn="ctr"/>
             <a:r>
-              <a:rPr kumimoji="1" lang="en-US" altLang="ja-JP" sz="1400" dirty="0" smtClean="0">
+              <a:rPr lang="en-US" altLang="ja-JP" sz="1050" dirty="0">
                 <a:solidFill>
                   <a:schemeClr val="tx1">
                     <a:lumMod val="50000"/>
@@ -4640,7 +4700,7 @@
           <a:p>
             <a:pPr algn="ctr"/>
             <a:r>
-              <a:rPr lang="en-US" altLang="ja-JP" sz="1400" dirty="0" smtClean="0">
+              <a:rPr lang="en-US" altLang="ja-JP" sz="1050" dirty="0">
                 <a:solidFill>
                   <a:schemeClr val="tx1">
                     <a:lumMod val="50000"/>
@@ -4650,7 +4710,7 @@
               </a:rPr>
               <a:t>File</a:t>
             </a:r>
-            <a:endParaRPr kumimoji="1" lang="ja-JP" altLang="en-US" sz="1400" dirty="0">
+            <a:endParaRPr lang="ja-JP" altLang="en-US" sz="1050" dirty="0">
               <a:solidFill>
                 <a:schemeClr val="tx1">
                   <a:lumMod val="50000"/>
@@ -4671,8 +4731,8 @@
         </p:nvSpPr>
         <p:spPr bwMode="auto">
           <a:xfrm>
-            <a:off x="7006518" y="6325663"/>
-            <a:ext cx="1448887" cy="1010118"/>
+            <a:off x="5254890" y="5715849"/>
+            <a:ext cx="1086665" cy="757589"/>
           </a:xfrm>
           <a:custGeom>
             <a:avLst/>
@@ -4835,7 +4895,7 @@
           </a:effectLst>
         </p:spPr>
         <p:txBody>
-          <a:bodyPr vert="horz" wrap="square" lIns="91440" tIns="45720" rIns="91440" bIns="45720" numCol="1" anchor="b" anchorCtr="0" compatLnSpc="1">
+          <a:bodyPr vert="horz" wrap="square" lIns="68580" tIns="34290" rIns="68580" bIns="34290" numCol="1" anchor="b" anchorCtr="0" compatLnSpc="1">
             <a:prstTxWarp prst="textNoShape">
               <a:avLst/>
             </a:prstTxWarp>
@@ -4843,7 +4903,7 @@
           <a:lstStyle/>
           <a:p>
             <a:pPr algn="ctr"/>
-            <a:endParaRPr lang="ja-JP" altLang="en-US" dirty="0"/>
+            <a:endParaRPr lang="ja-JP" altLang="en-US" sz="1350" dirty="0"/>
           </a:p>
         </p:txBody>
       </p:sp>
@@ -4855,8 +4915,8 @@
         </p:nvSpPr>
         <p:spPr>
           <a:xfrm>
-            <a:off x="6427010" y="1982202"/>
-            <a:ext cx="2577238" cy="646331"/>
+            <a:off x="4820258" y="2458255"/>
+            <a:ext cx="1932929" cy="507831"/>
           </a:xfrm>
           <a:prstGeom prst="rect">
             <a:avLst/>
@@ -4871,25 +4931,17 @@
           <a:p>
             <a:pPr algn="ctr"/>
             <a:r>
-              <a:rPr lang="en-US" altLang="ja-JP" dirty="0"/>
-              <a:t>Temporary </a:t>
-            </a:r>
-            <a:r>
-              <a:rPr lang="en-US" altLang="ja-JP" dirty="0" smtClean="0"/>
-              <a:t>directory</a:t>
+              <a:rPr lang="en-US" altLang="ja-JP" sz="1350" dirty="0"/>
+              <a:t>Temporary directory</a:t>
             </a:r>
           </a:p>
           <a:p>
             <a:pPr algn="ctr"/>
             <a:r>
-              <a:rPr lang="en-US" altLang="ja-JP" dirty="0"/>
-              <a:t>f</a:t>
-            </a:r>
-            <a:r>
-              <a:rPr lang="en-US" altLang="ja-JP" dirty="0" smtClean="0"/>
-              <a:t>or servlet container</a:t>
-            </a:r>
-            <a:endParaRPr kumimoji="1" lang="ja-JP" altLang="en-US" dirty="0"/>
+              <a:rPr lang="en-US" altLang="ja-JP" sz="1350" dirty="0"/>
+              <a:t>for servlet container</a:t>
+            </a:r>
+            <a:endParaRPr lang="ja-JP" altLang="en-US" sz="1350" dirty="0"/>
           </a:p>
         </p:txBody>
       </p:sp>
@@ -4901,8 +4953,8 @@
         </p:nvSpPr>
         <p:spPr>
           <a:xfrm>
-            <a:off x="2023085" y="1522259"/>
-            <a:ext cx="830168" cy="563279"/>
+            <a:off x="1517315" y="2113298"/>
+            <a:ext cx="622626" cy="422459"/>
           </a:xfrm>
           <a:prstGeom prst="flowChartDocument">
             <a:avLst/>
@@ -4937,7 +4989,7 @@
           <a:p>
             <a:pPr algn="ctr"/>
             <a:r>
-              <a:rPr lang="en-US" altLang="ja-JP" sz="1400" dirty="0" smtClean="0">
+              <a:rPr lang="en-US" altLang="ja-JP" sz="1050" dirty="0">
                 <a:solidFill>
                   <a:schemeClr val="tx1">
                     <a:lumMod val="50000"/>
@@ -4951,7 +5003,7 @@
           <a:p>
             <a:pPr algn="ctr"/>
             <a:r>
-              <a:rPr lang="en-US" altLang="ja-JP" sz="1400" dirty="0" smtClean="0">
+              <a:rPr lang="en-US" altLang="ja-JP" sz="1050" dirty="0">
                 <a:solidFill>
                   <a:schemeClr val="tx1">
                     <a:lumMod val="50000"/>
@@ -4961,7 +5013,7 @@
               </a:rPr>
               <a:t>File</a:t>
             </a:r>
-            <a:endParaRPr kumimoji="1" lang="ja-JP" altLang="en-US" sz="1400" dirty="0">
+            <a:endParaRPr lang="ja-JP" altLang="en-US" sz="1050" dirty="0">
               <a:solidFill>
                 <a:schemeClr val="tx1">
                   <a:lumMod val="50000"/>
@@ -4980,8 +5032,8 @@
         </p:nvSpPr>
         <p:spPr>
           <a:xfrm>
-            <a:off x="2853253" y="2817587"/>
-            <a:ext cx="830168" cy="563279"/>
+            <a:off x="2039402" y="3084794"/>
+            <a:ext cx="723164" cy="422459"/>
           </a:xfrm>
           <a:prstGeom prst="flowChartDocument">
             <a:avLst/>
@@ -5016,7 +5068,7 @@
           <a:p>
             <a:pPr algn="ctr"/>
             <a:r>
-              <a:rPr kumimoji="1" lang="en-US" altLang="ja-JP" sz="1400" dirty="0" smtClean="0">
+              <a:rPr lang="en-US" altLang="ja-JP" sz="1050" dirty="0">
                 <a:solidFill>
                   <a:schemeClr val="tx1">
                     <a:lumMod val="50000"/>
@@ -5026,7 +5078,7 @@
               </a:rPr>
               <a:t>Web.xml</a:t>
             </a:r>
-            <a:endParaRPr kumimoji="1" lang="ja-JP" altLang="en-US" sz="1400" dirty="0">
+            <a:endParaRPr lang="ja-JP" altLang="en-US" sz="1050" dirty="0">
               <a:solidFill>
                 <a:schemeClr val="tx1">
                   <a:lumMod val="50000"/>
@@ -5048,8 +5100,8 @@
         </p:nvCxnSpPr>
         <p:spPr>
           <a:xfrm rot="5400000" flipH="1" flipV="1">
-            <a:off x="3345607" y="5709994"/>
-            <a:ext cx="661876" cy="467863"/>
+            <a:off x="2480330" y="5379083"/>
+            <a:ext cx="554161" cy="350898"/>
           </a:xfrm>
           <a:prstGeom prst="bentConnector2">
             <a:avLst/>
@@ -5090,8 +5142,8 @@
         </p:nvCxnSpPr>
         <p:spPr>
           <a:xfrm flipV="1">
-            <a:off x="7219128" y="3388304"/>
-            <a:ext cx="511834" cy="2224541"/>
+            <a:off x="5510005" y="3512831"/>
+            <a:ext cx="288217" cy="1764619"/>
           </a:xfrm>
           <a:prstGeom prst="bentConnector2">
             <a:avLst/>
@@ -5131,8 +5183,8 @@
         </p:nvSpPr>
         <p:spPr>
           <a:xfrm>
-            <a:off x="7346673" y="6603737"/>
-            <a:ext cx="830168" cy="563279"/>
+            <a:off x="5510005" y="5924405"/>
+            <a:ext cx="622626" cy="422459"/>
           </a:xfrm>
           <a:prstGeom prst="flowChartDocument">
             <a:avLst/>
@@ -5167,7 +5219,7 @@
           <a:p>
             <a:pPr algn="ctr"/>
             <a:r>
-              <a:rPr lang="en-US" altLang="ja-JP" sz="1400" dirty="0" smtClean="0">
+              <a:rPr lang="en-US" altLang="ja-JP" sz="1050" dirty="0">
                 <a:solidFill>
                   <a:schemeClr val="tx1">
                     <a:lumMod val="50000"/>
@@ -5181,7 +5233,7 @@
           <a:p>
             <a:pPr algn="ctr"/>
             <a:r>
-              <a:rPr lang="en-US" altLang="ja-JP" sz="1400" dirty="0" smtClean="0">
+              <a:rPr lang="en-US" altLang="ja-JP" sz="1050" dirty="0">
                 <a:solidFill>
                   <a:schemeClr val="tx1">
                     <a:lumMod val="50000"/>
@@ -5191,7 +5243,7 @@
               </a:rPr>
               <a:t>File</a:t>
             </a:r>
-            <a:endParaRPr kumimoji="1" lang="ja-JP" altLang="en-US" sz="1400" dirty="0">
+            <a:endParaRPr lang="ja-JP" altLang="en-US" sz="1050" dirty="0">
               <a:solidFill>
                 <a:schemeClr val="tx1">
                   <a:lumMod val="50000"/>
@@ -5210,8 +5262,8 @@
         </p:nvSpPr>
         <p:spPr>
           <a:xfrm>
-            <a:off x="6835489" y="7348242"/>
-            <a:ext cx="1965779" cy="646331"/>
+            <a:off x="5126617" y="6451034"/>
+            <a:ext cx="1474334" cy="507831"/>
           </a:xfrm>
           <a:prstGeom prst="rect">
             <a:avLst/>
@@ -5226,29 +5278,17 @@
           <a:p>
             <a:pPr algn="ctr"/>
             <a:r>
-              <a:rPr lang="en-US" altLang="ja-JP" dirty="0" smtClean="0"/>
-              <a:t>Upload</a:t>
-            </a:r>
-            <a:r>
-              <a:rPr lang="en-US" altLang="ja-JP" dirty="0"/>
-              <a:t> </a:t>
-            </a:r>
-            <a:r>
-              <a:rPr lang="en-US" altLang="ja-JP" dirty="0" smtClean="0"/>
-              <a:t>directory</a:t>
+              <a:rPr lang="en-US" altLang="ja-JP" sz="1350" dirty="0"/>
+              <a:t>Upload directory</a:t>
             </a:r>
           </a:p>
           <a:p>
             <a:pPr algn="ctr"/>
             <a:r>
-              <a:rPr lang="en-US" altLang="ja-JP" dirty="0"/>
-              <a:t>f</a:t>
-            </a:r>
-            <a:r>
-              <a:rPr lang="en-US" altLang="ja-JP" dirty="0" smtClean="0"/>
-              <a:t>or application</a:t>
-            </a:r>
-            <a:endParaRPr kumimoji="1" lang="ja-JP" altLang="en-US" dirty="0"/>
+              <a:rPr lang="en-US" altLang="ja-JP" sz="1350" dirty="0"/>
+              <a:t>for application</a:t>
+            </a:r>
+            <a:endParaRPr lang="ja-JP" altLang="en-US" sz="1350" dirty="0"/>
           </a:p>
         </p:txBody>
       </p:sp>
@@ -5260,8 +5300,8 @@
         </p:nvSpPr>
         <p:spPr>
           <a:xfrm>
-            <a:off x="6167475" y="5242735"/>
-            <a:ext cx="1051653" cy="740219"/>
+            <a:off x="4625607" y="4999868"/>
+            <a:ext cx="884398" cy="555164"/>
           </a:xfrm>
           <a:prstGeom prst="roundRect">
             <a:avLst/>
@@ -5287,14 +5327,14 @@
           <a:p>
             <a:pPr algn="ctr"/>
             <a:r>
-              <a:rPr kumimoji="1" lang="en-US" altLang="ja-JP" sz="1600" dirty="0" smtClean="0"/>
+              <a:rPr lang="en-US" altLang="ja-JP" sz="1200" dirty="0"/>
               <a:t>&lt;servlet&gt;</a:t>
             </a:r>
           </a:p>
           <a:p>
             <a:pPr algn="ctr"/>
             <a:r>
-              <a:rPr kumimoji="1" lang="en-US" altLang="ja-JP" dirty="0" smtClean="0"/>
+              <a:rPr lang="en-US" altLang="ja-JP" sz="1350" dirty="0"/>
               <a:t>Part</a:t>
             </a:r>
           </a:p>
@@ -5311,8 +5351,8 @@
         </p:nvCxnSpPr>
         <p:spPr>
           <a:xfrm flipV="1">
-            <a:off x="5275216" y="5612845"/>
-            <a:ext cx="892259" cy="142"/>
+            <a:off x="3956413" y="5277450"/>
+            <a:ext cx="669194" cy="1"/>
           </a:xfrm>
           <a:prstGeom prst="bentConnector3">
             <a:avLst>
@@ -5355,8 +5395,8 @@
         </p:nvCxnSpPr>
         <p:spPr>
           <a:xfrm>
-            <a:off x="5637981" y="4459920"/>
-            <a:ext cx="1055321" cy="782815"/>
+            <a:off x="4228486" y="4123973"/>
+            <a:ext cx="839320" cy="875895"/>
           </a:xfrm>
           <a:prstGeom prst="bentConnector2">
             <a:avLst/>
@@ -5394,8 +5434,8 @@
         </p:nvSpPr>
         <p:spPr>
           <a:xfrm>
-            <a:off x="1375477" y="1376907"/>
-            <a:ext cx="734693" cy="536091"/>
+            <a:off x="1031608" y="2004283"/>
+            <a:ext cx="551020" cy="402068"/>
           </a:xfrm>
           <a:prstGeom prst="rect">
             <a:avLst/>
@@ -5426,14 +5466,14 @@
           <a:lstStyle/>
           <a:p>
             <a:r>
-              <a:rPr kumimoji="1" lang="en-US" altLang="ja-JP" sz="2400" dirty="0" smtClean="0">
+              <a:rPr lang="en-US" altLang="ja-JP" dirty="0">
                 <a:solidFill>
                   <a:schemeClr val="tx1"/>
                 </a:solidFill>
               </a:rPr>
               <a:t>(1)</a:t>
             </a:r>
-            <a:endParaRPr kumimoji="1" lang="ja-JP" altLang="en-US" sz="2400" dirty="0">
+            <a:endParaRPr lang="ja-JP" altLang="en-US" dirty="0">
               <a:solidFill>
                 <a:schemeClr val="tx1"/>
               </a:solidFill>
@@ -5449,8 +5489,8 @@
         </p:nvSpPr>
         <p:spPr>
           <a:xfrm>
-            <a:off x="1375477" y="3230796"/>
-            <a:ext cx="734693" cy="536091"/>
+            <a:off x="1031608" y="3430933"/>
+            <a:ext cx="551020" cy="402068"/>
           </a:xfrm>
           <a:prstGeom prst="rect">
             <a:avLst/>
@@ -5481,14 +5521,14 @@
           <a:lstStyle/>
           <a:p>
             <a:r>
-              <a:rPr kumimoji="1" lang="en-US" altLang="ja-JP" sz="2400" dirty="0" smtClean="0">
+              <a:rPr lang="en-US" altLang="ja-JP" dirty="0">
                 <a:solidFill>
                   <a:schemeClr val="tx1"/>
                 </a:solidFill>
               </a:rPr>
               <a:t>(2)</a:t>
             </a:r>
-            <a:endParaRPr kumimoji="1" lang="ja-JP" altLang="en-US" sz="2400" dirty="0">
+            <a:endParaRPr lang="ja-JP" altLang="en-US" dirty="0">
               <a:solidFill>
                 <a:schemeClr val="tx1"/>
               </a:solidFill>
@@ -5504,8 +5544,8 @@
         </p:nvSpPr>
         <p:spPr>
           <a:xfrm>
-            <a:off x="2707921" y="3960100"/>
-            <a:ext cx="734693" cy="536091"/>
+            <a:off x="1034888" y="4489622"/>
+            <a:ext cx="551020" cy="274618"/>
           </a:xfrm>
           <a:prstGeom prst="rect">
             <a:avLst/>
@@ -5536,14 +5576,14 @@
           <a:lstStyle/>
           <a:p>
             <a:r>
-              <a:rPr kumimoji="1" lang="en-US" altLang="ja-JP" sz="2400" dirty="0" smtClean="0">
+              <a:rPr lang="en-US" altLang="ja-JP" dirty="0">
                 <a:solidFill>
                   <a:schemeClr val="tx1"/>
                 </a:solidFill>
               </a:rPr>
-              <a:t>(3)</a:t>
-            </a:r>
-            <a:endParaRPr kumimoji="1" lang="ja-JP" altLang="en-US" sz="2400" dirty="0">
+              <a:t>(4)</a:t>
+            </a:r>
+            <a:endParaRPr lang="ja-JP" altLang="en-US" dirty="0">
               <a:solidFill>
                 <a:schemeClr val="tx1"/>
               </a:solidFill>
@@ -5559,8 +5599,8 @@
         </p:nvSpPr>
         <p:spPr>
           <a:xfrm>
-            <a:off x="1375477" y="5018674"/>
-            <a:ext cx="734693" cy="536091"/>
+            <a:off x="1031608" y="5686353"/>
+            <a:ext cx="551020" cy="402068"/>
           </a:xfrm>
           <a:prstGeom prst="rect">
             <a:avLst/>
@@ -5591,14 +5631,14 @@
           <a:lstStyle/>
           <a:p>
             <a:r>
-              <a:rPr kumimoji="1" lang="en-US" altLang="ja-JP" sz="2400" dirty="0" smtClean="0">
+              <a:rPr lang="en-US" altLang="ja-JP" dirty="0" smtClean="0">
                 <a:solidFill>
                   <a:schemeClr val="tx1"/>
                 </a:solidFill>
               </a:rPr>
-              <a:t>(4)</a:t>
-            </a:r>
-            <a:endParaRPr kumimoji="1" lang="ja-JP" altLang="en-US" sz="2400" dirty="0">
+              <a:t>(5)</a:t>
+            </a:r>
+            <a:endParaRPr lang="ja-JP" altLang="en-US" dirty="0">
               <a:solidFill>
                 <a:schemeClr val="tx1"/>
               </a:solidFill>
@@ -5614,8 +5654,8 @@
         </p:nvSpPr>
         <p:spPr>
           <a:xfrm>
-            <a:off x="2941852" y="5849620"/>
-            <a:ext cx="734693" cy="536091"/>
+            <a:off x="2206390" y="5458819"/>
+            <a:ext cx="551020" cy="402068"/>
           </a:xfrm>
           <a:prstGeom prst="rect">
             <a:avLst/>
@@ -5646,14 +5686,14 @@
           <a:lstStyle/>
           <a:p>
             <a:r>
-              <a:rPr kumimoji="1" lang="en-US" altLang="ja-JP" sz="2400" dirty="0" smtClean="0">
+              <a:rPr lang="en-US" altLang="ja-JP" dirty="0" smtClean="0">
                 <a:solidFill>
                   <a:schemeClr val="tx1"/>
                 </a:solidFill>
               </a:rPr>
-              <a:t>(5)</a:t>
-            </a:r>
-            <a:endParaRPr kumimoji="1" lang="ja-JP" altLang="en-US" sz="2400" dirty="0">
+              <a:t>(6)</a:t>
+            </a:r>
+            <a:endParaRPr lang="ja-JP" altLang="en-US" dirty="0">
               <a:solidFill>
                 <a:schemeClr val="tx1"/>
               </a:solidFill>
@@ -5669,8 +5709,8 @@
         </p:nvSpPr>
         <p:spPr>
           <a:xfrm>
-            <a:off x="5324968" y="5165876"/>
-            <a:ext cx="734693" cy="536091"/>
+            <a:off x="3993727" y="4846010"/>
+            <a:ext cx="551020" cy="402068"/>
           </a:xfrm>
           <a:prstGeom prst="rect">
             <a:avLst/>
@@ -5701,14 +5741,14 @@
           <a:lstStyle/>
           <a:p>
             <a:r>
-              <a:rPr kumimoji="1" lang="en-US" altLang="ja-JP" sz="2400" dirty="0" smtClean="0">
+              <a:rPr lang="en-US" altLang="ja-JP" dirty="0" smtClean="0">
                 <a:solidFill>
                   <a:schemeClr val="tx1"/>
                 </a:solidFill>
               </a:rPr>
-              <a:t>(6)</a:t>
-            </a:r>
-            <a:endParaRPr kumimoji="1" lang="ja-JP" altLang="en-US" sz="2400" dirty="0">
+              <a:t>(7)</a:t>
+            </a:r>
+            <a:endParaRPr lang="ja-JP" altLang="en-US" dirty="0">
               <a:solidFill>
                 <a:schemeClr val="tx1"/>
               </a:solidFill>
@@ -5724,8 +5764,8 @@
         </p:nvSpPr>
         <p:spPr>
           <a:xfrm>
-            <a:off x="2900990" y="6913485"/>
-            <a:ext cx="734693" cy="536091"/>
+            <a:off x="2175743" y="6278828"/>
+            <a:ext cx="551020" cy="402068"/>
           </a:xfrm>
           <a:prstGeom prst="rect">
             <a:avLst/>
@@ -5756,14 +5796,14 @@
           <a:lstStyle/>
           <a:p>
             <a:r>
-              <a:rPr kumimoji="1" lang="en-US" altLang="ja-JP" sz="2400" dirty="0" smtClean="0">
+              <a:rPr lang="en-US" altLang="ja-JP" dirty="0" smtClean="0">
                 <a:solidFill>
                   <a:schemeClr val="tx1"/>
                 </a:solidFill>
               </a:rPr>
-              <a:t>(7)</a:t>
-            </a:r>
-            <a:endParaRPr kumimoji="1" lang="ja-JP" altLang="en-US" sz="2400" dirty="0">
+              <a:t>(8)</a:t>
+            </a:r>
+            <a:endParaRPr lang="ja-JP" altLang="en-US" dirty="0">
               <a:solidFill>
                 <a:schemeClr val="tx1"/>
               </a:solidFill>
@@ -5782,8 +5822,8 @@
         </p:nvCxnSpPr>
         <p:spPr>
           <a:xfrm rot="16200000" flipH="1">
-            <a:off x="3457098" y="6843515"/>
-            <a:ext cx="794206" cy="823175"/>
+            <a:off x="2685630" y="6165295"/>
+            <a:ext cx="410042" cy="617381"/>
           </a:xfrm>
           <a:prstGeom prst="bentConnector2">
             <a:avLst/>
@@ -5815,14 +5855,14 @@
       </p:cxnSp>
       <p:sp>
         <p:nvSpPr>
-          <p:cNvPr id="314" name="正方形/長方形 313"/>
+          <p:cNvPr id="315" name="正方形/長方形 314"/>
           <p:cNvSpPr/>
           <p:nvPr/>
         </p:nvSpPr>
         <p:spPr>
           <a:xfrm>
-            <a:off x="2717907" y="4489937"/>
-            <a:ext cx="734693" cy="536091"/>
+            <a:off x="4251766" y="4163814"/>
+            <a:ext cx="585462" cy="402068"/>
           </a:xfrm>
           <a:prstGeom prst="rect">
             <a:avLst/>
@@ -5853,69 +5893,22 @@
           <a:lstStyle/>
           <a:p>
             <a:r>
-              <a:rPr kumimoji="1" lang="en-US" altLang="ja-JP" sz="2400" dirty="0" smtClean="0">
+              <a:rPr lang="en-US" altLang="ja-JP" dirty="0">
                 <a:solidFill>
                   <a:schemeClr val="tx1"/>
                 </a:solidFill>
               </a:rPr>
-              <a:t>(9)</a:t>
-            </a:r>
-            <a:endParaRPr kumimoji="1" lang="ja-JP" altLang="en-US" sz="2400" dirty="0">
-              <a:solidFill>
-                <a:schemeClr val="tx1"/>
-              </a:solidFill>
-            </a:endParaRPr>
-          </a:p>
-        </p:txBody>
-      </p:sp>
-      <p:sp>
-        <p:nvSpPr>
-          <p:cNvPr id="315" name="正方形/長方形 314"/>
-          <p:cNvSpPr/>
-          <p:nvPr/>
-        </p:nvSpPr>
-        <p:spPr>
-          <a:xfrm>
-            <a:off x="5683963" y="4461636"/>
-            <a:ext cx="734693" cy="536091"/>
-          </a:xfrm>
-          <a:prstGeom prst="rect">
-            <a:avLst/>
-          </a:prstGeom>
-          <a:noFill/>
-          <a:ln>
-            <a:noFill/>
-          </a:ln>
-        </p:spPr>
-        <p:style>
-          <a:lnRef idx="2">
-            <a:schemeClr val="accent1">
-              <a:shade val="50000"/>
-            </a:schemeClr>
-          </a:lnRef>
-          <a:fillRef idx="1">
-            <a:schemeClr val="accent1"/>
-          </a:fillRef>
-          <a:effectRef idx="0">
-            <a:schemeClr val="accent1"/>
-          </a:effectRef>
-          <a:fontRef idx="minor">
-            <a:schemeClr val="lt1"/>
-          </a:fontRef>
-        </p:style>
-        <p:txBody>
-          <a:bodyPr rtlCol="0" anchor="t"/>
-          <a:lstStyle/>
-          <a:p>
-            <a:r>
-              <a:rPr kumimoji="1" lang="en-US" altLang="ja-JP" sz="2400" dirty="0" smtClean="0">
+              <a:t>(</a:t>
+            </a:r>
+            <a:r>
+              <a:rPr lang="en-US" altLang="ja-JP" dirty="0" smtClean="0">
                 <a:solidFill>
                   <a:schemeClr val="tx1"/>
                 </a:solidFill>
               </a:rPr>
-              <a:t>(10)</a:t>
-            </a:r>
-            <a:endParaRPr kumimoji="1" lang="ja-JP" altLang="en-US" sz="2400" dirty="0">
+              <a:t>11)</a:t>
+            </a:r>
+            <a:endParaRPr lang="ja-JP" altLang="en-US" dirty="0">
               <a:solidFill>
                 <a:schemeClr val="tx1"/>
               </a:solidFill>
@@ -5932,7 +5925,7 @@
           <p:nvPr/>
         </p:nvPicPr>
         <p:blipFill>
-          <a:blip r:embed="rId3">
+          <a:blip r:embed="rId4">
             <a:extLst>
               <a:ext uri="{28A0092B-C50C-407E-A947-70E740481C1C}">
                 <a14:useLocalDpi xmlns:a14="http://schemas.microsoft.com/office/drawing/2010/main" val="0"/>
@@ -5946,8 +5939,8 @@
         </p:blipFill>
         <p:spPr bwMode="auto">
           <a:xfrm>
-            <a:off x="1129514" y="395741"/>
-            <a:ext cx="1546383" cy="611361"/>
+            <a:off x="847136" y="1268408"/>
+            <a:ext cx="1159787" cy="458521"/>
           </a:xfrm>
           <a:prstGeom prst="rect">
             <a:avLst/>
@@ -5985,8 +5978,8 @@
         </p:nvSpPr>
         <p:spPr>
           <a:xfrm>
-            <a:off x="4265789" y="7360638"/>
-            <a:ext cx="1233160" cy="583136"/>
+            <a:off x="3199342" y="6460331"/>
+            <a:ext cx="924870" cy="437352"/>
           </a:xfrm>
           <a:prstGeom prst="roundRect">
             <a:avLst/>
@@ -6012,10 +6005,10 @@
           <a:p>
             <a:pPr algn="ctr"/>
             <a:r>
-              <a:rPr lang="en-US" altLang="ja-JP" sz="1600" b="1" dirty="0" smtClean="0"/>
+              <a:rPr lang="en-US" altLang="ja-JP" sz="1200" b="1" dirty="0"/>
               <a:t>Service</a:t>
             </a:r>
-            <a:endParaRPr lang="ja-JP" altLang="en-US" sz="1600" b="1" dirty="0"/>
+            <a:endParaRPr lang="ja-JP" altLang="en-US" sz="1200" b="1" dirty="0"/>
           </a:p>
         </p:txBody>
       </p:sp>
@@ -6029,8 +6022,8 @@
         </p:nvSpPr>
         <p:spPr bwMode="auto">
           <a:xfrm>
-            <a:off x="7173551" y="8153477"/>
-            <a:ext cx="1176412" cy="874407"/>
+            <a:off x="5380163" y="7054960"/>
+            <a:ext cx="882309" cy="655805"/>
           </a:xfrm>
           <a:prstGeom prst="flowChartMagneticDisk">
             <a:avLst/>
@@ -6055,38 +6048,26 @@
           </a:fontRef>
         </p:style>
         <p:txBody>
-          <a:bodyPr vert="horz" wrap="square" lIns="74295" tIns="8890" rIns="74295" bIns="8890" numCol="1" anchor="t" anchorCtr="0" compatLnSpc="1">
+          <a:bodyPr vert="horz" wrap="square" lIns="55721" tIns="6668" rIns="55721" bIns="6668" numCol="1" anchor="t" anchorCtr="0" compatLnSpc="1">
             <a:prstTxWarp prst="textNoShape">
               <a:avLst/>
             </a:prstTxWarp>
           </a:bodyPr>
           <a:lstStyle/>
           <a:p>
-            <a:pPr marL="0" marR="0" lvl="0" indent="0" algn="ctr" defTabSz="914400" rtl="0" eaLnBrk="1" fontAlgn="base" latinLnBrk="0" hangingPunct="1">
-              <a:lnSpc>
-                <a:spcPct val="100000"/>
-              </a:lnSpc>
+            <a:pPr algn="ctr" defTabSz="685784" fontAlgn="base">
               <a:spcBef>
                 <a:spcPct val="0"/>
               </a:spcBef>
               <a:spcAft>
                 <a:spcPct val="0"/>
               </a:spcAft>
-              <a:buClrTx/>
-              <a:buSzTx/>
-              <a:buFontTx/>
-              <a:buNone/>
-              <a:tabLst/>
             </a:pPr>
             <a:r>
-              <a:rPr kumimoji="1" lang="en-US" altLang="ja-JP" sz="1800" b="0" i="0" u="none" strike="noStrike" cap="none" normalizeH="0" baseline="0" dirty="0" smtClean="0">
-                <a:ln>
-                  <a:noFill/>
-                </a:ln>
+              <a:rPr lang="en-US" altLang="ja-JP" sz="1350" dirty="0">
                 <a:solidFill>
                   <a:schemeClr val="bg1"/>
                 </a:solidFill>
-                <a:effectLst/>
                 <a:latin typeface="Arial" pitchFamily="34" charset="0"/>
                 <a:ea typeface="ＭＳ Ｐゴシック" pitchFamily="50" charset="-128"/>
                 <a:cs typeface="ＭＳ Ｐゴシック" pitchFamily="50" charset="-128"/>
@@ -6106,8 +6087,8 @@
         </p:nvCxnSpPr>
         <p:spPr>
           <a:xfrm>
-            <a:off x="5498949" y="7652206"/>
-            <a:ext cx="1003451" cy="0"/>
+            <a:off x="4124212" y="6679007"/>
+            <a:ext cx="752588" cy="0"/>
           </a:xfrm>
           <a:prstGeom prst="straightConnector1">
             <a:avLst/>
@@ -6145,8 +6126,8 @@
         </p:nvSpPr>
         <p:spPr>
           <a:xfrm>
-            <a:off x="5541509" y="7167016"/>
-            <a:ext cx="734693" cy="536091"/>
+            <a:off x="4156132" y="6315114"/>
+            <a:ext cx="585462" cy="402068"/>
           </a:xfrm>
           <a:prstGeom prst="rect">
             <a:avLst/>
@@ -6177,14 +6158,14 @@
           <a:lstStyle/>
           <a:p>
             <a:r>
-              <a:rPr kumimoji="1" lang="en-US" altLang="ja-JP" sz="2400" dirty="0" smtClean="0">
+              <a:rPr lang="en-US" altLang="ja-JP" dirty="0" smtClean="0">
                 <a:solidFill>
                   <a:schemeClr val="tx1"/>
                 </a:solidFill>
               </a:rPr>
-              <a:t>(8)</a:t>
-            </a:r>
-            <a:endParaRPr kumimoji="1" lang="ja-JP" altLang="en-US" sz="2400" dirty="0">
+              <a:t>(9)</a:t>
+            </a:r>
+            <a:endParaRPr lang="ja-JP" altLang="en-US" dirty="0">
               <a:solidFill>
                 <a:schemeClr val="tx1"/>
               </a:solidFill>
@@ -6200,8 +6181,8 @@
         </p:nvSpPr>
         <p:spPr>
           <a:xfrm>
-            <a:off x="6625287" y="6325663"/>
-            <a:ext cx="408479" cy="2629651"/>
+            <a:off x="4968967" y="5715851"/>
+            <a:ext cx="306359" cy="1972238"/>
           </a:xfrm>
           <a:prstGeom prst="leftBrace">
             <a:avLst/>
@@ -6235,7 +6216,285 @@
           <a:lstStyle/>
           <a:p>
             <a:pPr algn="ctr"/>
-            <a:endParaRPr kumimoji="1" lang="ja-JP" altLang="en-US"/>
+            <a:endParaRPr lang="ja-JP" altLang="en-US" sz="1350"/>
+          </a:p>
+        </p:txBody>
+      </p:sp>
+      <p:sp>
+        <p:nvSpPr>
+          <p:cNvPr id="53" name="Rectangle 66"/>
+          <p:cNvSpPr>
+            <a:spLocks noChangeArrowheads="1"/>
+          </p:cNvSpPr>
+          <p:nvPr/>
+        </p:nvSpPr>
+        <p:spPr bwMode="auto">
+          <a:xfrm>
+            <a:off x="838826" y="3879273"/>
+            <a:ext cx="1184097" cy="489401"/>
+          </a:xfrm>
+          <a:prstGeom prst="rect">
+            <a:avLst/>
+          </a:prstGeom>
+          <a:gradFill>
+            <a:gsLst>
+              <a:gs pos="0">
+                <a:srgbClr val="81A042"/>
+              </a:gs>
+              <a:gs pos="100000">
+                <a:srgbClr val="BDD292"/>
+              </a:gs>
+            </a:gsLst>
+          </a:gradFill>
+          <a:ln w="25400">
+            <a:solidFill>
+              <a:schemeClr val="accent3">
+                <a:lumMod val="75000"/>
+              </a:schemeClr>
+            </a:solidFill>
+            <a:headEnd/>
+            <a:tailEnd/>
+          </a:ln>
+        </p:spPr>
+        <p:style>
+          <a:lnRef idx="1">
+            <a:schemeClr val="accent3"/>
+          </a:lnRef>
+          <a:fillRef idx="3">
+            <a:schemeClr val="accent3"/>
+          </a:fillRef>
+          <a:effectRef idx="2">
+            <a:schemeClr val="accent3"/>
+          </a:effectRef>
+          <a:fontRef idx="minor">
+            <a:schemeClr val="lt1"/>
+          </a:fontRef>
+        </p:style>
+        <p:txBody>
+          <a:bodyPr vert="horz" wrap="square" lIns="55721" tIns="6668" rIns="55721" bIns="6668" numCol="1" anchor="ctr" anchorCtr="1" compatLnSpc="1">
+            <a:prstTxWarp prst="textNoShape">
+              <a:avLst/>
+            </a:prstTxWarp>
+          </a:bodyPr>
+          <a:lstStyle/>
+          <a:p>
+            <a:pPr algn="ctr"/>
+            <a:r>
+              <a:rPr lang="en-US" altLang="ja-JP" sz="750" b="1" dirty="0"/>
+              <a:t>&lt;Spring Web&gt;</a:t>
+            </a:r>
+          </a:p>
+          <a:p>
+            <a:pPr algn="ctr"/>
+            <a:r>
+              <a:rPr lang="en-US" altLang="ja-JP" sz="1350" dirty="0" err="1"/>
+              <a:t>MultipartFilter</a:t>
+            </a:r>
+            <a:endParaRPr lang="ja-JP" altLang="en-US" sz="1350" b="1" dirty="0"/>
+          </a:p>
+        </p:txBody>
+      </p:sp>
+      <p:cxnSp>
+        <p:nvCxnSpPr>
+          <p:cNvPr id="54" name="カギ線コネクタ 69"/>
+          <p:cNvCxnSpPr>
+            <a:stCxn id="62" idx="2"/>
+            <a:endCxn id="53" idx="0"/>
+          </p:cNvCxnSpPr>
+          <p:nvPr/>
+        </p:nvCxnSpPr>
+        <p:spPr>
+          <a:xfrm>
+            <a:off x="1430875" y="3384505"/>
+            <a:ext cx="0" cy="494768"/>
+          </a:xfrm>
+          <a:prstGeom prst="straightConnector1">
+            <a:avLst/>
+          </a:prstGeom>
+          <a:ln>
+            <a:solidFill>
+              <a:schemeClr val="tx1">
+                <a:lumMod val="65000"/>
+                <a:lumOff val="35000"/>
+              </a:schemeClr>
+            </a:solidFill>
+            <a:tailEnd type="arrow"/>
+          </a:ln>
+        </p:spPr>
+        <p:style>
+          <a:lnRef idx="2">
+            <a:schemeClr val="accent1"/>
+          </a:lnRef>
+          <a:fillRef idx="0">
+            <a:schemeClr val="accent1"/>
+          </a:fillRef>
+          <a:effectRef idx="1">
+            <a:schemeClr val="accent1"/>
+          </a:effectRef>
+          <a:fontRef idx="minor">
+            <a:schemeClr val="tx1"/>
+          </a:fontRef>
+        </p:style>
+      </p:cxnSp>
+      <p:cxnSp>
+        <p:nvCxnSpPr>
+          <p:cNvPr id="61" name="カギ線コネクタ 60"/>
+          <p:cNvCxnSpPr>
+            <a:stCxn id="53" idx="3"/>
+            <a:endCxn id="58" idx="1"/>
+          </p:cNvCxnSpPr>
+          <p:nvPr/>
+        </p:nvCxnSpPr>
+        <p:spPr>
+          <a:xfrm flipV="1">
+            <a:off x="2022923" y="4123973"/>
+            <a:ext cx="738680" cy="1"/>
+          </a:xfrm>
+          <a:prstGeom prst="bentConnector3">
+            <a:avLst>
+              <a:gd name="adj1" fmla="val 50000"/>
+            </a:avLst>
+          </a:prstGeom>
+          <a:ln>
+            <a:solidFill>
+              <a:schemeClr val="tx1">
+                <a:lumMod val="65000"/>
+                <a:lumOff val="35000"/>
+              </a:schemeClr>
+            </a:solidFill>
+            <a:tailEnd type="arrow"/>
+          </a:ln>
+        </p:spPr>
+        <p:style>
+          <a:lnRef idx="2">
+            <a:schemeClr val="accent1"/>
+          </a:lnRef>
+          <a:fillRef idx="0">
+            <a:schemeClr val="accent1"/>
+          </a:fillRef>
+          <a:effectRef idx="1">
+            <a:schemeClr val="accent1"/>
+          </a:effectRef>
+          <a:fontRef idx="minor">
+            <a:schemeClr val="tx1"/>
+          </a:fontRef>
+        </p:style>
+      </p:cxnSp>
+      <p:sp>
+        <p:nvSpPr>
+          <p:cNvPr id="64" name="正方形/長方形 63"/>
+          <p:cNvSpPr/>
+          <p:nvPr/>
+        </p:nvSpPr>
+        <p:spPr>
+          <a:xfrm>
+            <a:off x="2039402" y="3746301"/>
+            <a:ext cx="551020" cy="274618"/>
+          </a:xfrm>
+          <a:prstGeom prst="rect">
+            <a:avLst/>
+          </a:prstGeom>
+          <a:noFill/>
+          <a:ln>
+            <a:noFill/>
+          </a:ln>
+        </p:spPr>
+        <p:style>
+          <a:lnRef idx="2">
+            <a:schemeClr val="accent1">
+              <a:shade val="50000"/>
+            </a:schemeClr>
+          </a:lnRef>
+          <a:fillRef idx="1">
+            <a:schemeClr val="accent1"/>
+          </a:fillRef>
+          <a:effectRef idx="0">
+            <a:schemeClr val="accent1"/>
+          </a:effectRef>
+          <a:fontRef idx="minor">
+            <a:schemeClr val="lt1"/>
+          </a:fontRef>
+        </p:style>
+        <p:txBody>
+          <a:bodyPr rtlCol="0" anchor="t"/>
+          <a:lstStyle/>
+          <a:p>
+            <a:r>
+              <a:rPr lang="en-US" altLang="ja-JP" dirty="0">
+                <a:solidFill>
+                  <a:schemeClr val="tx1"/>
+                </a:solidFill>
+              </a:rPr>
+              <a:t>(3)</a:t>
+            </a:r>
+            <a:endParaRPr lang="ja-JP" altLang="en-US" dirty="0">
+              <a:solidFill>
+                <a:schemeClr val="tx1"/>
+              </a:solidFill>
+            </a:endParaRPr>
+          </a:p>
+        </p:txBody>
+      </p:sp>
+      <p:sp>
+        <p:nvSpPr>
+          <p:cNvPr id="66" name="正方形/長方形 65"/>
+          <p:cNvSpPr/>
+          <p:nvPr/>
+        </p:nvSpPr>
+        <p:spPr>
+          <a:xfrm>
+            <a:off x="2008884" y="4168474"/>
+            <a:ext cx="585462" cy="402068"/>
+          </a:xfrm>
+          <a:prstGeom prst="rect">
+            <a:avLst/>
+          </a:prstGeom>
+          <a:noFill/>
+          <a:ln>
+            <a:noFill/>
+          </a:ln>
+        </p:spPr>
+        <p:style>
+          <a:lnRef idx="2">
+            <a:schemeClr val="accent1">
+              <a:shade val="50000"/>
+            </a:schemeClr>
+          </a:lnRef>
+          <a:fillRef idx="1">
+            <a:schemeClr val="accent1"/>
+          </a:fillRef>
+          <a:effectRef idx="0">
+            <a:schemeClr val="accent1"/>
+          </a:effectRef>
+          <a:fontRef idx="minor">
+            <a:schemeClr val="lt1"/>
+          </a:fontRef>
+        </p:style>
+        <p:txBody>
+          <a:bodyPr rtlCol="0" anchor="t"/>
+          <a:lstStyle/>
+          <a:p>
+            <a:r>
+              <a:rPr lang="en-US" altLang="ja-JP" dirty="0">
+                <a:solidFill>
+                  <a:schemeClr val="tx1"/>
+                </a:solidFill>
+              </a:rPr>
+              <a:t>(</a:t>
+            </a:r>
+            <a:r>
+              <a:rPr lang="en-US" altLang="ja-JP" dirty="0" smtClean="0">
+                <a:solidFill>
+                  <a:schemeClr val="tx1"/>
+                </a:solidFill>
+              </a:rPr>
+              <a:t>10)</a:t>
+            </a:r>
+            <a:endParaRPr lang="ja-JP" altLang="en-US" dirty="0">
+              <a:solidFill>
+                <a:schemeClr val="tx1"/>
+              </a:solidFill>
+            </a:endParaRPr>
           </a:p>
         </p:txBody>
       </p:sp>
@@ -6293,8 +6552,8 @@
         </p:blipFill>
         <p:spPr bwMode="auto">
           <a:xfrm>
-            <a:off x="719913" y="-250284"/>
-            <a:ext cx="1965229" cy="2035823"/>
+            <a:off x="539935" y="1812538"/>
+            <a:ext cx="1473922" cy="1526867"/>
           </a:xfrm>
           <a:prstGeom prst="rect">
             <a:avLst/>
@@ -6319,8 +6578,8 @@
         </p:blipFill>
         <p:spPr bwMode="auto">
           <a:xfrm>
-            <a:off x="3390541" y="-227073"/>
-            <a:ext cx="1965229" cy="2035823"/>
+            <a:off x="2542906" y="1829946"/>
+            <a:ext cx="1473922" cy="1526867"/>
           </a:xfrm>
           <a:prstGeom prst="rect">
             <a:avLst/>
@@ -6345,8 +6604,8 @@
         </p:blipFill>
         <p:spPr bwMode="auto">
           <a:xfrm>
-            <a:off x="6365969" y="-250285"/>
-            <a:ext cx="1965229" cy="2035823"/>
+            <a:off x="4774477" y="1812537"/>
+            <a:ext cx="1473922" cy="1526867"/>
           </a:xfrm>
           <a:prstGeom prst="rect">
             <a:avLst/>
@@ -6362,8 +6621,8 @@
         </p:nvSpPr>
         <p:spPr>
           <a:xfrm>
-            <a:off x="2373303" y="2041401"/>
-            <a:ext cx="1118838" cy="583137"/>
+            <a:off x="1779977" y="3531302"/>
+            <a:ext cx="839129" cy="437353"/>
           </a:xfrm>
           <a:prstGeom prst="roundRect">
             <a:avLst/>
@@ -6389,10 +6648,10 @@
           <a:p>
             <a:pPr algn="ctr"/>
             <a:r>
-              <a:rPr lang="en-US" altLang="ja-JP" sz="1200" b="1" dirty="0" smtClean="0"/>
+              <a:rPr lang="en-US" altLang="ja-JP" sz="900" b="1" dirty="0"/>
               <a:t>Controller</a:t>
             </a:r>
-            <a:endParaRPr lang="ja-JP" altLang="en-US" sz="1200" b="1" dirty="0"/>
+            <a:endParaRPr lang="ja-JP" altLang="en-US" sz="900" b="1" dirty="0"/>
           </a:p>
         </p:txBody>
       </p:sp>
@@ -6406,8 +6665,8 @@
         </p:nvCxnSpPr>
         <p:spPr>
           <a:xfrm rot="16200000" flipH="1">
-            <a:off x="1584089" y="1543756"/>
-            <a:ext cx="975868" cy="602560"/>
+            <a:off x="1188067" y="3158067"/>
+            <a:ext cx="731901" cy="451920"/>
           </a:xfrm>
           <a:prstGeom prst="bentConnector2">
             <a:avLst/>
@@ -6447,8 +6706,8 @@
         </p:nvSpPr>
         <p:spPr bwMode="auto">
           <a:xfrm>
-            <a:off x="3390541" y="3833164"/>
-            <a:ext cx="2384728" cy="1988456"/>
+            <a:off x="2542907" y="4875123"/>
+            <a:ext cx="1788546" cy="1491342"/>
           </a:xfrm>
           <a:custGeom>
             <a:avLst/>
@@ -6611,7 +6870,7 @@
           </a:effectLst>
         </p:spPr>
         <p:txBody>
-          <a:bodyPr vert="horz" wrap="square" lIns="91440" tIns="45720" rIns="91440" bIns="45720" numCol="1" anchor="b" anchorCtr="0" compatLnSpc="1">
+          <a:bodyPr vert="horz" wrap="square" lIns="68580" tIns="34290" rIns="68580" bIns="34290" numCol="1" anchor="b" anchorCtr="0" compatLnSpc="1">
             <a:prstTxWarp prst="textNoShape">
               <a:avLst/>
             </a:prstTxWarp>
@@ -6620,18 +6879,10 @@
           <a:p>
             <a:pPr algn="ctr"/>
             <a:r>
-              <a:rPr lang="en-US" altLang="ja-JP" dirty="0" smtClean="0"/>
-              <a:t>Upload Temporary</a:t>
-            </a:r>
-            <a:r>
-              <a:rPr lang="en-US" altLang="ja-JP" dirty="0"/>
-              <a:t> </a:t>
-            </a:r>
-            <a:r>
-              <a:rPr lang="en-US" altLang="ja-JP" dirty="0" smtClean="0"/>
-              <a:t>directory</a:t>
-            </a:r>
-            <a:endParaRPr lang="ja-JP" altLang="en-US" dirty="0"/>
+              <a:rPr lang="en-US" altLang="ja-JP" sz="1350" dirty="0"/>
+              <a:t>Upload Temporary directory</a:t>
+            </a:r>
+            <a:endParaRPr lang="ja-JP" altLang="en-US" sz="1350" dirty="0"/>
           </a:p>
         </p:txBody>
       </p:sp>
@@ -6645,8 +6896,8 @@
         </p:nvSpPr>
         <p:spPr bwMode="auto">
           <a:xfrm>
-            <a:off x="6370883" y="3807549"/>
-            <a:ext cx="2413666" cy="1988456"/>
+            <a:off x="4778163" y="4855913"/>
+            <a:ext cx="1810250" cy="1491342"/>
           </a:xfrm>
           <a:custGeom>
             <a:avLst/>
@@ -6809,7 +7060,7 @@
           </a:effectLst>
         </p:spPr>
         <p:txBody>
-          <a:bodyPr vert="horz" wrap="square" lIns="91440" tIns="45720" rIns="91440" bIns="45720" numCol="1" anchor="b" anchorCtr="0" compatLnSpc="1">
+          <a:bodyPr vert="horz" wrap="square" lIns="68580" tIns="34290" rIns="68580" bIns="34290" numCol="1" anchor="b" anchorCtr="0" compatLnSpc="1">
             <a:prstTxWarp prst="textNoShape">
               <a:avLst/>
             </a:prstTxWarp>
@@ -6818,14 +7069,10 @@
           <a:p>
             <a:pPr algn="ctr"/>
             <a:r>
-              <a:rPr lang="en-US" altLang="ja-JP" dirty="0" smtClean="0"/>
-              <a:t>Upload </a:t>
-            </a:r>
-            <a:r>
-              <a:rPr lang="en-US" altLang="ja-JP" dirty="0"/>
-              <a:t>directory</a:t>
-            </a:r>
-            <a:endParaRPr lang="ja-JP" altLang="en-US" dirty="0"/>
+              <a:rPr lang="en-US" altLang="ja-JP" sz="1350" dirty="0"/>
+              <a:t>Upload directory</a:t>
+            </a:r>
+            <a:endParaRPr lang="ja-JP" altLang="en-US" sz="1350" dirty="0"/>
           </a:p>
         </p:txBody>
       </p:sp>
@@ -6837,8 +7084,8 @@
         </p:nvSpPr>
         <p:spPr>
           <a:xfrm>
-            <a:off x="4081919" y="4257703"/>
-            <a:ext cx="986972" cy="747486"/>
+            <a:off x="3061440" y="5193527"/>
+            <a:ext cx="740229" cy="560615"/>
           </a:xfrm>
           <a:prstGeom prst="flowChartDocument">
             <a:avLst/>
@@ -6873,7 +7120,7 @@
           <a:p>
             <a:pPr algn="ctr"/>
             <a:r>
-              <a:rPr kumimoji="1" lang="en-US" altLang="ja-JP" sz="1400" dirty="0" smtClean="0">
+              <a:rPr lang="en-US" altLang="ja-JP" sz="1050" dirty="0">
                 <a:solidFill>
                   <a:schemeClr val="tx1">
                     <a:lumMod val="50000"/>
@@ -6887,7 +7134,7 @@
           <a:p>
             <a:pPr algn="ctr"/>
             <a:r>
-              <a:rPr lang="en-US" altLang="ja-JP" sz="1400" dirty="0" smtClean="0">
+              <a:rPr lang="en-US" altLang="ja-JP" sz="1050" dirty="0">
                 <a:solidFill>
                   <a:schemeClr val="tx1">
                     <a:lumMod val="50000"/>
@@ -6897,7 +7144,7 @@
               </a:rPr>
               <a:t>File</a:t>
             </a:r>
-            <a:endParaRPr kumimoji="1" lang="ja-JP" altLang="en-US" sz="1400" dirty="0">
+            <a:endParaRPr lang="ja-JP" altLang="en-US" sz="1050" dirty="0">
               <a:solidFill>
                 <a:schemeClr val="tx1">
                   <a:lumMod val="50000"/>
@@ -6916,8 +7163,8 @@
         </p:nvSpPr>
         <p:spPr>
           <a:xfrm>
-            <a:off x="6788832" y="4257703"/>
-            <a:ext cx="986972" cy="747486"/>
+            <a:off x="5091625" y="5193527"/>
+            <a:ext cx="740229" cy="560615"/>
           </a:xfrm>
           <a:prstGeom prst="flowChartDocument">
             <a:avLst/>
@@ -6951,7 +7198,7 @@
           <a:p>
             <a:pPr algn="ctr"/>
             <a:r>
-              <a:rPr kumimoji="1" lang="en-US" altLang="ja-JP" sz="1400" dirty="0" smtClean="0">
+              <a:rPr lang="en-US" altLang="ja-JP" sz="1050" dirty="0">
                 <a:solidFill>
                   <a:schemeClr val="tx1"/>
                 </a:solidFill>
@@ -6962,14 +7209,14 @@
           <a:p>
             <a:pPr algn="ctr"/>
             <a:r>
-              <a:rPr lang="en-US" altLang="ja-JP" sz="1400" dirty="0" smtClean="0">
+              <a:rPr lang="en-US" altLang="ja-JP" sz="1050" dirty="0">
                 <a:solidFill>
                   <a:schemeClr val="tx1"/>
                 </a:solidFill>
               </a:rPr>
               <a:t>File</a:t>
             </a:r>
-            <a:endParaRPr kumimoji="1" lang="ja-JP" altLang="en-US" sz="1400" dirty="0">
+            <a:endParaRPr lang="ja-JP" altLang="en-US" sz="1050" dirty="0">
               <a:solidFill>
                 <a:schemeClr val="tx1"/>
               </a:solidFill>
@@ -6985,8 +7232,8 @@
         </p:nvSpPr>
         <p:spPr>
           <a:xfrm>
-            <a:off x="5247132" y="2005116"/>
-            <a:ext cx="1118838" cy="583137"/>
+            <a:off x="3935349" y="3504088"/>
+            <a:ext cx="839129" cy="437353"/>
           </a:xfrm>
           <a:prstGeom prst="roundRect">
             <a:avLst/>
@@ -7012,10 +7259,10 @@
           <a:p>
             <a:pPr algn="ctr"/>
             <a:r>
-              <a:rPr lang="en-US" altLang="ja-JP" sz="1200" b="1" dirty="0" smtClean="0"/>
+              <a:rPr lang="en-US" altLang="ja-JP" sz="900" b="1" dirty="0"/>
               <a:t>Controller</a:t>
             </a:r>
-            <a:endParaRPr lang="ja-JP" altLang="en-US" sz="1200" b="1" dirty="0"/>
+            <a:endParaRPr lang="ja-JP" altLang="en-US" sz="900" b="1" dirty="0"/>
           </a:p>
         </p:txBody>
       </p:sp>
@@ -7030,8 +7277,8 @@
         </p:nvCxnSpPr>
         <p:spPr>
           <a:xfrm rot="16200000" flipH="1">
-            <a:off x="2503866" y="3053393"/>
-            <a:ext cx="2006908" cy="1149197"/>
+            <a:off x="1877900" y="4290296"/>
+            <a:ext cx="1505181" cy="861898"/>
           </a:xfrm>
           <a:prstGeom prst="bentConnector2">
             <a:avLst/>
@@ -7069,8 +7316,8 @@
         </p:nvCxnSpPr>
         <p:spPr>
           <a:xfrm rot="5400000" flipH="1" flipV="1">
-            <a:off x="2693252" y="1091567"/>
-            <a:ext cx="1189305" cy="710364"/>
+            <a:off x="2025711" y="2824697"/>
+            <a:ext cx="880437" cy="532774"/>
           </a:xfrm>
           <a:prstGeom prst="bentConnector2">
             <a:avLst/>
@@ -7110,8 +7357,8 @@
         </p:nvCxnSpPr>
         <p:spPr>
           <a:xfrm rot="16200000" flipH="1">
-            <a:off x="4340516" y="1390068"/>
-            <a:ext cx="971695" cy="841537"/>
+            <a:off x="3255388" y="3042802"/>
+            <a:ext cx="728771" cy="631153"/>
           </a:xfrm>
           <a:prstGeom prst="bentConnector2">
             <a:avLst/>
@@ -7152,8 +7399,8 @@
         </p:nvCxnSpPr>
         <p:spPr>
           <a:xfrm rot="5400000" flipH="1" flipV="1">
-            <a:off x="5628766" y="1029881"/>
-            <a:ext cx="1153020" cy="797450"/>
+            <a:off x="4227346" y="2778434"/>
+            <a:ext cx="853223" cy="598087"/>
           </a:xfrm>
           <a:prstGeom prst="bentConnector2">
             <a:avLst/>
@@ -7191,8 +7438,8 @@
         </p:nvSpPr>
         <p:spPr>
           <a:xfrm>
-            <a:off x="1238070" y="482188"/>
-            <a:ext cx="914400" cy="646331"/>
+            <a:off x="928553" y="2361892"/>
+            <a:ext cx="685800" cy="507831"/>
           </a:xfrm>
           <a:prstGeom prst="rect">
             <a:avLst/>
@@ -7207,17 +7454,17 @@
           <a:p>
             <a:pPr algn="ctr"/>
             <a:r>
-              <a:rPr kumimoji="1" lang="en-US" altLang="ja-JP" dirty="0" smtClean="0"/>
+              <a:rPr lang="en-US" altLang="ja-JP" sz="1350" dirty="0"/>
               <a:t>Input</a:t>
             </a:r>
           </a:p>
           <a:p>
             <a:pPr algn="ctr"/>
             <a:r>
-              <a:rPr lang="en-US" altLang="ja-JP" dirty="0" smtClean="0"/>
+              <a:rPr lang="en-US" altLang="ja-JP" sz="1350" dirty="0"/>
               <a:t>Screen</a:t>
             </a:r>
-            <a:endParaRPr kumimoji="1" lang="ja-JP" altLang="en-US" dirty="0"/>
+            <a:endParaRPr lang="ja-JP" altLang="en-US" sz="1350" dirty="0"/>
           </a:p>
         </p:txBody>
       </p:sp>
@@ -7229,8 +7476,8 @@
         </p:nvSpPr>
         <p:spPr>
           <a:xfrm>
-            <a:off x="1350246" y="1598373"/>
-            <a:ext cx="833953" cy="493323"/>
+            <a:off x="1012685" y="3199030"/>
+            <a:ext cx="625465" cy="369992"/>
           </a:xfrm>
           <a:prstGeom prst="flowChartDocument">
             <a:avLst/>
@@ -7264,7 +7511,7 @@
           <a:p>
             <a:pPr algn="ctr"/>
             <a:r>
-              <a:rPr kumimoji="1" lang="en-US" altLang="ja-JP" sz="1400" dirty="0" smtClean="0">
+              <a:rPr lang="en-US" altLang="ja-JP" sz="1050" dirty="0">
                 <a:solidFill>
                   <a:schemeClr val="tx1"/>
                 </a:solidFill>
@@ -7275,14 +7522,14 @@
           <a:p>
             <a:pPr algn="ctr"/>
             <a:r>
-              <a:rPr lang="en-US" altLang="ja-JP" sz="1400" dirty="0" smtClean="0">
+              <a:rPr lang="en-US" altLang="ja-JP" sz="1050" dirty="0">
                 <a:solidFill>
                   <a:schemeClr val="tx1"/>
                 </a:solidFill>
               </a:rPr>
               <a:t>File</a:t>
             </a:r>
-            <a:endParaRPr kumimoji="1" lang="ja-JP" altLang="en-US" sz="1400" dirty="0">
+            <a:endParaRPr lang="ja-JP" altLang="en-US" sz="1050" dirty="0">
               <a:solidFill>
                 <a:schemeClr val="tx1"/>
               </a:solidFill>
@@ -7298,8 +7545,8 @@
         </p:nvSpPr>
         <p:spPr>
           <a:xfrm>
-            <a:off x="3643086" y="528930"/>
-            <a:ext cx="1487713" cy="646331"/>
+            <a:off x="2732316" y="2396949"/>
+            <a:ext cx="1115785" cy="507831"/>
           </a:xfrm>
           <a:prstGeom prst="rect">
             <a:avLst/>
@@ -7314,17 +7561,17 @@
           <a:p>
             <a:pPr algn="ctr"/>
             <a:r>
-              <a:rPr kumimoji="1" lang="en-US" altLang="ja-JP" dirty="0" smtClean="0"/>
+              <a:rPr lang="en-US" altLang="ja-JP" sz="1350" dirty="0"/>
               <a:t>Confirm</a:t>
             </a:r>
           </a:p>
           <a:p>
             <a:pPr algn="ctr"/>
             <a:r>
-              <a:rPr lang="en-US" altLang="ja-JP" dirty="0" smtClean="0"/>
+              <a:rPr lang="en-US" altLang="ja-JP" sz="1350" dirty="0"/>
               <a:t>Screen</a:t>
             </a:r>
-            <a:endParaRPr kumimoji="1" lang="ja-JP" altLang="en-US" dirty="0"/>
+            <a:endParaRPr lang="ja-JP" altLang="en-US" sz="1350" dirty="0"/>
           </a:p>
         </p:txBody>
       </p:sp>
@@ -7336,8 +7583,8 @@
         </p:nvSpPr>
         <p:spPr>
           <a:xfrm>
-            <a:off x="6604001" y="528930"/>
-            <a:ext cx="1465942" cy="646331"/>
+            <a:off x="4953001" y="2396949"/>
+            <a:ext cx="1099457" cy="507831"/>
           </a:xfrm>
           <a:prstGeom prst="rect">
             <a:avLst/>
@@ -7352,17 +7599,17 @@
           <a:p>
             <a:pPr algn="ctr"/>
             <a:r>
-              <a:rPr kumimoji="1" lang="en-US" altLang="ja-JP" dirty="0" smtClean="0"/>
+              <a:rPr lang="en-US" altLang="ja-JP" sz="1350" dirty="0"/>
               <a:t>Complete</a:t>
             </a:r>
           </a:p>
           <a:p>
             <a:pPr algn="ctr"/>
             <a:r>
-              <a:rPr lang="en-US" altLang="ja-JP" dirty="0" smtClean="0"/>
+              <a:rPr lang="en-US" altLang="ja-JP" sz="1350" dirty="0"/>
               <a:t>Screen</a:t>
             </a:r>
-            <a:endParaRPr kumimoji="1" lang="ja-JP" altLang="en-US" dirty="0"/>
+            <a:endParaRPr lang="ja-JP" altLang="en-US" sz="1350" dirty="0"/>
           </a:p>
         </p:txBody>
       </p:sp>
@@ -7374,8 +7621,8 @@
         </p:nvSpPr>
         <p:spPr>
           <a:xfrm>
-            <a:off x="1350246" y="2296685"/>
-            <a:ext cx="734693" cy="536091"/>
+            <a:off x="1012685" y="3722764"/>
+            <a:ext cx="551020" cy="402068"/>
           </a:xfrm>
           <a:prstGeom prst="rect">
             <a:avLst/>
@@ -7406,14 +7653,14 @@
           <a:lstStyle/>
           <a:p>
             <a:r>
-              <a:rPr kumimoji="1" lang="en-US" altLang="ja-JP" sz="2400" dirty="0" smtClean="0">
+              <a:rPr lang="en-US" altLang="ja-JP" dirty="0">
                 <a:solidFill>
                   <a:schemeClr val="tx1"/>
                 </a:solidFill>
               </a:rPr>
               <a:t>(1)</a:t>
             </a:r>
-            <a:endParaRPr kumimoji="1" lang="ja-JP" altLang="en-US" sz="2400" dirty="0">
+            <a:endParaRPr lang="ja-JP" altLang="en-US" dirty="0">
               <a:solidFill>
                 <a:schemeClr val="tx1"/>
               </a:solidFill>
@@ -7429,8 +7676,8 @@
         </p:nvSpPr>
         <p:spPr>
           <a:xfrm>
-            <a:off x="2818184" y="4733990"/>
-            <a:ext cx="734693" cy="536091"/>
+            <a:off x="2113639" y="5550743"/>
+            <a:ext cx="551020" cy="402068"/>
           </a:xfrm>
           <a:prstGeom prst="rect">
             <a:avLst/>
@@ -7461,14 +7708,14 @@
           <a:lstStyle/>
           <a:p>
             <a:r>
-              <a:rPr kumimoji="1" lang="en-US" altLang="ja-JP" sz="2400" dirty="0" smtClean="0">
+              <a:rPr lang="en-US" altLang="ja-JP" dirty="0">
                 <a:solidFill>
                   <a:schemeClr val="tx1"/>
                 </a:solidFill>
               </a:rPr>
               <a:t>(2)</a:t>
             </a:r>
-            <a:endParaRPr kumimoji="1" lang="ja-JP" altLang="en-US" sz="2400" dirty="0">
+            <a:endParaRPr lang="ja-JP" altLang="en-US" dirty="0">
               <a:solidFill>
                 <a:schemeClr val="tx1"/>
               </a:solidFill>
@@ -7484,8 +7731,8 @@
         </p:nvSpPr>
         <p:spPr>
           <a:xfrm>
-            <a:off x="2767624" y="333584"/>
-            <a:ext cx="734693" cy="536091"/>
+            <a:off x="2075719" y="2250439"/>
+            <a:ext cx="551020" cy="402068"/>
           </a:xfrm>
           <a:prstGeom prst="rect">
             <a:avLst/>
@@ -7516,14 +7763,14 @@
           <a:lstStyle/>
           <a:p>
             <a:r>
-              <a:rPr kumimoji="1" lang="en-US" altLang="ja-JP" sz="2400" dirty="0" smtClean="0">
+              <a:rPr lang="en-US" altLang="ja-JP" dirty="0">
                 <a:solidFill>
                   <a:schemeClr val="tx1"/>
                 </a:solidFill>
               </a:rPr>
               <a:t>(3)</a:t>
             </a:r>
-            <a:endParaRPr kumimoji="1" lang="ja-JP" altLang="en-US" sz="2400" dirty="0">
+            <a:endParaRPr lang="ja-JP" altLang="en-US" dirty="0">
               <a:solidFill>
                 <a:schemeClr val="tx1"/>
               </a:solidFill>
@@ -7539,8 +7786,8 @@
         </p:nvSpPr>
         <p:spPr>
           <a:xfrm>
-            <a:off x="4450080" y="1623344"/>
-            <a:ext cx="734693" cy="536091"/>
+            <a:off x="3337561" y="3217759"/>
+            <a:ext cx="551020" cy="402068"/>
           </a:xfrm>
           <a:prstGeom prst="rect">
             <a:avLst/>
@@ -7571,14 +7818,14 @@
           <a:lstStyle/>
           <a:p>
             <a:r>
-              <a:rPr kumimoji="1" lang="en-US" altLang="ja-JP" sz="2400" dirty="0" smtClean="0">
+              <a:rPr lang="en-US" altLang="ja-JP" dirty="0">
                 <a:solidFill>
                   <a:schemeClr val="tx1"/>
                 </a:solidFill>
               </a:rPr>
               <a:t>(4)</a:t>
             </a:r>
-            <a:endParaRPr kumimoji="1" lang="ja-JP" altLang="en-US" sz="2400" dirty="0">
+            <a:endParaRPr lang="ja-JP" altLang="en-US" dirty="0">
               <a:solidFill>
                 <a:schemeClr val="tx1"/>
               </a:solidFill>
@@ -7594,8 +7841,8 @@
         </p:nvSpPr>
         <p:spPr>
           <a:xfrm>
-            <a:off x="5692012" y="3976049"/>
-            <a:ext cx="734693" cy="536091"/>
+            <a:off x="4269010" y="4982287"/>
+            <a:ext cx="551020" cy="402068"/>
           </a:xfrm>
           <a:prstGeom prst="rect">
             <a:avLst/>
@@ -7626,14 +7873,14 @@
           <a:lstStyle/>
           <a:p>
             <a:r>
-              <a:rPr kumimoji="1" lang="en-US" altLang="ja-JP" sz="2400" dirty="0" smtClean="0">
+              <a:rPr lang="en-US" altLang="ja-JP" dirty="0">
                 <a:solidFill>
                   <a:schemeClr val="tx1"/>
                 </a:solidFill>
               </a:rPr>
               <a:t>(6)</a:t>
             </a:r>
-            <a:endParaRPr kumimoji="1" lang="ja-JP" altLang="en-US" sz="2400" dirty="0">
+            <a:endParaRPr lang="ja-JP" altLang="en-US" dirty="0">
               <a:solidFill>
                 <a:schemeClr val="tx1"/>
               </a:solidFill>
@@ -7649,8 +7896,8 @@
         </p:nvSpPr>
         <p:spPr>
           <a:xfrm>
-            <a:off x="5775269" y="333584"/>
-            <a:ext cx="734693" cy="536091"/>
+            <a:off x="4331453" y="2250439"/>
+            <a:ext cx="551020" cy="402068"/>
           </a:xfrm>
           <a:prstGeom prst="rect">
             <a:avLst/>
@@ -7681,14 +7928,14 @@
           <a:lstStyle/>
           <a:p>
             <a:r>
-              <a:rPr kumimoji="1" lang="en-US" altLang="ja-JP" sz="2400" dirty="0" smtClean="0">
+              <a:rPr lang="en-US" altLang="ja-JP" dirty="0">
                 <a:solidFill>
                   <a:schemeClr val="tx1"/>
                 </a:solidFill>
               </a:rPr>
               <a:t>(7)</a:t>
             </a:r>
-            <a:endParaRPr kumimoji="1" lang="ja-JP" altLang="en-US" sz="2400" dirty="0">
+            <a:endParaRPr lang="ja-JP" altLang="en-US" dirty="0">
               <a:solidFill>
                 <a:schemeClr val="tx1"/>
               </a:solidFill>
@@ -7704,8 +7951,8 @@
         </p:nvSpPr>
         <p:spPr>
           <a:xfrm>
-            <a:off x="682387" y="3737453"/>
-            <a:ext cx="1690916" cy="630681"/>
+            <a:off x="511790" y="4803340"/>
+            <a:ext cx="1268187" cy="473011"/>
           </a:xfrm>
           <a:prstGeom prst="borderCallout2">
             <a:avLst>
@@ -7746,7 +7993,7 @@
           <a:p>
             <a:pPr algn="ctr"/>
             <a:r>
-              <a:rPr kumimoji="1" lang="en-US" altLang="ja-JP" dirty="0" smtClean="0">
+              <a:rPr lang="en-US" altLang="ja-JP" sz="1350" dirty="0">
                 <a:solidFill>
                   <a:schemeClr val="tx1"/>
                 </a:solidFill>
@@ -7757,14 +8004,14 @@
           <a:p>
             <a:pPr algn="ctr"/>
             <a:r>
-              <a:rPr lang="en-US" altLang="ja-JP" dirty="0" smtClean="0">
+              <a:rPr lang="en-US" altLang="ja-JP" sz="1350" dirty="0">
                 <a:solidFill>
                   <a:schemeClr val="tx1"/>
                 </a:solidFill>
               </a:rPr>
               <a:t>Upload</a:t>
             </a:r>
-            <a:endParaRPr kumimoji="1" lang="ja-JP" altLang="en-US" dirty="0">
+            <a:endParaRPr lang="ja-JP" altLang="en-US" sz="1350" dirty="0">
               <a:solidFill>
                 <a:schemeClr val="tx1"/>
               </a:solidFill>
@@ -7782,8 +8029,8 @@
         </p:nvSpPr>
         <p:spPr bwMode="auto">
           <a:xfrm>
-            <a:off x="7186179" y="5739669"/>
-            <a:ext cx="1590373" cy="825258"/>
+            <a:off x="5389635" y="6305002"/>
+            <a:ext cx="1192780" cy="618944"/>
           </a:xfrm>
           <a:prstGeom prst="flowChartMagneticDisk">
             <a:avLst/>
@@ -7808,38 +8055,26 @@
           </a:fontRef>
         </p:style>
         <p:txBody>
-          <a:bodyPr vert="horz" wrap="square" lIns="74295" tIns="8890" rIns="74295" bIns="8890" numCol="1" anchor="t" anchorCtr="0" compatLnSpc="1">
+          <a:bodyPr vert="horz" wrap="square" lIns="55721" tIns="6668" rIns="55721" bIns="6668" numCol="1" anchor="t" anchorCtr="0" compatLnSpc="1">
             <a:prstTxWarp prst="textNoShape">
               <a:avLst/>
             </a:prstTxWarp>
           </a:bodyPr>
           <a:lstStyle/>
           <a:p>
-            <a:pPr marL="0" marR="0" lvl="0" indent="0" algn="ctr" defTabSz="914400" rtl="0" eaLnBrk="1" fontAlgn="base" latinLnBrk="0" hangingPunct="1">
-              <a:lnSpc>
-                <a:spcPct val="100000"/>
-              </a:lnSpc>
+            <a:pPr algn="ctr" defTabSz="685784" fontAlgn="base">
               <a:spcBef>
                 <a:spcPct val="0"/>
               </a:spcBef>
               <a:spcAft>
                 <a:spcPct val="0"/>
               </a:spcAft>
-              <a:buClrTx/>
-              <a:buSzTx/>
-              <a:buFontTx/>
-              <a:buNone/>
-              <a:tabLst/>
             </a:pPr>
             <a:r>
-              <a:rPr kumimoji="1" lang="en-US" altLang="ja-JP" sz="1800" b="0" i="0" u="none" strike="noStrike" cap="none" normalizeH="0" baseline="0" dirty="0" smtClean="0">
-                <a:ln>
-                  <a:noFill/>
-                </a:ln>
+              <a:rPr lang="en-US" altLang="ja-JP" sz="1350" dirty="0">
                 <a:solidFill>
                   <a:schemeClr val="bg1"/>
                 </a:solidFill>
-                <a:effectLst/>
                 <a:latin typeface="Arial" pitchFamily="34" charset="0"/>
                 <a:ea typeface="ＭＳ Ｐゴシック" pitchFamily="50" charset="-128"/>
                 <a:cs typeface="ＭＳ Ｐゴシック" pitchFamily="50" charset="-128"/>
@@ -7857,8 +8092,8 @@
         </p:nvSpPr>
         <p:spPr>
           <a:xfrm>
-            <a:off x="6708359" y="5821060"/>
-            <a:ext cx="734693" cy="536091"/>
+            <a:off x="5031270" y="6366046"/>
+            <a:ext cx="551020" cy="402068"/>
           </a:xfrm>
           <a:prstGeom prst="rect">
             <a:avLst/>
@@ -7889,14 +8124,14 @@
           <a:lstStyle/>
           <a:p>
             <a:r>
-              <a:rPr kumimoji="1" lang="en-US" altLang="ja-JP" sz="2400" dirty="0" smtClean="0">
+              <a:rPr lang="en-US" altLang="ja-JP" dirty="0">
                 <a:solidFill>
                   <a:schemeClr val="tx1"/>
                 </a:solidFill>
               </a:rPr>
               <a:t>or</a:t>
             </a:r>
-            <a:endParaRPr kumimoji="1" lang="ja-JP" altLang="en-US" sz="2400" dirty="0">
+            <a:endParaRPr lang="ja-JP" altLang="en-US" dirty="0">
               <a:solidFill>
                 <a:schemeClr val="tx1"/>
               </a:solidFill>
@@ -7912,8 +8147,8 @@
         </p:nvSpPr>
         <p:spPr>
           <a:xfrm>
-            <a:off x="5244788" y="3011653"/>
-            <a:ext cx="1118838" cy="583137"/>
+            <a:off x="3933591" y="4258991"/>
+            <a:ext cx="839129" cy="437353"/>
           </a:xfrm>
           <a:prstGeom prst="roundRect">
             <a:avLst/>
@@ -7939,10 +8174,10 @@
           <a:p>
             <a:pPr algn="ctr"/>
             <a:r>
-              <a:rPr lang="en-US" altLang="ja-JP" sz="1200" b="1" dirty="0" smtClean="0"/>
+              <a:rPr lang="en-US" altLang="ja-JP" sz="900" b="1" dirty="0"/>
               <a:t>Service</a:t>
             </a:r>
-            <a:endParaRPr lang="ja-JP" altLang="en-US" sz="1200" b="1" dirty="0"/>
+            <a:endParaRPr lang="ja-JP" altLang="en-US" sz="900" b="1" dirty="0"/>
           </a:p>
         </p:txBody>
       </p:sp>
@@ -7954,8 +8189,8 @@
         </p:nvSpPr>
         <p:spPr>
           <a:xfrm>
-            <a:off x="4445503" y="3434020"/>
-            <a:ext cx="2975611" cy="810076"/>
+            <a:off x="3334129" y="4575766"/>
+            <a:ext cx="2231708" cy="607557"/>
           </a:xfrm>
           <a:prstGeom prst="curvedDownArrow">
             <a:avLst/>
@@ -7984,14 +8219,14 @@
           <a:p>
             <a:pPr algn="ctr"/>
             <a:r>
-              <a:rPr kumimoji="1" lang="en-US" altLang="ja-JP" dirty="0" smtClean="0">
+              <a:rPr lang="en-US" altLang="ja-JP" sz="1350" dirty="0">
                 <a:solidFill>
                   <a:schemeClr val="tx1"/>
                 </a:solidFill>
               </a:rPr>
               <a:t>Move File</a:t>
             </a:r>
-            <a:endParaRPr kumimoji="1" lang="ja-JP" altLang="en-US" dirty="0">
+            <a:endParaRPr lang="ja-JP" altLang="en-US" sz="1350" dirty="0">
               <a:solidFill>
                 <a:schemeClr val="tx1"/>
               </a:solidFill>
@@ -8010,8 +8245,8 @@
         </p:nvCxnSpPr>
         <p:spPr>
           <a:xfrm flipH="1">
-            <a:off x="5804207" y="2588253"/>
-            <a:ext cx="2344" cy="423400"/>
+            <a:off x="4353156" y="3941440"/>
+            <a:ext cx="1758" cy="317550"/>
           </a:xfrm>
           <a:prstGeom prst="straightConnector1">
             <a:avLst/>
@@ -8049,8 +8284,8 @@
         </p:nvSpPr>
         <p:spPr>
           <a:xfrm>
-            <a:off x="5844127" y="2564730"/>
-            <a:ext cx="734693" cy="536091"/>
+            <a:off x="4383096" y="3923799"/>
+            <a:ext cx="551020" cy="402068"/>
           </a:xfrm>
           <a:prstGeom prst="rect">
             <a:avLst/>
@@ -8081,14 +8316,14 @@
           <a:lstStyle/>
           <a:p>
             <a:r>
-              <a:rPr kumimoji="1" lang="en-US" altLang="ja-JP" sz="2400" dirty="0" smtClean="0">
+              <a:rPr lang="en-US" altLang="ja-JP" dirty="0">
                 <a:solidFill>
                   <a:schemeClr val="tx1"/>
                 </a:solidFill>
               </a:rPr>
               <a:t>(5)</a:t>
             </a:r>
-            <a:endParaRPr kumimoji="1" lang="ja-JP" altLang="en-US" sz="2400" dirty="0">
+            <a:endParaRPr lang="ja-JP" altLang="en-US" dirty="0">
               <a:solidFill>
                 <a:schemeClr val="tx1"/>
               </a:solidFill>
@@ -8106,8 +8341,8 @@
         </p:nvSpPr>
         <p:spPr bwMode="auto">
           <a:xfrm>
-            <a:off x="4184896" y="5739669"/>
-            <a:ext cx="1590373" cy="825258"/>
+            <a:off x="3138673" y="6305002"/>
+            <a:ext cx="1192780" cy="618944"/>
           </a:xfrm>
           <a:prstGeom prst="flowChartMagneticDisk">
             <a:avLst/>
@@ -8132,38 +8367,26 @@
           </a:fontRef>
         </p:style>
         <p:txBody>
-          <a:bodyPr vert="horz" wrap="square" lIns="74295" tIns="8890" rIns="74295" bIns="8890" numCol="1" anchor="t" anchorCtr="0" compatLnSpc="1">
+          <a:bodyPr vert="horz" wrap="square" lIns="55721" tIns="6668" rIns="55721" bIns="6668" numCol="1" anchor="t" anchorCtr="0" compatLnSpc="1">
             <a:prstTxWarp prst="textNoShape">
               <a:avLst/>
             </a:prstTxWarp>
           </a:bodyPr>
           <a:lstStyle/>
           <a:p>
-            <a:pPr marL="0" marR="0" lvl="0" indent="0" algn="ctr" defTabSz="914400" rtl="0" eaLnBrk="1" fontAlgn="base" latinLnBrk="0" hangingPunct="1">
-              <a:lnSpc>
-                <a:spcPct val="100000"/>
-              </a:lnSpc>
+            <a:pPr algn="ctr" defTabSz="685784" fontAlgn="base">
               <a:spcBef>
                 <a:spcPct val="0"/>
               </a:spcBef>
               <a:spcAft>
                 <a:spcPct val="0"/>
               </a:spcAft>
-              <a:buClrTx/>
-              <a:buSzTx/>
-              <a:buFontTx/>
-              <a:buNone/>
-              <a:tabLst/>
             </a:pPr>
             <a:r>
-              <a:rPr kumimoji="1" lang="en-US" altLang="ja-JP" sz="1800" b="0" i="0" u="none" strike="noStrike" cap="none" normalizeH="0" baseline="0" dirty="0" smtClean="0">
-                <a:ln>
-                  <a:noFill/>
-                </a:ln>
+              <a:rPr lang="en-US" altLang="ja-JP" sz="1350" dirty="0">
                 <a:solidFill>
                   <a:schemeClr val="bg1"/>
                 </a:solidFill>
-                <a:effectLst/>
                 <a:latin typeface="Arial" pitchFamily="34" charset="0"/>
                 <a:ea typeface="ＭＳ Ｐゴシック" pitchFamily="50" charset="-128"/>
                 <a:cs typeface="ＭＳ Ｐゴシック" pitchFamily="50" charset="-128"/>
@@ -8181,8 +8404,8 @@
         </p:nvSpPr>
         <p:spPr>
           <a:xfrm>
-            <a:off x="3714928" y="5778182"/>
-            <a:ext cx="734693" cy="536091"/>
+            <a:off x="2786197" y="6333887"/>
+            <a:ext cx="551020" cy="402068"/>
           </a:xfrm>
           <a:prstGeom prst="rect">
             <a:avLst/>
@@ -8213,14 +8436,14 @@
           <a:lstStyle/>
           <a:p>
             <a:r>
-              <a:rPr kumimoji="1" lang="en-US" altLang="ja-JP" sz="2400" dirty="0" smtClean="0">
+              <a:rPr lang="en-US" altLang="ja-JP" dirty="0">
                 <a:solidFill>
                   <a:schemeClr val="tx1"/>
                 </a:solidFill>
               </a:rPr>
               <a:t>or</a:t>
             </a:r>
-            <a:endParaRPr kumimoji="1" lang="ja-JP" altLang="en-US" sz="2400" dirty="0">
+            <a:endParaRPr lang="ja-JP" altLang="en-US" dirty="0">
               <a:solidFill>
                 <a:schemeClr val="tx1"/>
               </a:solidFill>

</xml_diff>